<commit_message>
prepare final write up and presentation, pretty much ready to submit
</commit_message>
<xml_diff>
--- a/docs/presentation/presentation.pptx
+++ b/docs/presentation/presentation.pptx
@@ -9,11 +9,29 @@
     <p:sldId id="257" r:id="rId3"/>
     <p:sldId id="258" r:id="rId4"/>
     <p:sldId id="259" r:id="rId5"/>
-    <p:sldId id="260" r:id="rId6"/>
-    <p:sldId id="261" r:id="rId7"/>
-    <p:sldId id="262" r:id="rId8"/>
-    <p:sldId id="263" r:id="rId9"/>
-    <p:sldId id="264" r:id="rId10"/>
+    <p:sldId id="265" r:id="rId6"/>
+    <p:sldId id="266" r:id="rId7"/>
+    <p:sldId id="268" r:id="rId8"/>
+    <p:sldId id="270" r:id="rId9"/>
+    <p:sldId id="260" r:id="rId10"/>
+    <p:sldId id="272" r:id="rId11"/>
+    <p:sldId id="273" r:id="rId12"/>
+    <p:sldId id="274" r:id="rId13"/>
+    <p:sldId id="275" r:id="rId14"/>
+    <p:sldId id="276" r:id="rId15"/>
+    <p:sldId id="261" r:id="rId16"/>
+    <p:sldId id="262" r:id="rId17"/>
+    <p:sldId id="267" r:id="rId18"/>
+    <p:sldId id="271" r:id="rId19"/>
+    <p:sldId id="277" r:id="rId20"/>
+    <p:sldId id="280" r:id="rId21"/>
+    <p:sldId id="278" r:id="rId22"/>
+    <p:sldId id="281" r:id="rId23"/>
+    <p:sldId id="279" r:id="rId24"/>
+    <p:sldId id="282" r:id="rId25"/>
+    <p:sldId id="283" r:id="rId26"/>
+    <p:sldId id="284" r:id="rId27"/>
+    <p:sldId id="285" r:id="rId28"/>
   </p:sldIdLst>
   <p:sldSz cx="9144000" cy="6858000" type="screen4x3"/>
   <p:notesSz cx="6858000" cy="9144000"/>
@@ -3079,14 +3097,16 @@
         </p:nvSpPr>
         <p:spPr/>
         <p:txBody>
-          <a:bodyPr/>
-          <a:lstStyle/>
-          <a:p>
-            <a:r>
-              <a:rPr lang="en-US" dirty="0" smtClean="0"/>
+          <a:bodyPr>
+            <a:normAutofit/>
+          </a:bodyPr>
+          <a:lstStyle/>
+          <a:p>
+            <a:r>
+              <a:rPr lang="en-US" sz="6600" b="1" dirty="0" smtClean="0"/>
               <a:t>Edge Detection</a:t>
             </a:r>
-            <a:endParaRPr lang="en-US" dirty="0"/>
+            <a:endParaRPr lang="en-US" sz="6600" b="1" dirty="0"/>
           </a:p>
         </p:txBody>
       </p:sp>
@@ -3124,6 +3144,1355 @@
   <p:clrMapOvr>
     <a:masterClrMapping/>
   </p:clrMapOvr>
+  <p:timing>
+    <p:tnLst>
+      <p:par>
+        <p:cTn id="1" dur="indefinite" restart="never" nodeType="tmRoot"/>
+      </p:par>
+    </p:tnLst>
+  </p:timing>
+</p:sld>
+</file>
+
+<file path=ppt/slides/slide10.xml><?xml version="1.0" encoding="utf-8"?>
+<p:sld xmlns:a="http://schemas.openxmlformats.org/drawingml/2006/main" xmlns:r="http://schemas.openxmlformats.org/officeDocument/2006/relationships" xmlns:p="http://schemas.openxmlformats.org/presentationml/2006/main">
+  <p:cSld>
+    <p:spTree>
+      <p:nvGrpSpPr>
+        <p:cNvPr id="1" name=""/>
+        <p:cNvGrpSpPr/>
+        <p:nvPr/>
+      </p:nvGrpSpPr>
+      <p:grpSpPr>
+        <a:xfrm>
+          <a:off x="0" y="0"/>
+          <a:ext cx="0" cy="0"/>
+          <a:chOff x="0" y="0"/>
+          <a:chExt cx="0" cy="0"/>
+        </a:xfrm>
+      </p:grpSpPr>
+      <p:sp>
+        <p:nvSpPr>
+          <p:cNvPr id="2" name="Title 1"/>
+          <p:cNvSpPr>
+            <a:spLocks noGrp="1"/>
+          </p:cNvSpPr>
+          <p:nvPr>
+            <p:ph type="title"/>
+          </p:nvPr>
+        </p:nvSpPr>
+        <p:spPr/>
+        <p:txBody>
+          <a:bodyPr>
+            <a:normAutofit fontScale="90000"/>
+          </a:bodyPr>
+          <a:lstStyle/>
+          <a:p>
+            <a:r>
+              <a:rPr lang="en-US" dirty="0" smtClean="0"/>
+              <a:t>Gradient-based method</a:t>
+            </a:r>
+            <a:br>
+              <a:rPr lang="en-US" dirty="0" smtClean="0"/>
+            </a:br>
+            <a:r>
+              <a:rPr lang="en-US" sz="3600" dirty="0" smtClean="0">
+                <a:solidFill>
+                  <a:schemeClr val="bg1">
+                    <a:lumMod val="50000"/>
+                  </a:schemeClr>
+                </a:solidFill>
+              </a:rPr>
+              <a:t>Example 1</a:t>
+            </a:r>
+            <a:endParaRPr lang="en-US" dirty="0"/>
+          </a:p>
+        </p:txBody>
+      </p:sp>
+      <p:pic>
+        <p:nvPicPr>
+          <p:cNvPr id="4" name="Picture 3" descr="lena_gradient_edges.png"/>
+          <p:cNvPicPr>
+            <a:picLocks noChangeAspect="1"/>
+          </p:cNvPicPr>
+          <p:nvPr/>
+        </p:nvPicPr>
+        <p:blipFill>
+          <a:blip r:embed="rId2" cstate="print"/>
+          <a:stretch>
+            <a:fillRect/>
+          </a:stretch>
+        </p:blipFill>
+        <p:spPr>
+          <a:xfrm>
+            <a:off x="2133600" y="1447800"/>
+            <a:ext cx="4876800" cy="4876800"/>
+          </a:xfrm>
+          <a:prstGeom prst="rect">
+            <a:avLst/>
+          </a:prstGeom>
+        </p:spPr>
+      </p:pic>
+    </p:spTree>
+  </p:cSld>
+  <p:clrMapOvr>
+    <a:masterClrMapping/>
+  </p:clrMapOvr>
+  <p:timing>
+    <p:tnLst>
+      <p:par>
+        <p:cTn id="1" dur="indefinite" restart="never" nodeType="tmRoot"/>
+      </p:par>
+    </p:tnLst>
+  </p:timing>
+</p:sld>
+</file>
+
+<file path=ppt/slides/slide11.xml><?xml version="1.0" encoding="utf-8"?>
+<p:sld xmlns:a="http://schemas.openxmlformats.org/drawingml/2006/main" xmlns:r="http://schemas.openxmlformats.org/officeDocument/2006/relationships" xmlns:p="http://schemas.openxmlformats.org/presentationml/2006/main">
+  <p:cSld>
+    <p:spTree>
+      <p:nvGrpSpPr>
+        <p:cNvPr id="1" name=""/>
+        <p:cNvGrpSpPr/>
+        <p:nvPr/>
+      </p:nvGrpSpPr>
+      <p:grpSpPr>
+        <a:xfrm>
+          <a:off x="0" y="0"/>
+          <a:ext cx="0" cy="0"/>
+          <a:chOff x="0" y="0"/>
+          <a:chExt cx="0" cy="0"/>
+        </a:xfrm>
+      </p:grpSpPr>
+      <p:sp>
+        <p:nvSpPr>
+          <p:cNvPr id="2" name="Title 1"/>
+          <p:cNvSpPr>
+            <a:spLocks noGrp="1"/>
+          </p:cNvSpPr>
+          <p:nvPr>
+            <p:ph type="title"/>
+          </p:nvPr>
+        </p:nvSpPr>
+        <p:spPr/>
+        <p:txBody>
+          <a:bodyPr>
+            <a:normAutofit fontScale="90000"/>
+          </a:bodyPr>
+          <a:lstStyle/>
+          <a:p>
+            <a:r>
+              <a:rPr lang="en-US" dirty="0" smtClean="0"/>
+              <a:t>Gradient-based method</a:t>
+            </a:r>
+            <a:br>
+              <a:rPr lang="en-US" dirty="0" smtClean="0"/>
+            </a:br>
+            <a:r>
+              <a:rPr lang="en-US" sz="3600" dirty="0" smtClean="0">
+                <a:solidFill>
+                  <a:schemeClr val="bg1">
+                    <a:lumMod val="50000"/>
+                  </a:schemeClr>
+                </a:solidFill>
+              </a:rPr>
+              <a:t>Example 2</a:t>
+            </a:r>
+            <a:endParaRPr lang="en-US" dirty="0"/>
+          </a:p>
+        </p:txBody>
+      </p:sp>
+      <p:pic>
+        <p:nvPicPr>
+          <p:cNvPr id="5" name="Picture 4" descr="stata_center.jpg"/>
+          <p:cNvPicPr>
+            <a:picLocks noChangeAspect="1"/>
+          </p:cNvPicPr>
+          <p:nvPr/>
+        </p:nvPicPr>
+        <p:blipFill>
+          <a:blip r:embed="rId2" cstate="print"/>
+          <a:stretch>
+            <a:fillRect/>
+          </a:stretch>
+        </p:blipFill>
+        <p:spPr>
+          <a:xfrm>
+            <a:off x="2667000" y="1524000"/>
+            <a:ext cx="3771900" cy="5029200"/>
+          </a:xfrm>
+          <a:prstGeom prst="rect">
+            <a:avLst/>
+          </a:prstGeom>
+        </p:spPr>
+      </p:pic>
+    </p:spTree>
+  </p:cSld>
+  <p:clrMapOvr>
+    <a:masterClrMapping/>
+  </p:clrMapOvr>
+  <p:timing>
+    <p:tnLst>
+      <p:par>
+        <p:cTn id="1" dur="indefinite" restart="never" nodeType="tmRoot"/>
+      </p:par>
+    </p:tnLst>
+  </p:timing>
+</p:sld>
+</file>
+
+<file path=ppt/slides/slide12.xml><?xml version="1.0" encoding="utf-8"?>
+<p:sld xmlns:a="http://schemas.openxmlformats.org/drawingml/2006/main" xmlns:r="http://schemas.openxmlformats.org/officeDocument/2006/relationships" xmlns:p="http://schemas.openxmlformats.org/presentationml/2006/main">
+  <p:cSld>
+    <p:spTree>
+      <p:nvGrpSpPr>
+        <p:cNvPr id="1" name=""/>
+        <p:cNvGrpSpPr/>
+        <p:nvPr/>
+      </p:nvGrpSpPr>
+      <p:grpSpPr>
+        <a:xfrm>
+          <a:off x="0" y="0"/>
+          <a:ext cx="0" cy="0"/>
+          <a:chOff x="0" y="0"/>
+          <a:chExt cx="0" cy="0"/>
+        </a:xfrm>
+      </p:grpSpPr>
+      <p:sp>
+        <p:nvSpPr>
+          <p:cNvPr id="2" name="Title 1"/>
+          <p:cNvSpPr>
+            <a:spLocks noGrp="1"/>
+          </p:cNvSpPr>
+          <p:nvPr>
+            <p:ph type="title"/>
+          </p:nvPr>
+        </p:nvSpPr>
+        <p:spPr/>
+        <p:txBody>
+          <a:bodyPr>
+            <a:normAutofit fontScale="90000"/>
+          </a:bodyPr>
+          <a:lstStyle/>
+          <a:p>
+            <a:r>
+              <a:rPr lang="en-US" dirty="0" smtClean="0"/>
+              <a:t>Gradient-based method</a:t>
+            </a:r>
+            <a:br>
+              <a:rPr lang="en-US" dirty="0" smtClean="0"/>
+            </a:br>
+            <a:r>
+              <a:rPr lang="en-US" sz="3600" dirty="0" smtClean="0">
+                <a:solidFill>
+                  <a:schemeClr val="bg1">
+                    <a:lumMod val="50000"/>
+                  </a:schemeClr>
+                </a:solidFill>
+              </a:rPr>
+              <a:t>Example 2</a:t>
+            </a:r>
+            <a:endParaRPr lang="en-US" dirty="0"/>
+          </a:p>
+        </p:txBody>
+      </p:sp>
+      <p:pic>
+        <p:nvPicPr>
+          <p:cNvPr id="6" name="Picture 5" descr="stata_center_gradient_edges.jpg"/>
+          <p:cNvPicPr>
+            <a:picLocks noChangeAspect="1"/>
+          </p:cNvPicPr>
+          <p:nvPr/>
+        </p:nvPicPr>
+        <p:blipFill>
+          <a:blip r:embed="rId2" cstate="print"/>
+          <a:stretch>
+            <a:fillRect/>
+          </a:stretch>
+        </p:blipFill>
+        <p:spPr>
+          <a:xfrm>
+            <a:off x="2667000" y="1524000"/>
+            <a:ext cx="3771900" cy="5029200"/>
+          </a:xfrm>
+          <a:prstGeom prst="rect">
+            <a:avLst/>
+          </a:prstGeom>
+        </p:spPr>
+      </p:pic>
+    </p:spTree>
+  </p:cSld>
+  <p:clrMapOvr>
+    <a:masterClrMapping/>
+  </p:clrMapOvr>
+  <p:timing>
+    <p:tnLst>
+      <p:par>
+        <p:cTn id="1" dur="indefinite" restart="never" nodeType="tmRoot"/>
+      </p:par>
+    </p:tnLst>
+  </p:timing>
+</p:sld>
+</file>
+
+<file path=ppt/slides/slide13.xml><?xml version="1.0" encoding="utf-8"?>
+<p:sld xmlns:a="http://schemas.openxmlformats.org/drawingml/2006/main" xmlns:r="http://schemas.openxmlformats.org/officeDocument/2006/relationships" xmlns:p="http://schemas.openxmlformats.org/presentationml/2006/main">
+  <p:cSld>
+    <p:spTree>
+      <p:nvGrpSpPr>
+        <p:cNvPr id="1" name=""/>
+        <p:cNvGrpSpPr/>
+        <p:nvPr/>
+      </p:nvGrpSpPr>
+      <p:grpSpPr>
+        <a:xfrm>
+          <a:off x="0" y="0"/>
+          <a:ext cx="0" cy="0"/>
+          <a:chOff x="0" y="0"/>
+          <a:chExt cx="0" cy="0"/>
+        </a:xfrm>
+      </p:grpSpPr>
+      <p:sp>
+        <p:nvSpPr>
+          <p:cNvPr id="2" name="Title 1"/>
+          <p:cNvSpPr>
+            <a:spLocks noGrp="1"/>
+          </p:cNvSpPr>
+          <p:nvPr>
+            <p:ph type="title"/>
+          </p:nvPr>
+        </p:nvSpPr>
+        <p:spPr/>
+        <p:txBody>
+          <a:bodyPr>
+            <a:normAutofit fontScale="90000"/>
+          </a:bodyPr>
+          <a:lstStyle/>
+          <a:p>
+            <a:r>
+              <a:rPr lang="en-US" dirty="0" smtClean="0"/>
+              <a:t>Gradient-based method</a:t>
+            </a:r>
+            <a:br>
+              <a:rPr lang="en-US" dirty="0" smtClean="0"/>
+            </a:br>
+            <a:r>
+              <a:rPr lang="en-US" sz="3600" dirty="0" smtClean="0">
+                <a:solidFill>
+                  <a:schemeClr val="bg1">
+                    <a:lumMod val="50000"/>
+                  </a:schemeClr>
+                </a:solidFill>
+              </a:rPr>
+              <a:t>Example 3</a:t>
+            </a:r>
+            <a:endParaRPr lang="en-US" dirty="0"/>
+          </a:p>
+        </p:txBody>
+      </p:sp>
+      <p:pic>
+        <p:nvPicPr>
+          <p:cNvPr id="4" name="Picture 3" descr="mandrill.jpg"/>
+          <p:cNvPicPr>
+            <a:picLocks noChangeAspect="1"/>
+          </p:cNvPicPr>
+          <p:nvPr/>
+        </p:nvPicPr>
+        <p:blipFill>
+          <a:blip r:embed="rId2" cstate="print"/>
+          <a:stretch>
+            <a:fillRect/>
+          </a:stretch>
+        </p:blipFill>
+        <p:spPr>
+          <a:xfrm>
+            <a:off x="2133600" y="1600200"/>
+            <a:ext cx="4762500" cy="4572000"/>
+          </a:xfrm>
+          <a:prstGeom prst="rect">
+            <a:avLst/>
+          </a:prstGeom>
+        </p:spPr>
+      </p:pic>
+    </p:spTree>
+  </p:cSld>
+  <p:clrMapOvr>
+    <a:masterClrMapping/>
+  </p:clrMapOvr>
+  <p:timing>
+    <p:tnLst>
+      <p:par>
+        <p:cTn id="1" dur="indefinite" restart="never" nodeType="tmRoot"/>
+      </p:par>
+    </p:tnLst>
+  </p:timing>
+</p:sld>
+</file>
+
+<file path=ppt/slides/slide14.xml><?xml version="1.0" encoding="utf-8"?>
+<p:sld xmlns:a="http://schemas.openxmlformats.org/drawingml/2006/main" xmlns:r="http://schemas.openxmlformats.org/officeDocument/2006/relationships" xmlns:p="http://schemas.openxmlformats.org/presentationml/2006/main">
+  <p:cSld>
+    <p:spTree>
+      <p:nvGrpSpPr>
+        <p:cNvPr id="1" name=""/>
+        <p:cNvGrpSpPr/>
+        <p:nvPr/>
+      </p:nvGrpSpPr>
+      <p:grpSpPr>
+        <a:xfrm>
+          <a:off x="0" y="0"/>
+          <a:ext cx="0" cy="0"/>
+          <a:chOff x="0" y="0"/>
+          <a:chExt cx="0" cy="0"/>
+        </a:xfrm>
+      </p:grpSpPr>
+      <p:sp>
+        <p:nvSpPr>
+          <p:cNvPr id="2" name="Title 1"/>
+          <p:cNvSpPr>
+            <a:spLocks noGrp="1"/>
+          </p:cNvSpPr>
+          <p:nvPr>
+            <p:ph type="title"/>
+          </p:nvPr>
+        </p:nvSpPr>
+        <p:spPr/>
+        <p:txBody>
+          <a:bodyPr>
+            <a:normAutofit fontScale="90000"/>
+          </a:bodyPr>
+          <a:lstStyle/>
+          <a:p>
+            <a:r>
+              <a:rPr lang="en-US" dirty="0" smtClean="0"/>
+              <a:t>Gradient-based method</a:t>
+            </a:r>
+            <a:br>
+              <a:rPr lang="en-US" dirty="0" smtClean="0"/>
+            </a:br>
+            <a:r>
+              <a:rPr lang="en-US" sz="3600" dirty="0" smtClean="0">
+                <a:solidFill>
+                  <a:schemeClr val="bg1">
+                    <a:lumMod val="50000"/>
+                  </a:schemeClr>
+                </a:solidFill>
+              </a:rPr>
+              <a:t>Example 3</a:t>
+            </a:r>
+            <a:endParaRPr lang="en-US" dirty="0"/>
+          </a:p>
+        </p:txBody>
+      </p:sp>
+      <p:pic>
+        <p:nvPicPr>
+          <p:cNvPr id="5" name="Picture 4" descr="mandrill_gradient_edges.jpg"/>
+          <p:cNvPicPr>
+            <a:picLocks noChangeAspect="1"/>
+          </p:cNvPicPr>
+          <p:nvPr/>
+        </p:nvPicPr>
+        <p:blipFill>
+          <a:blip r:embed="rId2" cstate="print"/>
+          <a:stretch>
+            <a:fillRect/>
+          </a:stretch>
+        </p:blipFill>
+        <p:spPr>
+          <a:xfrm>
+            <a:off x="2190750" y="1600200"/>
+            <a:ext cx="4762500" cy="4572000"/>
+          </a:xfrm>
+          <a:prstGeom prst="rect">
+            <a:avLst/>
+          </a:prstGeom>
+        </p:spPr>
+      </p:pic>
+    </p:spTree>
+  </p:cSld>
+  <p:clrMapOvr>
+    <a:masterClrMapping/>
+  </p:clrMapOvr>
+  <p:timing>
+    <p:tnLst>
+      <p:par>
+        <p:cTn id="1" dur="indefinite" restart="never" nodeType="tmRoot"/>
+      </p:par>
+    </p:tnLst>
+  </p:timing>
+</p:sld>
+</file>
+
+<file path=ppt/slides/slide15.xml><?xml version="1.0" encoding="utf-8"?>
+<p:sld xmlns:a="http://schemas.openxmlformats.org/drawingml/2006/main" xmlns:r="http://schemas.openxmlformats.org/officeDocument/2006/relationships" xmlns:p="http://schemas.openxmlformats.org/presentationml/2006/main">
+  <p:cSld>
+    <p:spTree>
+      <p:nvGrpSpPr>
+        <p:cNvPr id="1" name=""/>
+        <p:cNvGrpSpPr/>
+        <p:nvPr/>
+      </p:nvGrpSpPr>
+      <p:grpSpPr>
+        <a:xfrm>
+          <a:off x="0" y="0"/>
+          <a:ext cx="0" cy="0"/>
+          <a:chOff x="0" y="0"/>
+          <a:chExt cx="0" cy="0"/>
+        </a:xfrm>
+      </p:grpSpPr>
+      <p:sp>
+        <p:nvSpPr>
+          <p:cNvPr id="2" name="Title 1"/>
+          <p:cNvSpPr>
+            <a:spLocks noGrp="1"/>
+          </p:cNvSpPr>
+          <p:nvPr>
+            <p:ph type="title"/>
+          </p:nvPr>
+        </p:nvSpPr>
+        <p:spPr/>
+        <p:txBody>
+          <a:bodyPr>
+            <a:normAutofit fontScale="90000"/>
+          </a:bodyPr>
+          <a:lstStyle/>
+          <a:p>
+            <a:r>
+              <a:rPr lang="en-US" dirty="0" err="1" smtClean="0"/>
+              <a:t>Laplacian</a:t>
+            </a:r>
+            <a:r>
+              <a:rPr lang="en-US" dirty="0" smtClean="0"/>
+              <a:t>-based method</a:t>
+            </a:r>
+            <a:br>
+              <a:rPr lang="en-US" dirty="0" smtClean="0"/>
+            </a:br>
+            <a:r>
+              <a:rPr lang="en-US" sz="3600" dirty="0" smtClean="0">
+                <a:solidFill>
+                  <a:schemeClr val="bg1">
+                    <a:lumMod val="50000"/>
+                  </a:schemeClr>
+                </a:solidFill>
+              </a:rPr>
+              <a:t>Motivation</a:t>
+            </a:r>
+            <a:endParaRPr lang="en-US" sz="3600" dirty="0">
+              <a:solidFill>
+                <a:schemeClr val="bg1">
+                  <a:lumMod val="50000"/>
+                </a:schemeClr>
+              </a:solidFill>
+            </a:endParaRPr>
+          </a:p>
+        </p:txBody>
+      </p:sp>
+      <p:pic>
+        <p:nvPicPr>
+          <p:cNvPr id="4" name="Picture 3" descr="f.png"/>
+          <p:cNvPicPr>
+            <a:picLocks noChangeAspect="1"/>
+          </p:cNvPicPr>
+          <p:nvPr/>
+        </p:nvPicPr>
+        <p:blipFill>
+          <a:blip r:embed="rId2" cstate="print"/>
+          <a:stretch>
+            <a:fillRect/>
+          </a:stretch>
+        </p:blipFill>
+        <p:spPr>
+          <a:xfrm>
+            <a:off x="914400" y="1752600"/>
+            <a:ext cx="4572000" cy="1957342"/>
+          </a:xfrm>
+          <a:prstGeom prst="rect">
+            <a:avLst/>
+          </a:prstGeom>
+          <a:ln>
+            <a:noFill/>
+          </a:ln>
+          <a:effectLst>
+            <a:outerShdw blurRad="292100" dist="139700" dir="2700000" algn="tl" rotWithShape="0">
+              <a:srgbClr val="333333">
+                <a:alpha val="65000"/>
+              </a:srgbClr>
+            </a:outerShdw>
+          </a:effectLst>
+        </p:spPr>
+      </p:pic>
+      <p:pic>
+        <p:nvPicPr>
+          <p:cNvPr id="5" name="Picture 4" descr="f_derivative.png"/>
+          <p:cNvPicPr>
+            <a:picLocks noChangeAspect="1"/>
+          </p:cNvPicPr>
+          <p:nvPr/>
+        </p:nvPicPr>
+        <p:blipFill>
+          <a:blip r:embed="rId3" cstate="print"/>
+          <a:stretch>
+            <a:fillRect/>
+          </a:stretch>
+        </p:blipFill>
+        <p:spPr>
+          <a:xfrm>
+            <a:off x="914400" y="4160928"/>
+            <a:ext cx="4572000" cy="1926661"/>
+          </a:xfrm>
+          <a:prstGeom prst="rect">
+            <a:avLst/>
+          </a:prstGeom>
+          <a:ln>
+            <a:noFill/>
+          </a:ln>
+          <a:effectLst>
+            <a:outerShdw blurRad="292100" dist="139700" dir="2700000" algn="tl" rotWithShape="0">
+              <a:srgbClr val="333333">
+                <a:alpha val="65000"/>
+              </a:srgbClr>
+            </a:outerShdw>
+          </a:effectLst>
+        </p:spPr>
+      </p:pic>
+      <p:sp>
+        <p:nvSpPr>
+          <p:cNvPr id="6" name="TextBox 5"/>
+          <p:cNvSpPr txBox="1"/>
+          <p:nvPr/>
+        </p:nvSpPr>
+        <p:spPr>
+          <a:xfrm>
+            <a:off x="5715000" y="2514600"/>
+            <a:ext cx="508473" cy="369332"/>
+          </a:xfrm>
+          <a:prstGeom prst="rect">
+            <a:avLst/>
+          </a:prstGeom>
+          <a:noFill/>
+        </p:spPr>
+        <p:txBody>
+          <a:bodyPr wrap="none" rtlCol="0">
+            <a:spAutoFit/>
+          </a:bodyPr>
+          <a:lstStyle/>
+          <a:p>
+            <a:r>
+              <a:rPr lang="en-US" b="1" dirty="0" smtClean="0"/>
+              <a:t>f(x)</a:t>
+            </a:r>
+            <a:endParaRPr lang="en-US" b="1" dirty="0"/>
+          </a:p>
+        </p:txBody>
+      </p:sp>
+      <p:sp>
+        <p:nvSpPr>
+          <p:cNvPr id="7" name="TextBox 6"/>
+          <p:cNvSpPr txBox="1"/>
+          <p:nvPr/>
+        </p:nvSpPr>
+        <p:spPr>
+          <a:xfrm>
+            <a:off x="5715000" y="4888468"/>
+            <a:ext cx="1156086" cy="369332"/>
+          </a:xfrm>
+          <a:prstGeom prst="rect">
+            <a:avLst/>
+          </a:prstGeom>
+          <a:noFill/>
+        </p:spPr>
+        <p:txBody>
+          <a:bodyPr wrap="none" rtlCol="0">
+            <a:spAutoFit/>
+          </a:bodyPr>
+          <a:lstStyle/>
+          <a:p>
+            <a:r>
+              <a:rPr lang="en-US" b="1" dirty="0" smtClean="0"/>
+              <a:t>d</a:t>
+            </a:r>
+            <a:r>
+              <a:rPr lang="en-US" b="1" baseline="30000" dirty="0" smtClean="0"/>
+              <a:t>2</a:t>
+            </a:r>
+            <a:r>
+              <a:rPr lang="en-US" b="1" dirty="0" smtClean="0"/>
+              <a:t>f(x)/dx</a:t>
+            </a:r>
+            <a:r>
+              <a:rPr lang="en-US" b="1" baseline="30000" dirty="0" smtClean="0"/>
+              <a:t>2</a:t>
+            </a:r>
+            <a:endParaRPr lang="en-US" b="1" baseline="30000" dirty="0"/>
+          </a:p>
+        </p:txBody>
+      </p:sp>
+    </p:spTree>
+  </p:cSld>
+  <p:clrMapOvr>
+    <a:masterClrMapping/>
+  </p:clrMapOvr>
+  <p:timing>
+    <p:tnLst>
+      <p:par>
+        <p:cTn id="1" dur="indefinite" restart="never" nodeType="tmRoot"/>
+      </p:par>
+    </p:tnLst>
+  </p:timing>
+</p:sld>
+</file>
+
+<file path=ppt/slides/slide16.xml><?xml version="1.0" encoding="utf-8"?>
+<p:sld xmlns:a="http://schemas.openxmlformats.org/drawingml/2006/main" xmlns:r="http://schemas.openxmlformats.org/officeDocument/2006/relationships" xmlns:p="http://schemas.openxmlformats.org/presentationml/2006/main">
+  <p:cSld>
+    <p:spTree>
+      <p:nvGrpSpPr>
+        <p:cNvPr id="1" name=""/>
+        <p:cNvGrpSpPr/>
+        <p:nvPr/>
+      </p:nvGrpSpPr>
+      <p:grpSpPr>
+        <a:xfrm>
+          <a:off x="0" y="0"/>
+          <a:ext cx="0" cy="0"/>
+          <a:chOff x="0" y="0"/>
+          <a:chExt cx="0" cy="0"/>
+        </a:xfrm>
+      </p:grpSpPr>
+      <p:sp>
+        <p:nvSpPr>
+          <p:cNvPr id="2" name="Title 1"/>
+          <p:cNvSpPr>
+            <a:spLocks noGrp="1"/>
+          </p:cNvSpPr>
+          <p:nvPr>
+            <p:ph type="title"/>
+          </p:nvPr>
+        </p:nvSpPr>
+        <p:spPr/>
+        <p:txBody>
+          <a:bodyPr>
+            <a:normAutofit fontScale="90000"/>
+          </a:bodyPr>
+          <a:lstStyle/>
+          <a:p>
+            <a:r>
+              <a:rPr lang="en-US" dirty="0" err="1" smtClean="0"/>
+              <a:t>Laplacian</a:t>
+            </a:r>
+            <a:r>
+              <a:rPr lang="en-US" dirty="0" smtClean="0"/>
+              <a:t>-based method</a:t>
+            </a:r>
+            <a:br>
+              <a:rPr lang="en-US" dirty="0" smtClean="0"/>
+            </a:br>
+            <a:r>
+              <a:rPr lang="en-US" sz="3600" dirty="0" smtClean="0">
+                <a:solidFill>
+                  <a:schemeClr val="bg1">
+                    <a:lumMod val="50000"/>
+                  </a:schemeClr>
+                </a:solidFill>
+              </a:rPr>
+              <a:t>Steps</a:t>
+            </a:r>
+            <a:endParaRPr lang="en-US" dirty="0"/>
+          </a:p>
+        </p:txBody>
+      </p:sp>
+      <p:pic>
+        <p:nvPicPr>
+          <p:cNvPr id="4" name="Picture 3" descr="LaplacianMethod.png"/>
+          <p:cNvPicPr>
+            <a:picLocks noChangeAspect="1"/>
+          </p:cNvPicPr>
+          <p:nvPr/>
+        </p:nvPicPr>
+        <p:blipFill>
+          <a:blip r:embed="rId2" cstate="print"/>
+          <a:stretch>
+            <a:fillRect/>
+          </a:stretch>
+        </p:blipFill>
+        <p:spPr>
+          <a:xfrm>
+            <a:off x="0" y="2273170"/>
+            <a:ext cx="9144000" cy="2311660"/>
+          </a:xfrm>
+          <a:prstGeom prst="rect">
+            <a:avLst/>
+          </a:prstGeom>
+        </p:spPr>
+      </p:pic>
+    </p:spTree>
+  </p:cSld>
+  <p:clrMapOvr>
+    <a:masterClrMapping/>
+  </p:clrMapOvr>
+  <p:timing>
+    <p:tnLst>
+      <p:par>
+        <p:cTn id="1" dur="indefinite" restart="never" nodeType="tmRoot"/>
+      </p:par>
+    </p:tnLst>
+  </p:timing>
+</p:sld>
+</file>
+
+<file path=ppt/slides/slide17.xml><?xml version="1.0" encoding="utf-8"?>
+<p:sld xmlns:a="http://schemas.openxmlformats.org/drawingml/2006/main" xmlns:r="http://schemas.openxmlformats.org/officeDocument/2006/relationships" xmlns:p="http://schemas.openxmlformats.org/presentationml/2006/main">
+  <p:cSld>
+    <p:spTree>
+      <p:nvGrpSpPr>
+        <p:cNvPr id="1" name=""/>
+        <p:cNvGrpSpPr/>
+        <p:nvPr/>
+      </p:nvGrpSpPr>
+      <p:grpSpPr>
+        <a:xfrm>
+          <a:off x="0" y="0"/>
+          <a:ext cx="0" cy="0"/>
+          <a:chOff x="0" y="0"/>
+          <a:chExt cx="0" cy="0"/>
+        </a:xfrm>
+      </p:grpSpPr>
+      <p:sp>
+        <p:nvSpPr>
+          <p:cNvPr id="2" name="Title 1"/>
+          <p:cNvSpPr>
+            <a:spLocks noGrp="1"/>
+          </p:cNvSpPr>
+          <p:nvPr>
+            <p:ph type="title"/>
+          </p:nvPr>
+        </p:nvSpPr>
+        <p:spPr/>
+        <p:txBody>
+          <a:bodyPr>
+            <a:normAutofit fontScale="90000"/>
+          </a:bodyPr>
+          <a:lstStyle/>
+          <a:p>
+            <a:r>
+              <a:rPr lang="en-US" dirty="0" err="1" smtClean="0"/>
+              <a:t>Laplacian</a:t>
+            </a:r>
+            <a:r>
+              <a:rPr lang="en-US" dirty="0" smtClean="0"/>
+              <a:t>-based method</a:t>
+            </a:r>
+            <a:br>
+              <a:rPr lang="en-US" dirty="0" smtClean="0"/>
+            </a:br>
+            <a:r>
+              <a:rPr lang="en-US" sz="3600" dirty="0" smtClean="0">
+                <a:solidFill>
+                  <a:schemeClr val="bg1">
+                    <a:lumMod val="50000"/>
+                  </a:schemeClr>
+                </a:solidFill>
+              </a:rPr>
+              <a:t>Steps</a:t>
+            </a:r>
+            <a:endParaRPr lang="en-US" dirty="0"/>
+          </a:p>
+        </p:txBody>
+      </p:sp>
+      <p:pic>
+        <p:nvPicPr>
+          <p:cNvPr id="4" name="Picture 3" descr="LaplacianMethod.png"/>
+          <p:cNvPicPr>
+            <a:picLocks noChangeAspect="1"/>
+          </p:cNvPicPr>
+          <p:nvPr/>
+        </p:nvPicPr>
+        <p:blipFill>
+          <a:blip r:embed="rId2" cstate="print"/>
+          <a:stretch>
+            <a:fillRect/>
+          </a:stretch>
+        </p:blipFill>
+        <p:spPr>
+          <a:xfrm>
+            <a:off x="0" y="1600200"/>
+            <a:ext cx="9144000" cy="2311660"/>
+          </a:xfrm>
+          <a:prstGeom prst="rect">
+            <a:avLst/>
+          </a:prstGeom>
+        </p:spPr>
+      </p:pic>
+      <p:sp>
+        <p:nvSpPr>
+          <p:cNvPr id="5" name="Oval 4"/>
+          <p:cNvSpPr/>
+          <p:nvPr/>
+        </p:nvSpPr>
+        <p:spPr>
+          <a:xfrm>
+            <a:off x="1447800" y="2956810"/>
+            <a:ext cx="990600" cy="914400"/>
+          </a:xfrm>
+          <a:prstGeom prst="ellipse">
+            <a:avLst/>
+          </a:prstGeom>
+          <a:noFill/>
+          <a:ln w="57150">
+            <a:solidFill>
+              <a:srgbClr val="FF0000"/>
+            </a:solidFill>
+          </a:ln>
+          <a:effectLst>
+            <a:outerShdw blurRad="44450" dist="27940" dir="5400000" algn="ctr">
+              <a:srgbClr val="000000">
+                <a:alpha val="32000"/>
+              </a:srgbClr>
+            </a:outerShdw>
+          </a:effectLst>
+          <a:scene3d>
+            <a:camera prst="orthographicFront">
+              <a:rot lat="0" lon="0" rev="0"/>
+            </a:camera>
+            <a:lightRig rig="balanced" dir="t">
+              <a:rot lat="0" lon="0" rev="8700000"/>
+            </a:lightRig>
+          </a:scene3d>
+          <a:sp3d>
+            <a:bevelT w="190500" h="38100"/>
+          </a:sp3d>
+        </p:spPr>
+        <p:style>
+          <a:lnRef idx="2">
+            <a:schemeClr val="accent1">
+              <a:shade val="50000"/>
+            </a:schemeClr>
+          </a:lnRef>
+          <a:fillRef idx="1">
+            <a:schemeClr val="accent1"/>
+          </a:fillRef>
+          <a:effectRef idx="0">
+            <a:schemeClr val="accent1"/>
+          </a:effectRef>
+          <a:fontRef idx="minor">
+            <a:schemeClr val="lt1"/>
+          </a:fontRef>
+        </p:style>
+        <p:txBody>
+          <a:bodyPr rtlCol="0" anchor="ctr"/>
+          <a:lstStyle/>
+          <a:p>
+            <a:pPr algn="ctr"/>
+            <a:endParaRPr lang="en-US"/>
+          </a:p>
+        </p:txBody>
+      </p:sp>
+      <p:pic>
+        <p:nvPicPr>
+          <p:cNvPr id="3074" name="Picture 2"/>
+          <p:cNvPicPr>
+            <a:picLocks noChangeAspect="1" noChangeArrowheads="1"/>
+          </p:cNvPicPr>
+          <p:nvPr/>
+        </p:nvPicPr>
+        <p:blipFill>
+          <a:blip r:embed="rId3" cstate="print"/>
+          <a:srcRect/>
+          <a:stretch>
+            <a:fillRect/>
+          </a:stretch>
+        </p:blipFill>
+        <p:spPr bwMode="auto">
+          <a:xfrm>
+            <a:off x="3124200" y="4191000"/>
+            <a:ext cx="2828925" cy="2228850"/>
+          </a:xfrm>
+          <a:prstGeom prst="rect">
+            <a:avLst/>
+          </a:prstGeom>
+          <a:noFill/>
+          <a:ln w="9525">
+            <a:noFill/>
+            <a:miter lim="800000"/>
+            <a:headEnd/>
+            <a:tailEnd/>
+          </a:ln>
+        </p:spPr>
+      </p:pic>
+    </p:spTree>
+  </p:cSld>
+  <p:clrMapOvr>
+    <a:masterClrMapping/>
+  </p:clrMapOvr>
+  <p:timing>
+    <p:tnLst>
+      <p:par>
+        <p:cTn id="1" dur="indefinite" restart="never" nodeType="tmRoot"/>
+      </p:par>
+    </p:tnLst>
+  </p:timing>
+</p:sld>
+</file>
+
+<file path=ppt/slides/slide18.xml><?xml version="1.0" encoding="utf-8"?>
+<p:sld xmlns:a="http://schemas.openxmlformats.org/drawingml/2006/main" xmlns:r="http://schemas.openxmlformats.org/officeDocument/2006/relationships" xmlns:p="http://schemas.openxmlformats.org/presentationml/2006/main">
+  <p:cSld>
+    <p:spTree>
+      <p:nvGrpSpPr>
+        <p:cNvPr id="1" name=""/>
+        <p:cNvGrpSpPr/>
+        <p:nvPr/>
+      </p:nvGrpSpPr>
+      <p:grpSpPr>
+        <a:xfrm>
+          <a:off x="0" y="0"/>
+          <a:ext cx="0" cy="0"/>
+          <a:chOff x="0" y="0"/>
+          <a:chExt cx="0" cy="0"/>
+        </a:xfrm>
+      </p:grpSpPr>
+      <p:sp>
+        <p:nvSpPr>
+          <p:cNvPr id="2" name="Title 1"/>
+          <p:cNvSpPr>
+            <a:spLocks noGrp="1"/>
+          </p:cNvSpPr>
+          <p:nvPr>
+            <p:ph type="title"/>
+          </p:nvPr>
+        </p:nvSpPr>
+        <p:spPr/>
+        <p:txBody>
+          <a:bodyPr>
+            <a:normAutofit fontScale="90000"/>
+          </a:bodyPr>
+          <a:lstStyle/>
+          <a:p>
+            <a:r>
+              <a:rPr lang="en-US" dirty="0" err="1" smtClean="0"/>
+              <a:t>Laplacian</a:t>
+            </a:r>
+            <a:r>
+              <a:rPr lang="en-US" dirty="0" smtClean="0"/>
+              <a:t>-based method</a:t>
+            </a:r>
+            <a:br>
+              <a:rPr lang="en-US" dirty="0" smtClean="0"/>
+            </a:br>
+            <a:r>
+              <a:rPr lang="en-US" sz="3600" dirty="0" smtClean="0">
+                <a:solidFill>
+                  <a:schemeClr val="bg1">
+                    <a:lumMod val="50000"/>
+                  </a:schemeClr>
+                </a:solidFill>
+              </a:rPr>
+              <a:t>Steps</a:t>
+            </a:r>
+            <a:endParaRPr lang="en-US" dirty="0"/>
+          </a:p>
+        </p:txBody>
+      </p:sp>
+      <p:pic>
+        <p:nvPicPr>
+          <p:cNvPr id="4" name="Picture 3" descr="LaplacianMethod.png"/>
+          <p:cNvPicPr>
+            <a:picLocks noChangeAspect="1"/>
+          </p:cNvPicPr>
+          <p:nvPr/>
+        </p:nvPicPr>
+        <p:blipFill>
+          <a:blip r:embed="rId2" cstate="print"/>
+          <a:stretch>
+            <a:fillRect/>
+          </a:stretch>
+        </p:blipFill>
+        <p:spPr>
+          <a:xfrm>
+            <a:off x="0" y="1524000"/>
+            <a:ext cx="9144000" cy="2311660"/>
+          </a:xfrm>
+          <a:prstGeom prst="rect">
+            <a:avLst/>
+          </a:prstGeom>
+        </p:spPr>
+      </p:pic>
+      <p:sp>
+        <p:nvSpPr>
+          <p:cNvPr id="5" name="Oval 4"/>
+          <p:cNvSpPr/>
+          <p:nvPr/>
+        </p:nvSpPr>
+        <p:spPr>
+          <a:xfrm>
+            <a:off x="4800600" y="2895600"/>
+            <a:ext cx="990600" cy="914400"/>
+          </a:xfrm>
+          <a:prstGeom prst="ellipse">
+            <a:avLst/>
+          </a:prstGeom>
+          <a:noFill/>
+          <a:ln w="57150">
+            <a:solidFill>
+              <a:srgbClr val="FF0000"/>
+            </a:solidFill>
+          </a:ln>
+          <a:effectLst>
+            <a:outerShdw blurRad="44450" dist="27940" dir="5400000" algn="ctr">
+              <a:srgbClr val="000000">
+                <a:alpha val="32000"/>
+              </a:srgbClr>
+            </a:outerShdw>
+          </a:effectLst>
+          <a:scene3d>
+            <a:camera prst="orthographicFront">
+              <a:rot lat="0" lon="0" rev="0"/>
+            </a:camera>
+            <a:lightRig rig="balanced" dir="t">
+              <a:rot lat="0" lon="0" rev="8700000"/>
+            </a:lightRig>
+          </a:scene3d>
+          <a:sp3d>
+            <a:bevelT w="190500" h="38100"/>
+          </a:sp3d>
+        </p:spPr>
+        <p:style>
+          <a:lnRef idx="2">
+            <a:schemeClr val="accent1">
+              <a:shade val="50000"/>
+            </a:schemeClr>
+          </a:lnRef>
+          <a:fillRef idx="1">
+            <a:schemeClr val="accent1"/>
+          </a:fillRef>
+          <a:effectRef idx="0">
+            <a:schemeClr val="accent1"/>
+          </a:effectRef>
+          <a:fontRef idx="minor">
+            <a:schemeClr val="lt1"/>
+          </a:fontRef>
+        </p:style>
+        <p:txBody>
+          <a:bodyPr rtlCol="0" anchor="ctr"/>
+          <a:lstStyle/>
+          <a:p>
+            <a:pPr algn="ctr"/>
+            <a:endParaRPr lang="en-US"/>
+          </a:p>
+        </p:txBody>
+      </p:sp>
+      <p:pic>
+        <p:nvPicPr>
+          <p:cNvPr id="6" name="Picture 2"/>
+          <p:cNvPicPr>
+            <a:picLocks noChangeAspect="1" noChangeArrowheads="1"/>
+          </p:cNvPicPr>
+          <p:nvPr/>
+        </p:nvPicPr>
+        <p:blipFill>
+          <a:blip r:embed="rId3" cstate="print"/>
+          <a:srcRect/>
+          <a:stretch>
+            <a:fillRect/>
+          </a:stretch>
+        </p:blipFill>
+        <p:spPr bwMode="auto">
+          <a:xfrm>
+            <a:off x="1981200" y="4572000"/>
+            <a:ext cx="5248275" cy="1143000"/>
+          </a:xfrm>
+          <a:prstGeom prst="rect">
+            <a:avLst/>
+          </a:prstGeom>
+          <a:noFill/>
+          <a:ln w="9525">
+            <a:noFill/>
+            <a:miter lim="800000"/>
+            <a:headEnd/>
+            <a:tailEnd/>
+          </a:ln>
+        </p:spPr>
+      </p:pic>
+      <p:pic>
+        <p:nvPicPr>
+          <p:cNvPr id="8" name="Picture 4"/>
+          <p:cNvPicPr>
+            <a:picLocks noChangeAspect="1" noChangeArrowheads="1"/>
+          </p:cNvPicPr>
+          <p:nvPr/>
+        </p:nvPicPr>
+        <p:blipFill>
+          <a:blip r:embed="rId4" cstate="print"/>
+          <a:srcRect/>
+          <a:stretch>
+            <a:fillRect/>
+          </a:stretch>
+        </p:blipFill>
+        <p:spPr bwMode="auto">
+          <a:xfrm>
+            <a:off x="2362200" y="4000500"/>
+            <a:ext cx="4286250" cy="419100"/>
+          </a:xfrm>
+          <a:prstGeom prst="rect">
+            <a:avLst/>
+          </a:prstGeom>
+          <a:noFill/>
+          <a:ln w="9525">
+            <a:noFill/>
+            <a:miter lim="800000"/>
+            <a:headEnd/>
+            <a:tailEnd/>
+          </a:ln>
+        </p:spPr>
+      </p:pic>
+      <p:pic>
+        <p:nvPicPr>
+          <p:cNvPr id="6146" name="Picture 2"/>
+          <p:cNvPicPr>
+            <a:picLocks noChangeAspect="1" noChangeArrowheads="1"/>
+          </p:cNvPicPr>
+          <p:nvPr/>
+        </p:nvPicPr>
+        <p:blipFill>
+          <a:blip r:embed="rId5" cstate="print"/>
+          <a:srcRect/>
+          <a:stretch>
+            <a:fillRect/>
+          </a:stretch>
+        </p:blipFill>
+        <p:spPr bwMode="auto">
+          <a:xfrm>
+            <a:off x="2343150" y="5867400"/>
+            <a:ext cx="5276850" cy="676275"/>
+          </a:xfrm>
+          <a:prstGeom prst="rect">
+            <a:avLst/>
+          </a:prstGeom>
+          <a:noFill/>
+          <a:ln w="9525">
+            <a:noFill/>
+            <a:miter lim="800000"/>
+            <a:headEnd/>
+            <a:tailEnd/>
+          </a:ln>
+        </p:spPr>
+      </p:pic>
+    </p:spTree>
+  </p:cSld>
+  <p:clrMapOvr>
+    <a:masterClrMapping/>
+  </p:clrMapOvr>
+  <p:timing>
+    <p:tnLst>
+      <p:par>
+        <p:cTn id="1" dur="indefinite" restart="never" nodeType="tmRoot"/>
+      </p:par>
+    </p:tnLst>
+  </p:timing>
+</p:sld>
+</file>
+
+<file path=ppt/slides/slide19.xml><?xml version="1.0" encoding="utf-8"?>
+<p:sld xmlns:a="http://schemas.openxmlformats.org/drawingml/2006/main" xmlns:r="http://schemas.openxmlformats.org/officeDocument/2006/relationships" xmlns:p="http://schemas.openxmlformats.org/presentationml/2006/main">
+  <p:cSld>
+    <p:spTree>
+      <p:nvGrpSpPr>
+        <p:cNvPr id="1" name=""/>
+        <p:cNvGrpSpPr/>
+        <p:nvPr/>
+      </p:nvGrpSpPr>
+      <p:grpSpPr>
+        <a:xfrm>
+          <a:off x="0" y="0"/>
+          <a:ext cx="0" cy="0"/>
+          <a:chOff x="0" y="0"/>
+          <a:chExt cx="0" cy="0"/>
+        </a:xfrm>
+      </p:grpSpPr>
+      <p:sp>
+        <p:nvSpPr>
+          <p:cNvPr id="2" name="Title 1"/>
+          <p:cNvSpPr>
+            <a:spLocks noGrp="1"/>
+          </p:cNvSpPr>
+          <p:nvPr>
+            <p:ph type="title"/>
+          </p:nvPr>
+        </p:nvSpPr>
+        <p:spPr/>
+        <p:txBody>
+          <a:bodyPr>
+            <a:normAutofit fontScale="90000"/>
+          </a:bodyPr>
+          <a:lstStyle/>
+          <a:p>
+            <a:r>
+              <a:rPr lang="en-US" dirty="0" err="1" smtClean="0"/>
+              <a:t>Laplacian</a:t>
+            </a:r>
+            <a:r>
+              <a:rPr lang="en-US" dirty="0" smtClean="0"/>
+              <a:t>-based method</a:t>
+            </a:r>
+            <a:r>
+              <a:rPr lang="en-US" dirty="0" smtClean="0"/>
+              <a:t/>
+            </a:r>
+            <a:br>
+              <a:rPr lang="en-US" dirty="0" smtClean="0"/>
+            </a:br>
+            <a:r>
+              <a:rPr lang="en-US" sz="3600" dirty="0" smtClean="0">
+                <a:solidFill>
+                  <a:schemeClr val="bg1">
+                    <a:lumMod val="50000"/>
+                  </a:schemeClr>
+                </a:solidFill>
+              </a:rPr>
+              <a:t>Example 1</a:t>
+            </a:r>
+            <a:endParaRPr lang="en-US" dirty="0"/>
+          </a:p>
+        </p:txBody>
+      </p:sp>
+      <p:pic>
+        <p:nvPicPr>
+          <p:cNvPr id="6" name="Picture 5" descr="lena.png"/>
+          <p:cNvPicPr>
+            <a:picLocks noChangeAspect="1"/>
+          </p:cNvPicPr>
+          <p:nvPr/>
+        </p:nvPicPr>
+        <p:blipFill>
+          <a:blip r:embed="rId2" cstate="print"/>
+          <a:stretch>
+            <a:fillRect/>
+          </a:stretch>
+        </p:blipFill>
+        <p:spPr>
+          <a:xfrm>
+            <a:off x="2133600" y="1447800"/>
+            <a:ext cx="4876800" cy="4876800"/>
+          </a:xfrm>
+          <a:prstGeom prst="rect">
+            <a:avLst/>
+          </a:prstGeom>
+        </p:spPr>
+      </p:pic>
+    </p:spTree>
+  </p:cSld>
+  <p:clrMapOvr>
+    <a:masterClrMapping/>
+  </p:clrMapOvr>
+  <p:timing>
+    <p:tnLst>
+      <p:par>
+        <p:cTn id="1" dur="indefinite" restart="never" nodeType="tmRoot"/>
+      </p:par>
+    </p:tnLst>
+  </p:timing>
 </p:sld>
 </file>
 
@@ -3233,6 +4602,812 @@
           </a:p>
         </p:txBody>
       </p:sp>
+    </p:spTree>
+  </p:cSld>
+  <p:clrMapOvr>
+    <a:masterClrMapping/>
+  </p:clrMapOvr>
+  <p:timing>
+    <p:tnLst>
+      <p:par>
+        <p:cTn id="1" dur="indefinite" restart="never" nodeType="tmRoot"/>
+      </p:par>
+    </p:tnLst>
+  </p:timing>
+</p:sld>
+</file>
+
+<file path=ppt/slides/slide20.xml><?xml version="1.0" encoding="utf-8"?>
+<p:sld xmlns:a="http://schemas.openxmlformats.org/drawingml/2006/main" xmlns:r="http://schemas.openxmlformats.org/officeDocument/2006/relationships" xmlns:p="http://schemas.openxmlformats.org/presentationml/2006/main">
+  <p:cSld>
+    <p:spTree>
+      <p:nvGrpSpPr>
+        <p:cNvPr id="1" name=""/>
+        <p:cNvGrpSpPr/>
+        <p:nvPr/>
+      </p:nvGrpSpPr>
+      <p:grpSpPr>
+        <a:xfrm>
+          <a:off x="0" y="0"/>
+          <a:ext cx="0" cy="0"/>
+          <a:chOff x="0" y="0"/>
+          <a:chExt cx="0" cy="0"/>
+        </a:xfrm>
+      </p:grpSpPr>
+      <p:sp>
+        <p:nvSpPr>
+          <p:cNvPr id="2" name="Title 1"/>
+          <p:cNvSpPr>
+            <a:spLocks noGrp="1"/>
+          </p:cNvSpPr>
+          <p:nvPr>
+            <p:ph type="title"/>
+          </p:nvPr>
+        </p:nvSpPr>
+        <p:spPr/>
+        <p:txBody>
+          <a:bodyPr>
+            <a:normAutofit fontScale="90000"/>
+          </a:bodyPr>
+          <a:lstStyle/>
+          <a:p>
+            <a:r>
+              <a:rPr lang="en-US" dirty="0" err="1" smtClean="0"/>
+              <a:t>Laplacian</a:t>
+            </a:r>
+            <a:r>
+              <a:rPr lang="en-US" dirty="0" smtClean="0"/>
+              <a:t>-based method</a:t>
+            </a:r>
+            <a:r>
+              <a:rPr lang="en-US" dirty="0" smtClean="0"/>
+              <a:t/>
+            </a:r>
+            <a:br>
+              <a:rPr lang="en-US" dirty="0" smtClean="0"/>
+            </a:br>
+            <a:r>
+              <a:rPr lang="en-US" sz="3600" dirty="0" smtClean="0">
+                <a:solidFill>
+                  <a:schemeClr val="bg1">
+                    <a:lumMod val="50000"/>
+                  </a:schemeClr>
+                </a:solidFill>
+              </a:rPr>
+              <a:t>Example 1</a:t>
+            </a:r>
+            <a:endParaRPr lang="en-US" dirty="0"/>
+          </a:p>
+        </p:txBody>
+      </p:sp>
+      <p:pic>
+        <p:nvPicPr>
+          <p:cNvPr id="4" name="Picture 3" descr="lena_laplacian_edges.png"/>
+          <p:cNvPicPr>
+            <a:picLocks noChangeAspect="1"/>
+          </p:cNvPicPr>
+          <p:nvPr/>
+        </p:nvPicPr>
+        <p:blipFill>
+          <a:blip r:embed="rId2" cstate="print"/>
+          <a:stretch>
+            <a:fillRect/>
+          </a:stretch>
+        </p:blipFill>
+        <p:spPr>
+          <a:xfrm>
+            <a:off x="2133600" y="1447800"/>
+            <a:ext cx="4876800" cy="4876800"/>
+          </a:xfrm>
+          <a:prstGeom prst="rect">
+            <a:avLst/>
+          </a:prstGeom>
+        </p:spPr>
+      </p:pic>
+    </p:spTree>
+  </p:cSld>
+  <p:clrMapOvr>
+    <a:masterClrMapping/>
+  </p:clrMapOvr>
+  <p:timing>
+    <p:tnLst>
+      <p:par>
+        <p:cTn id="1" dur="indefinite" restart="never" nodeType="tmRoot"/>
+      </p:par>
+    </p:tnLst>
+  </p:timing>
+</p:sld>
+</file>
+
+<file path=ppt/slides/slide21.xml><?xml version="1.0" encoding="utf-8"?>
+<p:sld xmlns:a="http://schemas.openxmlformats.org/drawingml/2006/main" xmlns:r="http://schemas.openxmlformats.org/officeDocument/2006/relationships" xmlns:p="http://schemas.openxmlformats.org/presentationml/2006/main">
+  <p:cSld>
+    <p:spTree>
+      <p:nvGrpSpPr>
+        <p:cNvPr id="1" name=""/>
+        <p:cNvGrpSpPr/>
+        <p:nvPr/>
+      </p:nvGrpSpPr>
+      <p:grpSpPr>
+        <a:xfrm>
+          <a:off x="0" y="0"/>
+          <a:ext cx="0" cy="0"/>
+          <a:chOff x="0" y="0"/>
+          <a:chExt cx="0" cy="0"/>
+        </a:xfrm>
+      </p:grpSpPr>
+      <p:sp>
+        <p:nvSpPr>
+          <p:cNvPr id="2" name="Title 1"/>
+          <p:cNvSpPr>
+            <a:spLocks noGrp="1"/>
+          </p:cNvSpPr>
+          <p:nvPr>
+            <p:ph type="title"/>
+          </p:nvPr>
+        </p:nvSpPr>
+        <p:spPr/>
+        <p:txBody>
+          <a:bodyPr>
+            <a:normAutofit fontScale="90000"/>
+          </a:bodyPr>
+          <a:lstStyle/>
+          <a:p>
+            <a:r>
+              <a:rPr lang="en-US" dirty="0" err="1" smtClean="0"/>
+              <a:t>Laplacian</a:t>
+            </a:r>
+            <a:r>
+              <a:rPr lang="en-US" dirty="0" smtClean="0"/>
+              <a:t>-based method</a:t>
+            </a:r>
+            <a:r>
+              <a:rPr lang="en-US" dirty="0" smtClean="0"/>
+              <a:t/>
+            </a:r>
+            <a:br>
+              <a:rPr lang="en-US" dirty="0" smtClean="0"/>
+            </a:br>
+            <a:r>
+              <a:rPr lang="en-US" sz="3600" dirty="0" smtClean="0">
+                <a:solidFill>
+                  <a:schemeClr val="bg1">
+                    <a:lumMod val="50000"/>
+                  </a:schemeClr>
+                </a:solidFill>
+              </a:rPr>
+              <a:t>Example 2</a:t>
+            </a:r>
+            <a:endParaRPr lang="en-US" dirty="0"/>
+          </a:p>
+        </p:txBody>
+      </p:sp>
+      <p:pic>
+        <p:nvPicPr>
+          <p:cNvPr id="5" name="Picture 4" descr="stata_center.jpg"/>
+          <p:cNvPicPr>
+            <a:picLocks noChangeAspect="1"/>
+          </p:cNvPicPr>
+          <p:nvPr/>
+        </p:nvPicPr>
+        <p:blipFill>
+          <a:blip r:embed="rId2" cstate="print"/>
+          <a:stretch>
+            <a:fillRect/>
+          </a:stretch>
+        </p:blipFill>
+        <p:spPr>
+          <a:xfrm>
+            <a:off x="2667000" y="1524000"/>
+            <a:ext cx="3771900" cy="5029200"/>
+          </a:xfrm>
+          <a:prstGeom prst="rect">
+            <a:avLst/>
+          </a:prstGeom>
+        </p:spPr>
+      </p:pic>
+    </p:spTree>
+  </p:cSld>
+  <p:clrMapOvr>
+    <a:masterClrMapping/>
+  </p:clrMapOvr>
+  <p:timing>
+    <p:tnLst>
+      <p:par>
+        <p:cTn id="1" dur="indefinite" restart="never" nodeType="tmRoot"/>
+      </p:par>
+    </p:tnLst>
+  </p:timing>
+</p:sld>
+</file>
+
+<file path=ppt/slides/slide22.xml><?xml version="1.0" encoding="utf-8"?>
+<p:sld xmlns:a="http://schemas.openxmlformats.org/drawingml/2006/main" xmlns:r="http://schemas.openxmlformats.org/officeDocument/2006/relationships" xmlns:p="http://schemas.openxmlformats.org/presentationml/2006/main">
+  <p:cSld>
+    <p:spTree>
+      <p:nvGrpSpPr>
+        <p:cNvPr id="1" name=""/>
+        <p:cNvGrpSpPr/>
+        <p:nvPr/>
+      </p:nvGrpSpPr>
+      <p:grpSpPr>
+        <a:xfrm>
+          <a:off x="0" y="0"/>
+          <a:ext cx="0" cy="0"/>
+          <a:chOff x="0" y="0"/>
+          <a:chExt cx="0" cy="0"/>
+        </a:xfrm>
+      </p:grpSpPr>
+      <p:sp>
+        <p:nvSpPr>
+          <p:cNvPr id="2" name="Title 1"/>
+          <p:cNvSpPr>
+            <a:spLocks noGrp="1"/>
+          </p:cNvSpPr>
+          <p:nvPr>
+            <p:ph type="title"/>
+          </p:nvPr>
+        </p:nvSpPr>
+        <p:spPr/>
+        <p:txBody>
+          <a:bodyPr>
+            <a:normAutofit fontScale="90000"/>
+          </a:bodyPr>
+          <a:lstStyle/>
+          <a:p>
+            <a:r>
+              <a:rPr lang="en-US" dirty="0" err="1" smtClean="0"/>
+              <a:t>Laplacian</a:t>
+            </a:r>
+            <a:r>
+              <a:rPr lang="en-US" dirty="0" smtClean="0"/>
+              <a:t>-based method</a:t>
+            </a:r>
+            <a:r>
+              <a:rPr lang="en-US" dirty="0" smtClean="0"/>
+              <a:t/>
+            </a:r>
+            <a:br>
+              <a:rPr lang="en-US" dirty="0" smtClean="0"/>
+            </a:br>
+            <a:r>
+              <a:rPr lang="en-US" sz="3600" dirty="0" smtClean="0">
+                <a:solidFill>
+                  <a:schemeClr val="bg1">
+                    <a:lumMod val="50000"/>
+                  </a:schemeClr>
+                </a:solidFill>
+              </a:rPr>
+              <a:t>Example 2</a:t>
+            </a:r>
+            <a:endParaRPr lang="en-US" dirty="0"/>
+          </a:p>
+        </p:txBody>
+      </p:sp>
+      <p:pic>
+        <p:nvPicPr>
+          <p:cNvPr id="4" name="Picture 3" descr="stata_center_laplacian_edges.jpg"/>
+          <p:cNvPicPr>
+            <a:picLocks noChangeAspect="1"/>
+          </p:cNvPicPr>
+          <p:nvPr/>
+        </p:nvPicPr>
+        <p:blipFill>
+          <a:blip r:embed="rId2" cstate="print"/>
+          <a:stretch>
+            <a:fillRect/>
+          </a:stretch>
+        </p:blipFill>
+        <p:spPr>
+          <a:xfrm>
+            <a:off x="2667000" y="1524000"/>
+            <a:ext cx="3771900" cy="5029200"/>
+          </a:xfrm>
+          <a:prstGeom prst="rect">
+            <a:avLst/>
+          </a:prstGeom>
+        </p:spPr>
+      </p:pic>
+    </p:spTree>
+  </p:cSld>
+  <p:clrMapOvr>
+    <a:masterClrMapping/>
+  </p:clrMapOvr>
+  <p:timing>
+    <p:tnLst>
+      <p:par>
+        <p:cTn id="1" dur="indefinite" restart="never" nodeType="tmRoot"/>
+      </p:par>
+    </p:tnLst>
+  </p:timing>
+</p:sld>
+</file>
+
+<file path=ppt/slides/slide23.xml><?xml version="1.0" encoding="utf-8"?>
+<p:sld xmlns:a="http://schemas.openxmlformats.org/drawingml/2006/main" xmlns:r="http://schemas.openxmlformats.org/officeDocument/2006/relationships" xmlns:p="http://schemas.openxmlformats.org/presentationml/2006/main">
+  <p:cSld>
+    <p:spTree>
+      <p:nvGrpSpPr>
+        <p:cNvPr id="1" name=""/>
+        <p:cNvGrpSpPr/>
+        <p:nvPr/>
+      </p:nvGrpSpPr>
+      <p:grpSpPr>
+        <a:xfrm>
+          <a:off x="0" y="0"/>
+          <a:ext cx="0" cy="0"/>
+          <a:chOff x="0" y="0"/>
+          <a:chExt cx="0" cy="0"/>
+        </a:xfrm>
+      </p:grpSpPr>
+      <p:sp>
+        <p:nvSpPr>
+          <p:cNvPr id="2" name="Title 1"/>
+          <p:cNvSpPr>
+            <a:spLocks noGrp="1"/>
+          </p:cNvSpPr>
+          <p:nvPr>
+            <p:ph type="title"/>
+          </p:nvPr>
+        </p:nvSpPr>
+        <p:spPr/>
+        <p:txBody>
+          <a:bodyPr>
+            <a:normAutofit fontScale="90000"/>
+          </a:bodyPr>
+          <a:lstStyle/>
+          <a:p>
+            <a:r>
+              <a:rPr lang="en-US" dirty="0" err="1" smtClean="0"/>
+              <a:t>Laplacian</a:t>
+            </a:r>
+            <a:r>
+              <a:rPr lang="en-US" dirty="0" smtClean="0"/>
+              <a:t>-based method</a:t>
+            </a:r>
+            <a:r>
+              <a:rPr lang="en-US" dirty="0" smtClean="0"/>
+              <a:t/>
+            </a:r>
+            <a:br>
+              <a:rPr lang="en-US" dirty="0" smtClean="0"/>
+            </a:br>
+            <a:r>
+              <a:rPr lang="en-US" sz="3600" dirty="0" smtClean="0">
+                <a:solidFill>
+                  <a:schemeClr val="bg1">
+                    <a:lumMod val="50000"/>
+                  </a:schemeClr>
+                </a:solidFill>
+              </a:rPr>
+              <a:t>Example 3</a:t>
+            </a:r>
+            <a:endParaRPr lang="en-US" dirty="0"/>
+          </a:p>
+        </p:txBody>
+      </p:sp>
+      <p:pic>
+        <p:nvPicPr>
+          <p:cNvPr id="4" name="Picture 3" descr="mandrill.jpg"/>
+          <p:cNvPicPr>
+            <a:picLocks noChangeAspect="1"/>
+          </p:cNvPicPr>
+          <p:nvPr/>
+        </p:nvPicPr>
+        <p:blipFill>
+          <a:blip r:embed="rId2" cstate="print"/>
+          <a:stretch>
+            <a:fillRect/>
+          </a:stretch>
+        </p:blipFill>
+        <p:spPr>
+          <a:xfrm>
+            <a:off x="2133600" y="1600200"/>
+            <a:ext cx="4762500" cy="4572000"/>
+          </a:xfrm>
+          <a:prstGeom prst="rect">
+            <a:avLst/>
+          </a:prstGeom>
+        </p:spPr>
+      </p:pic>
+    </p:spTree>
+  </p:cSld>
+  <p:clrMapOvr>
+    <a:masterClrMapping/>
+  </p:clrMapOvr>
+  <p:timing>
+    <p:tnLst>
+      <p:par>
+        <p:cTn id="1" dur="indefinite" restart="never" nodeType="tmRoot"/>
+      </p:par>
+    </p:tnLst>
+  </p:timing>
+</p:sld>
+</file>
+
+<file path=ppt/slides/slide24.xml><?xml version="1.0" encoding="utf-8"?>
+<p:sld xmlns:a="http://schemas.openxmlformats.org/drawingml/2006/main" xmlns:r="http://schemas.openxmlformats.org/officeDocument/2006/relationships" xmlns:p="http://schemas.openxmlformats.org/presentationml/2006/main">
+  <p:cSld>
+    <p:spTree>
+      <p:nvGrpSpPr>
+        <p:cNvPr id="1" name=""/>
+        <p:cNvGrpSpPr/>
+        <p:nvPr/>
+      </p:nvGrpSpPr>
+      <p:grpSpPr>
+        <a:xfrm>
+          <a:off x="0" y="0"/>
+          <a:ext cx="0" cy="0"/>
+          <a:chOff x="0" y="0"/>
+          <a:chExt cx="0" cy="0"/>
+        </a:xfrm>
+      </p:grpSpPr>
+      <p:sp>
+        <p:nvSpPr>
+          <p:cNvPr id="2" name="Title 1"/>
+          <p:cNvSpPr>
+            <a:spLocks noGrp="1"/>
+          </p:cNvSpPr>
+          <p:nvPr>
+            <p:ph type="title"/>
+          </p:nvPr>
+        </p:nvSpPr>
+        <p:spPr/>
+        <p:txBody>
+          <a:bodyPr>
+            <a:normAutofit fontScale="90000"/>
+          </a:bodyPr>
+          <a:lstStyle/>
+          <a:p>
+            <a:r>
+              <a:rPr lang="en-US" dirty="0" err="1" smtClean="0"/>
+              <a:t>Laplacian</a:t>
+            </a:r>
+            <a:r>
+              <a:rPr lang="en-US" dirty="0" smtClean="0"/>
+              <a:t>-based method</a:t>
+            </a:r>
+            <a:r>
+              <a:rPr lang="en-US" dirty="0" smtClean="0"/>
+              <a:t/>
+            </a:r>
+            <a:br>
+              <a:rPr lang="en-US" dirty="0" smtClean="0"/>
+            </a:br>
+            <a:r>
+              <a:rPr lang="en-US" sz="3600" dirty="0" smtClean="0">
+                <a:solidFill>
+                  <a:schemeClr val="bg1">
+                    <a:lumMod val="50000"/>
+                  </a:schemeClr>
+                </a:solidFill>
+              </a:rPr>
+              <a:t>Example 3</a:t>
+            </a:r>
+            <a:endParaRPr lang="en-US" dirty="0"/>
+          </a:p>
+        </p:txBody>
+      </p:sp>
+      <p:pic>
+        <p:nvPicPr>
+          <p:cNvPr id="5" name="Picture 4" descr="mandrill_laplacian_edges.jpg"/>
+          <p:cNvPicPr>
+            <a:picLocks noChangeAspect="1"/>
+          </p:cNvPicPr>
+          <p:nvPr/>
+        </p:nvPicPr>
+        <p:blipFill>
+          <a:blip r:embed="rId2" cstate="print"/>
+          <a:stretch>
+            <a:fillRect/>
+          </a:stretch>
+        </p:blipFill>
+        <p:spPr>
+          <a:xfrm>
+            <a:off x="2190750" y="1752600"/>
+            <a:ext cx="4762500" cy="4572000"/>
+          </a:xfrm>
+          <a:prstGeom prst="rect">
+            <a:avLst/>
+          </a:prstGeom>
+        </p:spPr>
+      </p:pic>
+    </p:spTree>
+  </p:cSld>
+  <p:clrMapOvr>
+    <a:masterClrMapping/>
+  </p:clrMapOvr>
+  <p:timing>
+    <p:tnLst>
+      <p:par>
+        <p:cTn id="1" dur="indefinite" restart="never" nodeType="tmRoot"/>
+      </p:par>
+    </p:tnLst>
+  </p:timing>
+</p:sld>
+</file>
+
+<file path=ppt/slides/slide25.xml><?xml version="1.0" encoding="utf-8"?>
+<p:sld xmlns:a="http://schemas.openxmlformats.org/drawingml/2006/main" xmlns:r="http://schemas.openxmlformats.org/officeDocument/2006/relationships" xmlns:p="http://schemas.openxmlformats.org/presentationml/2006/main">
+  <p:cSld>
+    <p:spTree>
+      <p:nvGrpSpPr>
+        <p:cNvPr id="1" name=""/>
+        <p:cNvGrpSpPr/>
+        <p:nvPr/>
+      </p:nvGrpSpPr>
+      <p:grpSpPr>
+        <a:xfrm>
+          <a:off x="0" y="0"/>
+          <a:ext cx="0" cy="0"/>
+          <a:chOff x="0" y="0"/>
+          <a:chExt cx="0" cy="0"/>
+        </a:xfrm>
+      </p:grpSpPr>
+      <p:sp>
+        <p:nvSpPr>
+          <p:cNvPr id="2" name="Title 1"/>
+          <p:cNvSpPr>
+            <a:spLocks noGrp="1"/>
+          </p:cNvSpPr>
+          <p:nvPr>
+            <p:ph type="title"/>
+          </p:nvPr>
+        </p:nvSpPr>
+        <p:spPr/>
+        <p:txBody>
+          <a:bodyPr>
+            <a:normAutofit fontScale="90000"/>
+          </a:bodyPr>
+          <a:lstStyle/>
+          <a:p>
+            <a:r>
+              <a:rPr lang="en-US" dirty="0" smtClean="0"/>
+              <a:t>Comparison</a:t>
+            </a:r>
+            <a:br>
+              <a:rPr lang="en-US" dirty="0" smtClean="0"/>
+            </a:br>
+            <a:r>
+              <a:rPr lang="en-US" sz="3100" dirty="0" smtClean="0">
+                <a:solidFill>
+                  <a:schemeClr val="bg1">
+                    <a:lumMod val="50000"/>
+                  </a:schemeClr>
+                </a:solidFill>
+              </a:rPr>
+              <a:t>Original</a:t>
+            </a:r>
+            <a:endParaRPr lang="en-US" sz="3100" dirty="0">
+              <a:solidFill>
+                <a:schemeClr val="bg1">
+                  <a:lumMod val="50000"/>
+                </a:schemeClr>
+              </a:solidFill>
+            </a:endParaRPr>
+          </a:p>
+        </p:txBody>
+      </p:sp>
+      <p:pic>
+        <p:nvPicPr>
+          <p:cNvPr id="4" name="Picture 3" descr="green_building.jpg"/>
+          <p:cNvPicPr>
+            <a:picLocks noChangeAspect="1"/>
+          </p:cNvPicPr>
+          <p:nvPr/>
+        </p:nvPicPr>
+        <p:blipFill>
+          <a:blip r:embed="rId2" cstate="print"/>
+          <a:stretch>
+            <a:fillRect/>
+          </a:stretch>
+        </p:blipFill>
+        <p:spPr>
+          <a:xfrm>
+            <a:off x="2895600" y="1524000"/>
+            <a:ext cx="3352800" cy="5029200"/>
+          </a:xfrm>
+          <a:prstGeom prst="rect">
+            <a:avLst/>
+          </a:prstGeom>
+        </p:spPr>
+      </p:pic>
+    </p:spTree>
+  </p:cSld>
+  <p:clrMapOvr>
+    <a:masterClrMapping/>
+  </p:clrMapOvr>
+</p:sld>
+</file>
+
+<file path=ppt/slides/slide26.xml><?xml version="1.0" encoding="utf-8"?>
+<p:sld xmlns:a="http://schemas.openxmlformats.org/drawingml/2006/main" xmlns:r="http://schemas.openxmlformats.org/officeDocument/2006/relationships" xmlns:p="http://schemas.openxmlformats.org/presentationml/2006/main">
+  <p:cSld>
+    <p:spTree>
+      <p:nvGrpSpPr>
+        <p:cNvPr id="1" name=""/>
+        <p:cNvGrpSpPr/>
+        <p:nvPr/>
+      </p:nvGrpSpPr>
+      <p:grpSpPr>
+        <a:xfrm>
+          <a:off x="0" y="0"/>
+          <a:ext cx="0" cy="0"/>
+          <a:chOff x="0" y="0"/>
+          <a:chExt cx="0" cy="0"/>
+        </a:xfrm>
+      </p:grpSpPr>
+      <p:sp>
+        <p:nvSpPr>
+          <p:cNvPr id="2" name="Title 1"/>
+          <p:cNvSpPr>
+            <a:spLocks noGrp="1"/>
+          </p:cNvSpPr>
+          <p:nvPr>
+            <p:ph type="title"/>
+          </p:nvPr>
+        </p:nvSpPr>
+        <p:spPr/>
+        <p:txBody>
+          <a:bodyPr>
+            <a:normAutofit fontScale="90000"/>
+          </a:bodyPr>
+          <a:lstStyle/>
+          <a:p>
+            <a:r>
+              <a:rPr lang="en-US" dirty="0" smtClean="0"/>
+              <a:t>Comparison</a:t>
+            </a:r>
+            <a:br>
+              <a:rPr lang="en-US" dirty="0" smtClean="0"/>
+            </a:br>
+            <a:r>
+              <a:rPr lang="en-US" sz="3100" dirty="0" smtClean="0">
+                <a:solidFill>
+                  <a:schemeClr val="bg1">
+                    <a:lumMod val="50000"/>
+                  </a:schemeClr>
+                </a:solidFill>
+              </a:rPr>
+              <a:t>Gradient-based</a:t>
+            </a:r>
+            <a:endParaRPr lang="en-US" sz="3100" dirty="0">
+              <a:solidFill>
+                <a:schemeClr val="bg1">
+                  <a:lumMod val="50000"/>
+                </a:schemeClr>
+              </a:solidFill>
+            </a:endParaRPr>
+          </a:p>
+        </p:txBody>
+      </p:sp>
+      <p:pic>
+        <p:nvPicPr>
+          <p:cNvPr id="3" name="Picture 2" descr="green_building_gradient_edges.jpg"/>
+          <p:cNvPicPr>
+            <a:picLocks noChangeAspect="1"/>
+          </p:cNvPicPr>
+          <p:nvPr/>
+        </p:nvPicPr>
+        <p:blipFill>
+          <a:blip r:embed="rId2" cstate="print"/>
+          <a:stretch>
+            <a:fillRect/>
+          </a:stretch>
+        </p:blipFill>
+        <p:spPr>
+          <a:xfrm>
+            <a:off x="2895600" y="1524000"/>
+            <a:ext cx="3352800" cy="5029200"/>
+          </a:xfrm>
+          <a:prstGeom prst="rect">
+            <a:avLst/>
+          </a:prstGeom>
+        </p:spPr>
+      </p:pic>
+    </p:spTree>
+  </p:cSld>
+  <p:clrMapOvr>
+    <a:masterClrMapping/>
+  </p:clrMapOvr>
+</p:sld>
+</file>
+
+<file path=ppt/slides/slide27.xml><?xml version="1.0" encoding="utf-8"?>
+<p:sld xmlns:a="http://schemas.openxmlformats.org/drawingml/2006/main" xmlns:r="http://schemas.openxmlformats.org/officeDocument/2006/relationships" xmlns:p="http://schemas.openxmlformats.org/presentationml/2006/main">
+  <p:cSld>
+    <p:spTree>
+      <p:nvGrpSpPr>
+        <p:cNvPr id="1" name=""/>
+        <p:cNvGrpSpPr/>
+        <p:nvPr/>
+      </p:nvGrpSpPr>
+      <p:grpSpPr>
+        <a:xfrm>
+          <a:off x="0" y="0"/>
+          <a:ext cx="0" cy="0"/>
+          <a:chOff x="0" y="0"/>
+          <a:chExt cx="0" cy="0"/>
+        </a:xfrm>
+      </p:grpSpPr>
+      <p:sp>
+        <p:nvSpPr>
+          <p:cNvPr id="2" name="Title 1"/>
+          <p:cNvSpPr>
+            <a:spLocks noGrp="1"/>
+          </p:cNvSpPr>
+          <p:nvPr>
+            <p:ph type="title"/>
+          </p:nvPr>
+        </p:nvSpPr>
+        <p:spPr/>
+        <p:txBody>
+          <a:bodyPr>
+            <a:normAutofit fontScale="90000"/>
+          </a:bodyPr>
+          <a:lstStyle/>
+          <a:p>
+            <a:r>
+              <a:rPr lang="en-US" dirty="0" smtClean="0"/>
+              <a:t>Comparison</a:t>
+            </a:r>
+            <a:br>
+              <a:rPr lang="en-US" dirty="0" smtClean="0"/>
+            </a:br>
+            <a:r>
+              <a:rPr lang="en-US" sz="3100" dirty="0" err="1" smtClean="0">
+                <a:solidFill>
+                  <a:schemeClr val="bg1">
+                    <a:lumMod val="50000"/>
+                  </a:schemeClr>
+                </a:solidFill>
+              </a:rPr>
+              <a:t>Laplacian</a:t>
+            </a:r>
+            <a:r>
+              <a:rPr lang="en-US" sz="3100" dirty="0" smtClean="0">
+                <a:solidFill>
+                  <a:schemeClr val="bg1">
+                    <a:lumMod val="50000"/>
+                  </a:schemeClr>
+                </a:solidFill>
+              </a:rPr>
+              <a:t>-based</a:t>
+            </a:r>
+            <a:endParaRPr lang="en-US" sz="3100" dirty="0">
+              <a:solidFill>
+                <a:schemeClr val="bg1">
+                  <a:lumMod val="50000"/>
+                </a:schemeClr>
+              </a:solidFill>
+            </a:endParaRPr>
+          </a:p>
+        </p:txBody>
+      </p:sp>
+      <p:pic>
+        <p:nvPicPr>
+          <p:cNvPr id="3" name="Picture 2" descr="green_building_laplacian_edges.jpg"/>
+          <p:cNvPicPr>
+            <a:picLocks noChangeAspect="1"/>
+          </p:cNvPicPr>
+          <p:nvPr/>
+        </p:nvPicPr>
+        <p:blipFill>
+          <a:blip r:embed="rId2" cstate="print"/>
+          <a:stretch>
+            <a:fillRect/>
+          </a:stretch>
+        </p:blipFill>
+        <p:spPr>
+          <a:xfrm>
+            <a:off x="2895600" y="1524000"/>
+            <a:ext cx="3352800" cy="5029200"/>
+          </a:xfrm>
+          <a:prstGeom prst="rect">
+            <a:avLst/>
+          </a:prstGeom>
+        </p:spPr>
+      </p:pic>
     </p:spTree>
   </p:cSld>
   <p:clrMapOvr>
@@ -3443,6 +5618,13 @@
   <p:clrMapOvr>
     <a:masterClrMapping/>
   </p:clrMapOvr>
+  <p:timing>
+    <p:tnLst>
+      <p:par>
+        <p:cTn id="1" dur="indefinite" restart="never" nodeType="tmRoot"/>
+      </p:par>
+    </p:tnLst>
+  </p:timing>
 </p:sld>
 </file>
 
@@ -3530,6 +5712,13 @@
   <p:clrMapOvr>
     <a:masterClrMapping/>
   </p:clrMapOvr>
+  <p:timing>
+    <p:tnLst>
+      <p:par>
+        <p:cTn id="1" dur="indefinite" restart="never" nodeType="tmRoot"/>
+      </p:par>
+    </p:tnLst>
+  </p:timing>
 </p:sld>
 </file>
 
@@ -3571,10 +5760,6 @@
               <a:rPr lang="en-US" dirty="0" smtClean="0"/>
               <a:t>Gradient-based method</a:t>
             </a:r>
-            <a:r>
-              <a:rPr lang="en-US" dirty="0" smtClean="0"/>
-              <a:t/>
-            </a:r>
             <a:br>
               <a:rPr lang="en-US" dirty="0" smtClean="0"/>
             </a:br>
@@ -3586,27 +5771,128 @@
                   </a:schemeClr>
                 </a:solidFill>
               </a:rPr>
-              <a:t>Examples</a:t>
+              <a:t>Computing Derivatives</a:t>
             </a:r>
             <a:endParaRPr lang="en-US" dirty="0"/>
           </a:p>
         </p:txBody>
       </p:sp>
-      <p:sp>
-        <p:nvSpPr>
-          <p:cNvPr id="3" name="Content Placeholder 2"/>
-          <p:cNvSpPr>
-            <a:spLocks noGrp="1"/>
-          </p:cNvSpPr>
-          <p:nvPr>
-            <p:ph idx="1"/>
-          </p:nvPr>
-        </p:nvSpPr>
-        <p:spPr/>
-        <p:txBody>
-          <a:bodyPr/>
-          <a:lstStyle/>
-          <a:p>
+      <p:pic>
+        <p:nvPicPr>
+          <p:cNvPr id="4" name="Picture 3" descr="GradientMethod.png"/>
+          <p:cNvPicPr>
+            <a:picLocks noChangeAspect="1"/>
+          </p:cNvPicPr>
+          <p:nvPr/>
+        </p:nvPicPr>
+        <p:blipFill>
+          <a:blip r:embed="rId2" cstate="print"/>
+          <a:stretch>
+            <a:fillRect/>
+          </a:stretch>
+        </p:blipFill>
+        <p:spPr>
+          <a:xfrm>
+            <a:off x="0" y="1447800"/>
+            <a:ext cx="9144000" cy="2215166"/>
+          </a:xfrm>
+          <a:prstGeom prst="rect">
+            <a:avLst/>
+          </a:prstGeom>
+        </p:spPr>
+      </p:pic>
+      <p:pic>
+        <p:nvPicPr>
+          <p:cNvPr id="1026" name="Picture 2"/>
+          <p:cNvPicPr>
+            <a:picLocks noChangeAspect="1" noChangeArrowheads="1"/>
+          </p:cNvPicPr>
+          <p:nvPr/>
+        </p:nvPicPr>
+        <p:blipFill>
+          <a:blip r:embed="rId3" cstate="print"/>
+          <a:srcRect/>
+          <a:stretch>
+            <a:fillRect/>
+          </a:stretch>
+        </p:blipFill>
+        <p:spPr bwMode="auto">
+          <a:xfrm>
+            <a:off x="3200400" y="3962400"/>
+            <a:ext cx="2743200" cy="2200275"/>
+          </a:xfrm>
+          <a:prstGeom prst="rect">
+            <a:avLst/>
+          </a:prstGeom>
+          <a:noFill/>
+          <a:ln w="9525">
+            <a:noFill/>
+            <a:miter lim="800000"/>
+            <a:headEnd/>
+            <a:tailEnd/>
+          </a:ln>
+        </p:spPr>
+      </p:pic>
+      <p:sp>
+        <p:nvSpPr>
+          <p:cNvPr id="6" name="Oval 5"/>
+          <p:cNvSpPr/>
+          <p:nvPr/>
+        </p:nvSpPr>
+        <p:spPr>
+          <a:xfrm>
+            <a:off x="1600200" y="1447800"/>
+            <a:ext cx="990600" cy="914400"/>
+          </a:xfrm>
+          <a:prstGeom prst="ellipse">
+            <a:avLst/>
+          </a:prstGeom>
+          <a:noFill/>
+          <a:ln w="57150">
+            <a:solidFill>
+              <a:srgbClr val="FF0000"/>
+            </a:solidFill>
+          </a:ln>
+          <a:effectLst>
+            <a:outerShdw blurRad="44450" dist="27940" dir="5400000" algn="ctr">
+              <a:srgbClr val="000000">
+                <a:alpha val="32000"/>
+              </a:srgbClr>
+            </a:outerShdw>
+          </a:effectLst>
+          <a:scene3d>
+            <a:camera prst="orthographicFront">
+              <a:rot lat="0" lon="0" rev="0"/>
+            </a:camera>
+            <a:lightRig rig="balanced" dir="t">
+              <a:rot lat="0" lon="0" rev="8700000"/>
+            </a:lightRig>
+          </a:scene3d>
+          <a:sp3d>
+            <a:bevelT w="190500" h="38100"/>
+          </a:sp3d>
+        </p:spPr>
+        <p:style>
+          <a:lnRef idx="2">
+            <a:schemeClr val="accent1">
+              <a:shade val="50000"/>
+            </a:schemeClr>
+          </a:lnRef>
+          <a:fillRef idx="1">
+            <a:schemeClr val="accent1"/>
+          </a:fillRef>
+          <a:effectRef idx="0">
+            <a:schemeClr val="accent1"/>
+          </a:effectRef>
+          <a:fontRef idx="minor">
+            <a:schemeClr val="lt1"/>
+          </a:fontRef>
+        </p:style>
+        <p:txBody>
+          <a:bodyPr rtlCol="0" anchor="ctr"/>
+          <a:lstStyle/>
+          <a:p>
+            <a:pPr algn="ctr"/>
             <a:endParaRPr lang="en-US"/>
           </a:p>
         </p:txBody>
@@ -3616,6 +5902,13 @@
   <p:clrMapOvr>
     <a:masterClrMapping/>
   </p:clrMapOvr>
+  <p:timing>
+    <p:tnLst>
+      <p:par>
+        <p:cTn id="1" dur="indefinite" restart="never" nodeType="tmRoot"/>
+      </p:par>
+    </p:tnLst>
+  </p:timing>
 </p:sld>
 </file>
 
@@ -3654,12 +5947,8 @@
           <a:lstStyle/>
           <a:p>
             <a:r>
-              <a:rPr lang="en-US" dirty="0" err="1" smtClean="0"/>
-              <a:t>Laplacian</a:t>
-            </a:r>
-            <a:r>
               <a:rPr lang="en-US" dirty="0" smtClean="0"/>
-              <a:t>-based method</a:t>
+              <a:t>Gradient-based method</a:t>
             </a:r>
             <a:br>
               <a:rPr lang="en-US" dirty="0" smtClean="0"/>
@@ -3672,21 +5961,15 @@
                   </a:schemeClr>
                 </a:solidFill>
               </a:rPr>
-              <a:t>Motivation</a:t>
-            </a:r>
-            <a:endParaRPr lang="en-US" sz="3600" dirty="0">
-              <a:solidFill>
-                <a:schemeClr val="bg1">
-                  <a:lumMod val="50000"/>
-                </a:schemeClr>
-              </a:solidFill>
-            </a:endParaRPr>
+              <a:t>Computing Derivatives</a:t>
+            </a:r>
+            <a:endParaRPr lang="en-US" dirty="0"/>
           </a:p>
         </p:txBody>
       </p:sp>
       <p:pic>
         <p:nvPicPr>
-          <p:cNvPr id="4" name="Picture 3" descr="f.png"/>
+          <p:cNvPr id="4" name="Picture 3" descr="GradientMethod.png"/>
           <p:cNvPicPr>
             <a:picLocks noChangeAspect="1"/>
           </p:cNvPicPr>
@@ -3700,135 +5983,122 @@
         </p:blipFill>
         <p:spPr>
           <a:xfrm>
-            <a:off x="914400" y="1752600"/>
-            <a:ext cx="4572000" cy="1957342"/>
+            <a:off x="0" y="1447800"/>
+            <a:ext cx="9144000" cy="2215166"/>
           </a:xfrm>
           <a:prstGeom prst="rect">
             <a:avLst/>
           </a:prstGeom>
-          <a:ln>
-            <a:noFill/>
+        </p:spPr>
+      </p:pic>
+      <p:sp>
+        <p:nvSpPr>
+          <p:cNvPr id="7" name="Oval 6"/>
+          <p:cNvSpPr/>
+          <p:nvPr/>
+        </p:nvSpPr>
+        <p:spPr>
+          <a:xfrm>
+            <a:off x="1600200" y="2743200"/>
+            <a:ext cx="990600" cy="914400"/>
+          </a:xfrm>
+          <a:prstGeom prst="ellipse">
+            <a:avLst/>
+          </a:prstGeom>
+          <a:noFill/>
+          <a:ln w="57150">
+            <a:solidFill>
+              <a:srgbClr val="FF0000"/>
+            </a:solidFill>
           </a:ln>
           <a:effectLst>
-            <a:outerShdw blurRad="292100" dist="139700" dir="2700000" algn="tl" rotWithShape="0">
-              <a:srgbClr val="333333">
-                <a:alpha val="65000"/>
+            <a:outerShdw blurRad="44450" dist="27940" dir="5400000" algn="ctr">
+              <a:srgbClr val="000000">
+                <a:alpha val="32000"/>
               </a:srgbClr>
             </a:outerShdw>
           </a:effectLst>
+          <a:scene3d>
+            <a:camera prst="orthographicFront">
+              <a:rot lat="0" lon="0" rev="0"/>
+            </a:camera>
+            <a:lightRig rig="balanced" dir="t">
+              <a:rot lat="0" lon="0" rev="8700000"/>
+            </a:lightRig>
+          </a:scene3d>
+          <a:sp3d>
+            <a:bevelT w="190500" h="38100"/>
+          </a:sp3d>
         </p:spPr>
-      </p:pic>
+        <p:style>
+          <a:lnRef idx="2">
+            <a:schemeClr val="accent1">
+              <a:shade val="50000"/>
+            </a:schemeClr>
+          </a:lnRef>
+          <a:fillRef idx="1">
+            <a:schemeClr val="accent1"/>
+          </a:fillRef>
+          <a:effectRef idx="0">
+            <a:schemeClr val="accent1"/>
+          </a:effectRef>
+          <a:fontRef idx="minor">
+            <a:schemeClr val="lt1"/>
+          </a:fontRef>
+        </p:style>
+        <p:txBody>
+          <a:bodyPr rtlCol="0" anchor="ctr"/>
+          <a:lstStyle/>
+          <a:p>
+            <a:pPr algn="ctr"/>
+            <a:endParaRPr lang="en-US"/>
+          </a:p>
+        </p:txBody>
+      </p:sp>
       <p:pic>
         <p:nvPicPr>
-          <p:cNvPr id="5" name="Picture 4" descr="f_derivative.png"/>
+          <p:cNvPr id="2050" name="Picture 2"/>
           <p:cNvPicPr>
-            <a:picLocks noChangeAspect="1"/>
+            <a:picLocks noChangeAspect="1" noChangeArrowheads="1"/>
           </p:cNvPicPr>
           <p:nvPr/>
         </p:nvPicPr>
         <p:blipFill>
           <a:blip r:embed="rId3" cstate="print"/>
+          <a:srcRect/>
           <a:stretch>
             <a:fillRect/>
           </a:stretch>
         </p:blipFill>
-        <p:spPr>
+        <p:spPr bwMode="auto">
           <a:xfrm>
-            <a:off x="914400" y="4160928"/>
-            <a:ext cx="4572000" cy="1926661"/>
-          </a:xfrm>
-          <a:prstGeom prst="rect">
-            <a:avLst/>
-          </a:prstGeom>
-          <a:ln>
-            <a:noFill/>
-          </a:ln>
-          <a:effectLst>
-            <a:outerShdw blurRad="292100" dist="139700" dir="2700000" algn="tl" rotWithShape="0">
-              <a:srgbClr val="333333">
-                <a:alpha val="65000"/>
-              </a:srgbClr>
-            </a:outerShdw>
-          </a:effectLst>
-        </p:spPr>
-      </p:pic>
-      <p:sp>
-        <p:nvSpPr>
-          <p:cNvPr id="6" name="TextBox 5"/>
-          <p:cNvSpPr txBox="1"/>
-          <p:nvPr/>
-        </p:nvSpPr>
-        <p:spPr>
-          <a:xfrm>
-            <a:off x="5715000" y="2514600"/>
-            <a:ext cx="508473" cy="369332"/>
+            <a:off x="3081338" y="3914775"/>
+            <a:ext cx="2981325" cy="2181225"/>
           </a:xfrm>
           <a:prstGeom prst="rect">
             <a:avLst/>
           </a:prstGeom>
           <a:noFill/>
+          <a:ln w="9525">
+            <a:noFill/>
+            <a:miter lim="800000"/>
+            <a:headEnd/>
+            <a:tailEnd/>
+          </a:ln>
         </p:spPr>
-        <p:txBody>
-          <a:bodyPr wrap="none" rtlCol="0">
-            <a:spAutoFit/>
-          </a:bodyPr>
-          <a:lstStyle/>
-          <a:p>
-            <a:r>
-              <a:rPr lang="en-US" b="1" dirty="0" smtClean="0"/>
-              <a:t>f(x)</a:t>
-            </a:r>
-            <a:endParaRPr lang="en-US" b="1" dirty="0"/>
-          </a:p>
-        </p:txBody>
-      </p:sp>
-      <p:sp>
-        <p:nvSpPr>
-          <p:cNvPr id="7" name="TextBox 6"/>
-          <p:cNvSpPr txBox="1"/>
-          <p:nvPr/>
-        </p:nvSpPr>
-        <p:spPr>
-          <a:xfrm>
-            <a:off x="5715000" y="4888468"/>
-            <a:ext cx="1156086" cy="369332"/>
-          </a:xfrm>
-          <a:prstGeom prst="rect">
-            <a:avLst/>
-          </a:prstGeom>
-          <a:noFill/>
-        </p:spPr>
-        <p:txBody>
-          <a:bodyPr wrap="none" rtlCol="0">
-            <a:spAutoFit/>
-          </a:bodyPr>
-          <a:lstStyle/>
-          <a:p>
-            <a:r>
-              <a:rPr lang="en-US" b="1" dirty="0" smtClean="0"/>
-              <a:t>d</a:t>
-            </a:r>
-            <a:r>
-              <a:rPr lang="en-US" b="1" baseline="30000" dirty="0" smtClean="0"/>
-              <a:t>2</a:t>
-            </a:r>
-            <a:r>
-              <a:rPr lang="en-US" b="1" dirty="0" smtClean="0"/>
-              <a:t>f(x)/dx</a:t>
-            </a:r>
-            <a:r>
-              <a:rPr lang="en-US" b="1" baseline="30000" dirty="0" smtClean="0"/>
-              <a:t>2</a:t>
-            </a:r>
-            <a:endParaRPr lang="en-US" b="1" baseline="30000" dirty="0"/>
-          </a:p>
-        </p:txBody>
-      </p:sp>
+      </p:pic>
     </p:spTree>
   </p:cSld>
   <p:clrMapOvr>
     <a:masterClrMapping/>
   </p:clrMapOvr>
+  <p:timing>
+    <p:tnLst>
+      <p:par>
+        <p:cTn id="1" dur="indefinite" restart="never" nodeType="tmRoot"/>
+      </p:par>
+    </p:tnLst>
+  </p:timing>
 </p:sld>
 </file>
 
@@ -3867,12 +6137,8 @@
           <a:lstStyle/>
           <a:p>
             <a:r>
-              <a:rPr lang="en-US" dirty="0" err="1" smtClean="0"/>
-              <a:t>Laplacian</a:t>
-            </a:r>
-            <a:r>
               <a:rPr lang="en-US" dirty="0" smtClean="0"/>
-              <a:t>-based method</a:t>
+              <a:t>Gradient-based method</a:t>
             </a:r>
             <a:br>
               <a:rPr lang="en-US" dirty="0" smtClean="0"/>
@@ -3885,7 +6151,7 @@
                   </a:schemeClr>
                 </a:solidFill>
               </a:rPr>
-              <a:t>Steps</a:t>
+              <a:t>Computing Derivatives</a:t>
             </a:r>
             <a:endParaRPr lang="en-US" dirty="0"/>
           </a:p>
@@ -3893,7 +6159,7 @@
       </p:sp>
       <p:pic>
         <p:nvPicPr>
-          <p:cNvPr id="4" name="Picture 3" descr="LaplacianMethod.png"/>
+          <p:cNvPr id="4" name="Picture 3" descr="GradientMethod.png"/>
           <p:cNvPicPr>
             <a:picLocks noChangeAspect="1"/>
           </p:cNvPicPr>
@@ -3907,12 +6173,108 @@
         </p:blipFill>
         <p:spPr>
           <a:xfrm>
-            <a:off x="0" y="2273170"/>
-            <a:ext cx="9144000" cy="2311660"/>
+            <a:off x="0" y="1442434"/>
+            <a:ext cx="9144000" cy="2215166"/>
           </a:xfrm>
           <a:prstGeom prst="rect">
             <a:avLst/>
           </a:prstGeom>
+        </p:spPr>
+      </p:pic>
+      <p:sp>
+        <p:nvSpPr>
+          <p:cNvPr id="6" name="Oval 5"/>
+          <p:cNvSpPr/>
+          <p:nvPr/>
+        </p:nvSpPr>
+        <p:spPr>
+          <a:xfrm>
+            <a:off x="6354580" y="2057400"/>
+            <a:ext cx="990600" cy="914400"/>
+          </a:xfrm>
+          <a:prstGeom prst="ellipse">
+            <a:avLst/>
+          </a:prstGeom>
+          <a:noFill/>
+          <a:ln w="57150">
+            <a:solidFill>
+              <a:srgbClr val="FF0000"/>
+            </a:solidFill>
+          </a:ln>
+          <a:effectLst>
+            <a:outerShdw blurRad="44450" dist="27940" dir="5400000" algn="ctr">
+              <a:srgbClr val="000000">
+                <a:alpha val="32000"/>
+              </a:srgbClr>
+            </a:outerShdw>
+          </a:effectLst>
+          <a:scene3d>
+            <a:camera prst="orthographicFront">
+              <a:rot lat="0" lon="0" rev="0"/>
+            </a:camera>
+            <a:lightRig rig="balanced" dir="t">
+              <a:rot lat="0" lon="0" rev="8700000"/>
+            </a:lightRig>
+          </a:scene3d>
+          <a:sp3d>
+            <a:bevelT w="190500" h="38100"/>
+          </a:sp3d>
+        </p:spPr>
+        <p:style>
+          <a:lnRef idx="2">
+            <a:schemeClr val="accent1">
+              <a:shade val="50000"/>
+            </a:schemeClr>
+          </a:lnRef>
+          <a:fillRef idx="1">
+            <a:schemeClr val="accent1"/>
+          </a:fillRef>
+          <a:effectRef idx="0">
+            <a:schemeClr val="accent1"/>
+          </a:effectRef>
+          <a:fontRef idx="minor">
+            <a:schemeClr val="lt1"/>
+          </a:fontRef>
+        </p:style>
+        <p:txBody>
+          <a:bodyPr rtlCol="0" anchor="ctr"/>
+          <a:lstStyle/>
+          <a:p>
+            <a:pPr algn="ctr"/>
+            <a:endParaRPr lang="en-US"/>
+          </a:p>
+        </p:txBody>
+      </p:sp>
+      <p:pic>
+        <p:nvPicPr>
+          <p:cNvPr id="4098" name="Picture 2"/>
+          <p:cNvPicPr>
+            <a:picLocks noChangeAspect="1" noChangeArrowheads="1"/>
+          </p:cNvPicPr>
+          <p:nvPr/>
+        </p:nvPicPr>
+        <p:blipFill>
+          <a:blip r:embed="rId3" cstate="print"/>
+          <a:srcRect/>
+          <a:stretch>
+            <a:fillRect/>
+          </a:stretch>
+        </p:blipFill>
+        <p:spPr bwMode="auto">
+          <a:xfrm>
+            <a:off x="2362200" y="4572000"/>
+            <a:ext cx="4371975" cy="876300"/>
+          </a:xfrm>
+          <a:prstGeom prst="rect">
+            <a:avLst/>
+          </a:prstGeom>
+          <a:noFill/>
+          <a:ln w="9525">
+            <a:noFill/>
+            <a:miter lim="800000"/>
+            <a:headEnd/>
+            <a:tailEnd/>
+          </a:ln>
         </p:spPr>
       </p:pic>
     </p:spTree>
@@ -3920,6 +6282,13 @@
   <p:clrMapOvr>
     <a:masterClrMapping/>
   </p:clrMapOvr>
+  <p:timing>
+    <p:tnLst>
+      <p:par>
+        <p:cTn id="1" dur="indefinite" restart="never" nodeType="tmRoot"/>
+      </p:par>
+    </p:tnLst>
+  </p:timing>
 </p:sld>
 </file>
 
@@ -3958,12 +6327,8 @@
           <a:lstStyle/>
           <a:p>
             <a:r>
-              <a:rPr lang="en-US" dirty="0" err="1" smtClean="0"/>
-              <a:t>Laplacian</a:t>
-            </a:r>
-            <a:r>
               <a:rPr lang="en-US" dirty="0" smtClean="0"/>
-              <a:t>-based method</a:t>
+              <a:t>Gradient-based method</a:t>
             </a:r>
             <a:br>
               <a:rPr lang="en-US" dirty="0" smtClean="0"/>
@@ -3976,36 +6341,208 @@
                   </a:schemeClr>
                 </a:solidFill>
               </a:rPr>
-              <a:t>Examples</a:t>
+              <a:t>Computing Derivatives</a:t>
             </a:r>
             <a:endParaRPr lang="en-US" dirty="0"/>
           </a:p>
         </p:txBody>
       </p:sp>
-      <p:sp>
-        <p:nvSpPr>
-          <p:cNvPr id="3" name="Content Placeholder 2"/>
-          <p:cNvSpPr>
-            <a:spLocks noGrp="1"/>
-          </p:cNvSpPr>
-          <p:nvPr>
-            <p:ph idx="1"/>
-          </p:nvPr>
-        </p:nvSpPr>
-        <p:spPr/>
-        <p:txBody>
-          <a:bodyPr/>
-          <a:lstStyle/>
-          <a:p>
+      <p:pic>
+        <p:nvPicPr>
+          <p:cNvPr id="4" name="Picture 3" descr="GradientMethod.png"/>
+          <p:cNvPicPr>
+            <a:picLocks noChangeAspect="1"/>
+          </p:cNvPicPr>
+          <p:nvPr/>
+        </p:nvPicPr>
+        <p:blipFill>
+          <a:blip r:embed="rId2" cstate="print"/>
+          <a:stretch>
+            <a:fillRect/>
+          </a:stretch>
+        </p:blipFill>
+        <p:spPr>
+          <a:xfrm>
+            <a:off x="0" y="1447800"/>
+            <a:ext cx="9144000" cy="2215166"/>
+          </a:xfrm>
+          <a:prstGeom prst="rect">
+            <a:avLst/>
+          </a:prstGeom>
+        </p:spPr>
+      </p:pic>
+      <p:sp>
+        <p:nvSpPr>
+          <p:cNvPr id="5" name="Oval 4"/>
+          <p:cNvSpPr/>
+          <p:nvPr/>
+        </p:nvSpPr>
+        <p:spPr>
+          <a:xfrm>
+            <a:off x="7315200" y="2087380"/>
+            <a:ext cx="990600" cy="914400"/>
+          </a:xfrm>
+          <a:prstGeom prst="ellipse">
+            <a:avLst/>
+          </a:prstGeom>
+          <a:noFill/>
+          <a:ln w="57150">
+            <a:solidFill>
+              <a:srgbClr val="FF0000"/>
+            </a:solidFill>
+          </a:ln>
+          <a:effectLst>
+            <a:outerShdw blurRad="44450" dist="27940" dir="5400000" algn="ctr">
+              <a:srgbClr val="000000">
+                <a:alpha val="32000"/>
+              </a:srgbClr>
+            </a:outerShdw>
+          </a:effectLst>
+          <a:scene3d>
+            <a:camera prst="orthographicFront">
+              <a:rot lat="0" lon="0" rev="0"/>
+            </a:camera>
+            <a:lightRig rig="balanced" dir="t">
+              <a:rot lat="0" lon="0" rev="8700000"/>
+            </a:lightRig>
+          </a:scene3d>
+          <a:sp3d>
+            <a:bevelT w="190500" h="38100"/>
+          </a:sp3d>
+        </p:spPr>
+        <p:style>
+          <a:lnRef idx="2">
+            <a:schemeClr val="accent1">
+              <a:shade val="50000"/>
+            </a:schemeClr>
+          </a:lnRef>
+          <a:fillRef idx="1">
+            <a:schemeClr val="accent1"/>
+          </a:fillRef>
+          <a:effectRef idx="0">
+            <a:schemeClr val="accent1"/>
+          </a:effectRef>
+          <a:fontRef idx="minor">
+            <a:schemeClr val="lt1"/>
+          </a:fontRef>
+        </p:style>
+        <p:txBody>
+          <a:bodyPr rtlCol="0" anchor="ctr"/>
+          <a:lstStyle/>
+          <a:p>
+            <a:pPr algn="ctr"/>
             <a:endParaRPr lang="en-US"/>
           </a:p>
         </p:txBody>
       </p:sp>
+      <p:pic>
+        <p:nvPicPr>
+          <p:cNvPr id="5122" name="Picture 2"/>
+          <p:cNvPicPr>
+            <a:picLocks noChangeAspect="1" noChangeArrowheads="1"/>
+          </p:cNvPicPr>
+          <p:nvPr/>
+        </p:nvPicPr>
+        <p:blipFill>
+          <a:blip r:embed="rId3" cstate="print"/>
+          <a:srcRect/>
+          <a:stretch>
+            <a:fillRect/>
+          </a:stretch>
+        </p:blipFill>
+        <p:spPr bwMode="auto">
+          <a:xfrm>
+            <a:off x="1981200" y="4343400"/>
+            <a:ext cx="5248275" cy="1143000"/>
+          </a:xfrm>
+          <a:prstGeom prst="rect">
+            <a:avLst/>
+          </a:prstGeom>
+          <a:noFill/>
+          <a:ln w="9525">
+            <a:noFill/>
+            <a:miter lim="800000"/>
+            <a:headEnd/>
+            <a:tailEnd/>
+          </a:ln>
+        </p:spPr>
+      </p:pic>
+      <p:pic>
+        <p:nvPicPr>
+          <p:cNvPr id="5123" name="Picture 3"/>
+          <p:cNvPicPr>
+            <a:picLocks noChangeAspect="1" noChangeArrowheads="1"/>
+          </p:cNvPicPr>
+          <p:nvPr/>
+        </p:nvPicPr>
+        <p:blipFill>
+          <a:blip r:embed="rId4" cstate="print"/>
+          <a:srcRect/>
+          <a:stretch>
+            <a:fillRect/>
+          </a:stretch>
+        </p:blipFill>
+        <p:spPr bwMode="auto">
+          <a:xfrm>
+            <a:off x="2362200" y="5715000"/>
+            <a:ext cx="4733925" cy="771525"/>
+          </a:xfrm>
+          <a:prstGeom prst="rect">
+            <a:avLst/>
+          </a:prstGeom>
+          <a:noFill/>
+          <a:ln w="9525">
+            <a:noFill/>
+            <a:miter lim="800000"/>
+            <a:headEnd/>
+            <a:tailEnd/>
+          </a:ln>
+        </p:spPr>
+      </p:pic>
+      <p:pic>
+        <p:nvPicPr>
+          <p:cNvPr id="5124" name="Picture 4"/>
+          <p:cNvPicPr>
+            <a:picLocks noChangeAspect="1" noChangeArrowheads="1"/>
+          </p:cNvPicPr>
+          <p:nvPr/>
+        </p:nvPicPr>
+        <p:blipFill>
+          <a:blip r:embed="rId5" cstate="print"/>
+          <a:srcRect/>
+          <a:stretch>
+            <a:fillRect/>
+          </a:stretch>
+        </p:blipFill>
+        <p:spPr bwMode="auto">
+          <a:xfrm>
+            <a:off x="2362200" y="3810000"/>
+            <a:ext cx="4286250" cy="419100"/>
+          </a:xfrm>
+          <a:prstGeom prst="rect">
+            <a:avLst/>
+          </a:prstGeom>
+          <a:noFill/>
+          <a:ln w="9525">
+            <a:noFill/>
+            <a:miter lim="800000"/>
+            <a:headEnd/>
+            <a:tailEnd/>
+          </a:ln>
+        </p:spPr>
+      </p:pic>
     </p:spTree>
   </p:cSld>
   <p:clrMapOvr>
     <a:masterClrMapping/>
   </p:clrMapOvr>
+  <p:timing>
+    <p:tnLst>
+      <p:par>
+        <p:cTn id="1" dur="indefinite" restart="never" nodeType="tmRoot"/>
+      </p:par>
+    </p:tnLst>
+  </p:timing>
 </p:sld>
 </file>
 
@@ -4038,41 +6575,68 @@
         </p:nvSpPr>
         <p:spPr/>
         <p:txBody>
-          <a:bodyPr/>
+          <a:bodyPr>
+            <a:normAutofit fontScale="90000"/>
+          </a:bodyPr>
           <a:lstStyle/>
           <a:p>
             <a:r>
               <a:rPr lang="en-US" dirty="0" smtClean="0"/>
-              <a:t>Comparison</a:t>
+              <a:t>Gradient-based method</a:t>
+            </a:r>
+            <a:br>
+              <a:rPr lang="en-US" dirty="0" smtClean="0"/>
+            </a:br>
+            <a:r>
+              <a:rPr lang="en-US" sz="3600" dirty="0" smtClean="0">
+                <a:solidFill>
+                  <a:schemeClr val="bg1">
+                    <a:lumMod val="50000"/>
+                  </a:schemeClr>
+                </a:solidFill>
+              </a:rPr>
+              <a:t>Example 1</a:t>
             </a:r>
             <a:endParaRPr lang="en-US" dirty="0"/>
           </a:p>
         </p:txBody>
       </p:sp>
-      <p:sp>
-        <p:nvSpPr>
-          <p:cNvPr id="3" name="Content Placeholder 2"/>
-          <p:cNvSpPr>
-            <a:spLocks noGrp="1"/>
-          </p:cNvSpPr>
-          <p:nvPr>
-            <p:ph idx="1"/>
-          </p:nvPr>
-        </p:nvSpPr>
-        <p:spPr/>
-        <p:txBody>
-          <a:bodyPr/>
-          <a:lstStyle/>
-          <a:p>
-            <a:endParaRPr lang="en-US"/>
-          </a:p>
-        </p:txBody>
-      </p:sp>
+      <p:pic>
+        <p:nvPicPr>
+          <p:cNvPr id="6" name="Picture 5" descr="lena.png"/>
+          <p:cNvPicPr>
+            <a:picLocks noChangeAspect="1"/>
+          </p:cNvPicPr>
+          <p:nvPr/>
+        </p:nvPicPr>
+        <p:blipFill>
+          <a:blip r:embed="rId2" cstate="print"/>
+          <a:stretch>
+            <a:fillRect/>
+          </a:stretch>
+        </p:blipFill>
+        <p:spPr>
+          <a:xfrm>
+            <a:off x="2133600" y="1447800"/>
+            <a:ext cx="4876800" cy="4876800"/>
+          </a:xfrm>
+          <a:prstGeom prst="rect">
+            <a:avLst/>
+          </a:prstGeom>
+        </p:spPr>
+      </p:pic>
     </p:spTree>
   </p:cSld>
   <p:clrMapOvr>
     <a:masterClrMapping/>
   </p:clrMapOvr>
+  <p:timing>
+    <p:tnLst>
+      <p:par>
+        <p:cTn id="1" dur="indefinite" restart="never" nodeType="tmRoot"/>
+      </p:par>
+    </p:tnLst>
+  </p:timing>
 </p:sld>
 </file>
 

</xml_diff>

<commit_message>
presentation final clean up
</commit_message>
<xml_diff>
--- a/docs/presentation/presentation.pptx
+++ b/docs/presentation/presentation.pptx
@@ -32,6 +32,16 @@
     <p:sldId id="283" r:id="rId26"/>
     <p:sldId id="284" r:id="rId27"/>
     <p:sldId id="285" r:id="rId28"/>
+    <p:sldId id="286" r:id="rId29"/>
+    <p:sldId id="287" r:id="rId30"/>
+    <p:sldId id="288" r:id="rId31"/>
+    <p:sldId id="289" r:id="rId32"/>
+    <p:sldId id="290" r:id="rId33"/>
+    <p:sldId id="291" r:id="rId34"/>
+    <p:sldId id="292" r:id="rId35"/>
+    <p:sldId id="293" r:id="rId36"/>
+    <p:sldId id="294" r:id="rId37"/>
+    <p:sldId id="295" r:id="rId38"/>
   </p:sldIdLst>
   <p:sldSz cx="9144000" cy="6858000" type="screen4x3"/>
   <p:notesSz cx="6858000" cy="9144000"/>
@@ -315,7 +325,7 @@
             <a:fld id="{584B7511-42DF-4662-A467-A4414ACFB037}" type="datetimeFigureOut">
               <a:rPr lang="en-US" smtClean="0"/>
               <a:pPr/>
-              <a:t>4/29/2013</a:t>
+              <a:t>4/30/2013</a:t>
             </a:fld>
             <a:endParaRPr lang="en-US"/>
           </a:p>
@@ -482,7 +492,7 @@
             <a:fld id="{584B7511-42DF-4662-A467-A4414ACFB037}" type="datetimeFigureOut">
               <a:rPr lang="en-US" smtClean="0"/>
               <a:pPr/>
-              <a:t>4/29/2013</a:t>
+              <a:t>4/30/2013</a:t>
             </a:fld>
             <a:endParaRPr lang="en-US"/>
           </a:p>
@@ -659,7 +669,7 @@
             <a:fld id="{584B7511-42DF-4662-A467-A4414ACFB037}" type="datetimeFigureOut">
               <a:rPr lang="en-US" smtClean="0"/>
               <a:pPr/>
-              <a:t>4/29/2013</a:t>
+              <a:t>4/30/2013</a:t>
             </a:fld>
             <a:endParaRPr lang="en-US"/>
           </a:p>
@@ -826,7 +836,7 @@
             <a:fld id="{584B7511-42DF-4662-A467-A4414ACFB037}" type="datetimeFigureOut">
               <a:rPr lang="en-US" smtClean="0"/>
               <a:pPr/>
-              <a:t>4/29/2013</a:t>
+              <a:t>4/30/2013</a:t>
             </a:fld>
             <a:endParaRPr lang="en-US"/>
           </a:p>
@@ -1069,7 +1079,7 @@
             <a:fld id="{584B7511-42DF-4662-A467-A4414ACFB037}" type="datetimeFigureOut">
               <a:rPr lang="en-US" smtClean="0"/>
               <a:pPr/>
-              <a:t>4/29/2013</a:t>
+              <a:t>4/30/2013</a:t>
             </a:fld>
             <a:endParaRPr lang="en-US"/>
           </a:p>
@@ -1354,7 +1364,7 @@
             <a:fld id="{584B7511-42DF-4662-A467-A4414ACFB037}" type="datetimeFigureOut">
               <a:rPr lang="en-US" smtClean="0"/>
               <a:pPr/>
-              <a:t>4/29/2013</a:t>
+              <a:t>4/30/2013</a:t>
             </a:fld>
             <a:endParaRPr lang="en-US"/>
           </a:p>
@@ -1773,7 +1783,7 @@
             <a:fld id="{584B7511-42DF-4662-A467-A4414ACFB037}" type="datetimeFigureOut">
               <a:rPr lang="en-US" smtClean="0"/>
               <a:pPr/>
-              <a:t>4/29/2013</a:t>
+              <a:t>4/30/2013</a:t>
             </a:fld>
             <a:endParaRPr lang="en-US"/>
           </a:p>
@@ -1888,7 +1898,7 @@
             <a:fld id="{584B7511-42DF-4662-A467-A4414ACFB037}" type="datetimeFigureOut">
               <a:rPr lang="en-US" smtClean="0"/>
               <a:pPr/>
-              <a:t>4/29/2013</a:t>
+              <a:t>4/30/2013</a:t>
             </a:fld>
             <a:endParaRPr lang="en-US"/>
           </a:p>
@@ -1980,7 +1990,7 @@
             <a:fld id="{584B7511-42DF-4662-A467-A4414ACFB037}" type="datetimeFigureOut">
               <a:rPr lang="en-US" smtClean="0"/>
               <a:pPr/>
-              <a:t>4/29/2013</a:t>
+              <a:t>4/30/2013</a:t>
             </a:fld>
             <a:endParaRPr lang="en-US"/>
           </a:p>
@@ -2254,7 +2264,7 @@
             <a:fld id="{584B7511-42DF-4662-A467-A4414ACFB037}" type="datetimeFigureOut">
               <a:rPr lang="en-US" smtClean="0"/>
               <a:pPr/>
-              <a:t>4/29/2013</a:t>
+              <a:t>4/30/2013</a:t>
             </a:fld>
             <a:endParaRPr lang="en-US"/>
           </a:p>
@@ -2504,7 +2514,7 @@
             <a:fld id="{584B7511-42DF-4662-A467-A4414ACFB037}" type="datetimeFigureOut">
               <a:rPr lang="en-US" smtClean="0"/>
               <a:pPr/>
-              <a:t>4/29/2013</a:t>
+              <a:t>4/30/2013</a:t>
             </a:fld>
             <a:endParaRPr lang="en-US"/>
           </a:p>
@@ -2714,7 +2724,7 @@
             <a:fld id="{584B7511-42DF-4662-A467-A4414ACFB037}" type="datetimeFigureOut">
               <a:rPr lang="en-US" smtClean="0"/>
               <a:pPr/>
-              <a:t>4/29/2013</a:t>
+              <a:t>4/30/2013</a:t>
             </a:fld>
             <a:endParaRPr lang="en-US"/>
           </a:p>
@@ -4436,10 +4446,6 @@
               <a:rPr lang="en-US" dirty="0" smtClean="0"/>
               <a:t>-based method</a:t>
             </a:r>
-            <a:r>
-              <a:rPr lang="en-US" dirty="0" smtClean="0"/>
-              <a:t/>
-            </a:r>
             <a:br>
               <a:rPr lang="en-US" dirty="0" smtClean="0"/>
             </a:br>
@@ -4659,10 +4665,6 @@
               <a:rPr lang="en-US" dirty="0" smtClean="0"/>
               <a:t>-based method</a:t>
             </a:r>
-            <a:r>
-              <a:rPr lang="en-US" dirty="0" smtClean="0"/>
-              <a:t/>
-            </a:r>
             <a:br>
               <a:rPr lang="en-US" dirty="0" smtClean="0"/>
             </a:br>
@@ -4761,10 +4763,6 @@
               <a:rPr lang="en-US" dirty="0" smtClean="0"/>
               <a:t>-based method</a:t>
             </a:r>
-            <a:r>
-              <a:rPr lang="en-US" dirty="0" smtClean="0"/>
-              <a:t/>
-            </a:r>
             <a:br>
               <a:rPr lang="en-US" dirty="0" smtClean="0"/>
             </a:br>
@@ -4863,10 +4861,6 @@
               <a:rPr lang="en-US" dirty="0" smtClean="0"/>
               <a:t>-based method</a:t>
             </a:r>
-            <a:r>
-              <a:rPr lang="en-US" dirty="0" smtClean="0"/>
-              <a:t/>
-            </a:r>
             <a:br>
               <a:rPr lang="en-US" dirty="0" smtClean="0"/>
             </a:br>
@@ -4965,10 +4959,6 @@
               <a:rPr lang="en-US" dirty="0" smtClean="0"/>
               <a:t>-based method</a:t>
             </a:r>
-            <a:r>
-              <a:rPr lang="en-US" dirty="0" smtClean="0"/>
-              <a:t/>
-            </a:r>
             <a:br>
               <a:rPr lang="en-US" dirty="0" smtClean="0"/>
             </a:br>
@@ -5067,10 +5057,6 @@
               <a:rPr lang="en-US" dirty="0" smtClean="0"/>
               <a:t>-based method</a:t>
             </a:r>
-            <a:r>
-              <a:rPr lang="en-US" dirty="0" smtClean="0"/>
-              <a:t/>
-            </a:r>
             <a:br>
               <a:rPr lang="en-US" dirty="0" smtClean="0"/>
             </a:br>
@@ -5104,7 +5090,7 @@
         </p:blipFill>
         <p:spPr>
           <a:xfrm>
-            <a:off x="2190750" y="1752600"/>
+            <a:off x="2190750" y="1600200"/>
             <a:ext cx="4762500" cy="4572000"/>
           </a:xfrm>
           <a:prstGeom prst="rect">
@@ -5190,7 +5176,7 @@
       </p:sp>
       <p:pic>
         <p:nvPicPr>
-          <p:cNvPr id="4" name="Picture 3" descr="green_building.jpg"/>
+          <p:cNvPr id="5" name="Picture 4" descr="lena.png"/>
           <p:cNvPicPr>
             <a:picLocks noChangeAspect="1"/>
           </p:cNvPicPr>
@@ -5204,8 +5190,8 @@
         </p:blipFill>
         <p:spPr>
           <a:xfrm>
-            <a:off x="2895600" y="1524000"/>
-            <a:ext cx="3352800" cy="5029200"/>
+            <a:off x="2133600" y="1447800"/>
+            <a:ext cx="4876800" cy="4876800"/>
           </a:xfrm>
           <a:prstGeom prst="rect">
             <a:avLst/>
@@ -5217,6 +5203,13 @@
   <p:clrMapOvr>
     <a:masterClrMapping/>
   </p:clrMapOvr>
+  <p:timing>
+    <p:tnLst>
+      <p:par>
+        <p:cTn id="1" dur="indefinite" restart="never" nodeType="tmRoot"/>
+      </p:par>
+    </p:tnLst>
+  </p:timing>
 </p:sld>
 </file>
 
@@ -5283,7 +5276,7 @@
       </p:sp>
       <p:pic>
         <p:nvPicPr>
-          <p:cNvPr id="3" name="Picture 2" descr="green_building_gradient_edges.jpg"/>
+          <p:cNvPr id="4" name="Picture 3" descr="lena_gradient_edges.png"/>
           <p:cNvPicPr>
             <a:picLocks noChangeAspect="1"/>
           </p:cNvPicPr>
@@ -5297,8 +5290,8 @@
         </p:blipFill>
         <p:spPr>
           <a:xfrm>
-            <a:off x="2895600" y="1524000"/>
-            <a:ext cx="3352800" cy="5029200"/>
+            <a:off x="2133600" y="1447800"/>
+            <a:ext cx="4876800" cy="4876800"/>
           </a:xfrm>
           <a:prstGeom prst="rect">
             <a:avLst/>
@@ -5310,6 +5303,13 @@
   <p:clrMapOvr>
     <a:masterClrMapping/>
   </p:clrMapOvr>
+  <p:timing>
+    <p:tnLst>
+      <p:par>
+        <p:cTn id="1" dur="indefinite" restart="never" nodeType="tmRoot"/>
+      </p:par>
+    </p:tnLst>
+  </p:timing>
 </p:sld>
 </file>
 
@@ -5386,7 +5386,7 @@
       </p:sp>
       <p:pic>
         <p:nvPicPr>
-          <p:cNvPr id="3" name="Picture 2" descr="green_building_laplacian_edges.jpg"/>
+          <p:cNvPr id="4" name="Picture 3" descr="lena_laplacian_edges.png"/>
           <p:cNvPicPr>
             <a:picLocks noChangeAspect="1"/>
           </p:cNvPicPr>
@@ -5400,8 +5400,8 @@
         </p:blipFill>
         <p:spPr>
           <a:xfrm>
-            <a:off x="2895600" y="1524000"/>
-            <a:ext cx="3352800" cy="5029200"/>
+            <a:off x="2133600" y="1447800"/>
+            <a:ext cx="4876800" cy="4876800"/>
           </a:xfrm>
           <a:prstGeom prst="rect">
             <a:avLst/>
@@ -5413,6 +5413,213 @@
   <p:clrMapOvr>
     <a:masterClrMapping/>
   </p:clrMapOvr>
+  <p:timing>
+    <p:tnLst>
+      <p:par>
+        <p:cTn id="1" dur="indefinite" restart="never" nodeType="tmRoot"/>
+      </p:par>
+    </p:tnLst>
+  </p:timing>
+</p:sld>
+</file>
+
+<file path=ppt/slides/slide28.xml><?xml version="1.0" encoding="utf-8"?>
+<p:sld xmlns:a="http://schemas.openxmlformats.org/drawingml/2006/main" xmlns:r="http://schemas.openxmlformats.org/officeDocument/2006/relationships" xmlns:p="http://schemas.openxmlformats.org/presentationml/2006/main">
+  <p:cSld>
+    <p:spTree>
+      <p:nvGrpSpPr>
+        <p:cNvPr id="1" name=""/>
+        <p:cNvGrpSpPr/>
+        <p:nvPr/>
+      </p:nvGrpSpPr>
+      <p:grpSpPr>
+        <a:xfrm>
+          <a:off x="0" y="0"/>
+          <a:ext cx="0" cy="0"/>
+          <a:chOff x="0" y="0"/>
+          <a:chExt cx="0" cy="0"/>
+        </a:xfrm>
+      </p:grpSpPr>
+      <p:sp>
+        <p:nvSpPr>
+          <p:cNvPr id="2" name="Title 1"/>
+          <p:cNvSpPr>
+            <a:spLocks noGrp="1"/>
+          </p:cNvSpPr>
+          <p:nvPr>
+            <p:ph type="title"/>
+          </p:nvPr>
+        </p:nvSpPr>
+        <p:spPr/>
+        <p:txBody>
+          <a:bodyPr>
+            <a:normAutofit fontScale="90000"/>
+          </a:bodyPr>
+          <a:lstStyle/>
+          <a:p>
+            <a:r>
+              <a:rPr lang="en-US" dirty="0" smtClean="0"/>
+              <a:t>Comparison</a:t>
+            </a:r>
+            <a:br>
+              <a:rPr lang="en-US" dirty="0" smtClean="0"/>
+            </a:br>
+            <a:r>
+              <a:rPr lang="en-US" sz="3100" dirty="0" smtClean="0">
+                <a:solidFill>
+                  <a:schemeClr val="bg1">
+                    <a:lumMod val="50000"/>
+                  </a:schemeClr>
+                </a:solidFill>
+              </a:rPr>
+              <a:t>Original</a:t>
+            </a:r>
+            <a:endParaRPr lang="en-US" sz="3100" dirty="0">
+              <a:solidFill>
+                <a:schemeClr val="bg1">
+                  <a:lumMod val="50000"/>
+                </a:schemeClr>
+              </a:solidFill>
+            </a:endParaRPr>
+          </a:p>
+        </p:txBody>
+      </p:sp>
+      <p:pic>
+        <p:nvPicPr>
+          <p:cNvPr id="5" name="Picture 4" descr="stata_center.jpg"/>
+          <p:cNvPicPr>
+            <a:picLocks noChangeAspect="1"/>
+          </p:cNvPicPr>
+          <p:nvPr/>
+        </p:nvPicPr>
+        <p:blipFill>
+          <a:blip r:embed="rId2" cstate="print"/>
+          <a:stretch>
+            <a:fillRect/>
+          </a:stretch>
+        </p:blipFill>
+        <p:spPr>
+          <a:xfrm>
+            <a:off x="2667000" y="1524000"/>
+            <a:ext cx="3771900" cy="5029200"/>
+          </a:xfrm>
+          <a:prstGeom prst="rect">
+            <a:avLst/>
+          </a:prstGeom>
+        </p:spPr>
+      </p:pic>
+    </p:spTree>
+  </p:cSld>
+  <p:clrMapOvr>
+    <a:masterClrMapping/>
+  </p:clrMapOvr>
+  <p:timing>
+    <p:tnLst>
+      <p:par>
+        <p:cTn id="1" dur="indefinite" restart="never" nodeType="tmRoot"/>
+      </p:par>
+    </p:tnLst>
+  </p:timing>
+</p:sld>
+</file>
+
+<file path=ppt/slides/slide29.xml><?xml version="1.0" encoding="utf-8"?>
+<p:sld xmlns:a="http://schemas.openxmlformats.org/drawingml/2006/main" xmlns:r="http://schemas.openxmlformats.org/officeDocument/2006/relationships" xmlns:p="http://schemas.openxmlformats.org/presentationml/2006/main">
+  <p:cSld>
+    <p:spTree>
+      <p:nvGrpSpPr>
+        <p:cNvPr id="1" name=""/>
+        <p:cNvGrpSpPr/>
+        <p:nvPr/>
+      </p:nvGrpSpPr>
+      <p:grpSpPr>
+        <a:xfrm>
+          <a:off x="0" y="0"/>
+          <a:ext cx="0" cy="0"/>
+          <a:chOff x="0" y="0"/>
+          <a:chExt cx="0" cy="0"/>
+        </a:xfrm>
+      </p:grpSpPr>
+      <p:sp>
+        <p:nvSpPr>
+          <p:cNvPr id="2" name="Title 1"/>
+          <p:cNvSpPr>
+            <a:spLocks noGrp="1"/>
+          </p:cNvSpPr>
+          <p:nvPr>
+            <p:ph type="title"/>
+          </p:nvPr>
+        </p:nvSpPr>
+        <p:spPr/>
+        <p:txBody>
+          <a:bodyPr>
+            <a:normAutofit fontScale="90000"/>
+          </a:bodyPr>
+          <a:lstStyle/>
+          <a:p>
+            <a:r>
+              <a:rPr lang="en-US" dirty="0" smtClean="0"/>
+              <a:t>Comparison</a:t>
+            </a:r>
+            <a:br>
+              <a:rPr lang="en-US" dirty="0" smtClean="0"/>
+            </a:br>
+            <a:r>
+              <a:rPr lang="en-US" sz="3100" dirty="0" smtClean="0">
+                <a:solidFill>
+                  <a:schemeClr val="bg1">
+                    <a:lumMod val="50000"/>
+                  </a:schemeClr>
+                </a:solidFill>
+              </a:rPr>
+              <a:t>Gradient-based</a:t>
+            </a:r>
+            <a:endParaRPr lang="en-US" sz="3100" dirty="0">
+              <a:solidFill>
+                <a:schemeClr val="bg1">
+                  <a:lumMod val="50000"/>
+                </a:schemeClr>
+              </a:solidFill>
+            </a:endParaRPr>
+          </a:p>
+        </p:txBody>
+      </p:sp>
+      <p:pic>
+        <p:nvPicPr>
+          <p:cNvPr id="4" name="Picture 3" descr="stata_center_gradient_edges.jpg"/>
+          <p:cNvPicPr>
+            <a:picLocks noChangeAspect="1"/>
+          </p:cNvPicPr>
+          <p:nvPr/>
+        </p:nvPicPr>
+        <p:blipFill>
+          <a:blip r:embed="rId2" cstate="print"/>
+          <a:stretch>
+            <a:fillRect/>
+          </a:stretch>
+        </p:blipFill>
+        <p:spPr>
+          <a:xfrm>
+            <a:off x="2667000" y="1524000"/>
+            <a:ext cx="3771900" cy="5029200"/>
+          </a:xfrm>
+          <a:prstGeom prst="rect">
+            <a:avLst/>
+          </a:prstGeom>
+        </p:spPr>
+      </p:pic>
+    </p:spTree>
+  </p:cSld>
+  <p:clrMapOvr>
+    <a:masterClrMapping/>
+  </p:clrMapOvr>
+  <p:timing>
+    <p:tnLst>
+      <p:par>
+        <p:cTn id="1" dur="indefinite" restart="never" nodeType="tmRoot"/>
+      </p:par>
+    </p:tnLst>
+  </p:timing>
 </p:sld>
 </file>
 
@@ -5610,6 +5817,822 @@
               <a:t>dx</a:t>
             </a:r>
             <a:endParaRPr lang="en-US" b="1" dirty="0"/>
+          </a:p>
+        </p:txBody>
+      </p:sp>
+    </p:spTree>
+  </p:cSld>
+  <p:clrMapOvr>
+    <a:masterClrMapping/>
+  </p:clrMapOvr>
+  <p:timing>
+    <p:tnLst>
+      <p:par>
+        <p:cTn id="1" dur="indefinite" restart="never" nodeType="tmRoot"/>
+      </p:par>
+    </p:tnLst>
+  </p:timing>
+</p:sld>
+</file>
+
+<file path=ppt/slides/slide30.xml><?xml version="1.0" encoding="utf-8"?>
+<p:sld xmlns:a="http://schemas.openxmlformats.org/drawingml/2006/main" xmlns:r="http://schemas.openxmlformats.org/officeDocument/2006/relationships" xmlns:p="http://schemas.openxmlformats.org/presentationml/2006/main">
+  <p:cSld>
+    <p:spTree>
+      <p:nvGrpSpPr>
+        <p:cNvPr id="1" name=""/>
+        <p:cNvGrpSpPr/>
+        <p:nvPr/>
+      </p:nvGrpSpPr>
+      <p:grpSpPr>
+        <a:xfrm>
+          <a:off x="0" y="0"/>
+          <a:ext cx="0" cy="0"/>
+          <a:chOff x="0" y="0"/>
+          <a:chExt cx="0" cy="0"/>
+        </a:xfrm>
+      </p:grpSpPr>
+      <p:sp>
+        <p:nvSpPr>
+          <p:cNvPr id="2" name="Title 1"/>
+          <p:cNvSpPr>
+            <a:spLocks noGrp="1"/>
+          </p:cNvSpPr>
+          <p:nvPr>
+            <p:ph type="title"/>
+          </p:nvPr>
+        </p:nvSpPr>
+        <p:spPr/>
+        <p:txBody>
+          <a:bodyPr>
+            <a:normAutofit fontScale="90000"/>
+          </a:bodyPr>
+          <a:lstStyle/>
+          <a:p>
+            <a:r>
+              <a:rPr lang="en-US" dirty="0" smtClean="0"/>
+              <a:t>Comparison</a:t>
+            </a:r>
+            <a:br>
+              <a:rPr lang="en-US" dirty="0" smtClean="0"/>
+            </a:br>
+            <a:r>
+              <a:rPr lang="en-US" sz="3100" dirty="0" err="1" smtClean="0">
+                <a:solidFill>
+                  <a:schemeClr val="bg1">
+                    <a:lumMod val="50000"/>
+                  </a:schemeClr>
+                </a:solidFill>
+              </a:rPr>
+              <a:t>Laplacian</a:t>
+            </a:r>
+            <a:r>
+              <a:rPr lang="en-US" sz="3100" dirty="0" smtClean="0">
+                <a:solidFill>
+                  <a:schemeClr val="bg1">
+                    <a:lumMod val="50000"/>
+                  </a:schemeClr>
+                </a:solidFill>
+              </a:rPr>
+              <a:t>-based</a:t>
+            </a:r>
+            <a:endParaRPr lang="en-US" sz="3100" dirty="0">
+              <a:solidFill>
+                <a:schemeClr val="bg1">
+                  <a:lumMod val="50000"/>
+                </a:schemeClr>
+              </a:solidFill>
+            </a:endParaRPr>
+          </a:p>
+        </p:txBody>
+      </p:sp>
+      <p:pic>
+        <p:nvPicPr>
+          <p:cNvPr id="4" name="Picture 3" descr="stata_center_laplacian_edges.jpg"/>
+          <p:cNvPicPr>
+            <a:picLocks noChangeAspect="1"/>
+          </p:cNvPicPr>
+          <p:nvPr/>
+        </p:nvPicPr>
+        <p:blipFill>
+          <a:blip r:embed="rId2" cstate="print"/>
+          <a:stretch>
+            <a:fillRect/>
+          </a:stretch>
+        </p:blipFill>
+        <p:spPr>
+          <a:xfrm>
+            <a:off x="2667000" y="1524000"/>
+            <a:ext cx="3771900" cy="5029200"/>
+          </a:xfrm>
+          <a:prstGeom prst="rect">
+            <a:avLst/>
+          </a:prstGeom>
+        </p:spPr>
+      </p:pic>
+    </p:spTree>
+  </p:cSld>
+  <p:clrMapOvr>
+    <a:masterClrMapping/>
+  </p:clrMapOvr>
+  <p:timing>
+    <p:tnLst>
+      <p:par>
+        <p:cTn id="1" dur="indefinite" restart="never" nodeType="tmRoot"/>
+      </p:par>
+    </p:tnLst>
+  </p:timing>
+</p:sld>
+</file>
+
+<file path=ppt/slides/slide31.xml><?xml version="1.0" encoding="utf-8"?>
+<p:sld xmlns:a="http://schemas.openxmlformats.org/drawingml/2006/main" xmlns:r="http://schemas.openxmlformats.org/officeDocument/2006/relationships" xmlns:p="http://schemas.openxmlformats.org/presentationml/2006/main">
+  <p:cSld>
+    <p:spTree>
+      <p:nvGrpSpPr>
+        <p:cNvPr id="1" name=""/>
+        <p:cNvGrpSpPr/>
+        <p:nvPr/>
+      </p:nvGrpSpPr>
+      <p:grpSpPr>
+        <a:xfrm>
+          <a:off x="0" y="0"/>
+          <a:ext cx="0" cy="0"/>
+          <a:chOff x="0" y="0"/>
+          <a:chExt cx="0" cy="0"/>
+        </a:xfrm>
+      </p:grpSpPr>
+      <p:sp>
+        <p:nvSpPr>
+          <p:cNvPr id="2" name="Title 1"/>
+          <p:cNvSpPr>
+            <a:spLocks noGrp="1"/>
+          </p:cNvSpPr>
+          <p:nvPr>
+            <p:ph type="title"/>
+          </p:nvPr>
+        </p:nvSpPr>
+        <p:spPr/>
+        <p:txBody>
+          <a:bodyPr>
+            <a:normAutofit fontScale="90000"/>
+          </a:bodyPr>
+          <a:lstStyle/>
+          <a:p>
+            <a:r>
+              <a:rPr lang="en-US" dirty="0" smtClean="0"/>
+              <a:t>Comparison</a:t>
+            </a:r>
+            <a:br>
+              <a:rPr lang="en-US" dirty="0" smtClean="0"/>
+            </a:br>
+            <a:r>
+              <a:rPr lang="en-US" sz="3100" dirty="0" smtClean="0">
+                <a:solidFill>
+                  <a:schemeClr val="bg1">
+                    <a:lumMod val="50000"/>
+                  </a:schemeClr>
+                </a:solidFill>
+              </a:rPr>
+              <a:t>Original</a:t>
+            </a:r>
+            <a:endParaRPr lang="en-US" sz="3100" dirty="0">
+              <a:solidFill>
+                <a:schemeClr val="bg1">
+                  <a:lumMod val="50000"/>
+                </a:schemeClr>
+              </a:solidFill>
+            </a:endParaRPr>
+          </a:p>
+        </p:txBody>
+      </p:sp>
+      <p:pic>
+        <p:nvPicPr>
+          <p:cNvPr id="5" name="Picture 4" descr="mandrill.jpg"/>
+          <p:cNvPicPr>
+            <a:picLocks noChangeAspect="1"/>
+          </p:cNvPicPr>
+          <p:nvPr/>
+        </p:nvPicPr>
+        <p:blipFill>
+          <a:blip r:embed="rId2" cstate="print"/>
+          <a:stretch>
+            <a:fillRect/>
+          </a:stretch>
+        </p:blipFill>
+        <p:spPr>
+          <a:xfrm>
+            <a:off x="2133600" y="1600200"/>
+            <a:ext cx="4762500" cy="4572000"/>
+          </a:xfrm>
+          <a:prstGeom prst="rect">
+            <a:avLst/>
+          </a:prstGeom>
+        </p:spPr>
+      </p:pic>
+    </p:spTree>
+  </p:cSld>
+  <p:clrMapOvr>
+    <a:masterClrMapping/>
+  </p:clrMapOvr>
+  <p:timing>
+    <p:tnLst>
+      <p:par>
+        <p:cTn id="1" dur="indefinite" restart="never" nodeType="tmRoot"/>
+      </p:par>
+    </p:tnLst>
+  </p:timing>
+</p:sld>
+</file>
+
+<file path=ppt/slides/slide32.xml><?xml version="1.0" encoding="utf-8"?>
+<p:sld xmlns:a="http://schemas.openxmlformats.org/drawingml/2006/main" xmlns:r="http://schemas.openxmlformats.org/officeDocument/2006/relationships" xmlns:p="http://schemas.openxmlformats.org/presentationml/2006/main">
+  <p:cSld>
+    <p:spTree>
+      <p:nvGrpSpPr>
+        <p:cNvPr id="1" name=""/>
+        <p:cNvGrpSpPr/>
+        <p:nvPr/>
+      </p:nvGrpSpPr>
+      <p:grpSpPr>
+        <a:xfrm>
+          <a:off x="0" y="0"/>
+          <a:ext cx="0" cy="0"/>
+          <a:chOff x="0" y="0"/>
+          <a:chExt cx="0" cy="0"/>
+        </a:xfrm>
+      </p:grpSpPr>
+      <p:sp>
+        <p:nvSpPr>
+          <p:cNvPr id="2" name="Title 1"/>
+          <p:cNvSpPr>
+            <a:spLocks noGrp="1"/>
+          </p:cNvSpPr>
+          <p:nvPr>
+            <p:ph type="title"/>
+          </p:nvPr>
+        </p:nvSpPr>
+        <p:spPr/>
+        <p:txBody>
+          <a:bodyPr>
+            <a:normAutofit fontScale="90000"/>
+          </a:bodyPr>
+          <a:lstStyle/>
+          <a:p>
+            <a:r>
+              <a:rPr lang="en-US" dirty="0" smtClean="0"/>
+              <a:t>Comparison</a:t>
+            </a:r>
+            <a:br>
+              <a:rPr lang="en-US" dirty="0" smtClean="0"/>
+            </a:br>
+            <a:r>
+              <a:rPr lang="en-US" sz="3100" dirty="0" smtClean="0">
+                <a:solidFill>
+                  <a:schemeClr val="bg1">
+                    <a:lumMod val="50000"/>
+                  </a:schemeClr>
+                </a:solidFill>
+              </a:rPr>
+              <a:t>Gradient-based</a:t>
+            </a:r>
+            <a:endParaRPr lang="en-US" sz="3100" dirty="0">
+              <a:solidFill>
+                <a:schemeClr val="bg1">
+                  <a:lumMod val="50000"/>
+                </a:schemeClr>
+              </a:solidFill>
+            </a:endParaRPr>
+          </a:p>
+        </p:txBody>
+      </p:sp>
+      <p:pic>
+        <p:nvPicPr>
+          <p:cNvPr id="4" name="Picture 3" descr="mandrill_gradient_edges.jpg"/>
+          <p:cNvPicPr>
+            <a:picLocks noChangeAspect="1"/>
+          </p:cNvPicPr>
+          <p:nvPr/>
+        </p:nvPicPr>
+        <p:blipFill>
+          <a:blip r:embed="rId2" cstate="print"/>
+          <a:stretch>
+            <a:fillRect/>
+          </a:stretch>
+        </p:blipFill>
+        <p:spPr>
+          <a:xfrm>
+            <a:off x="2190750" y="1600200"/>
+            <a:ext cx="4762500" cy="4572000"/>
+          </a:xfrm>
+          <a:prstGeom prst="rect">
+            <a:avLst/>
+          </a:prstGeom>
+        </p:spPr>
+      </p:pic>
+    </p:spTree>
+  </p:cSld>
+  <p:clrMapOvr>
+    <a:masterClrMapping/>
+  </p:clrMapOvr>
+  <p:timing>
+    <p:tnLst>
+      <p:par>
+        <p:cTn id="1" dur="indefinite" restart="never" nodeType="tmRoot"/>
+      </p:par>
+    </p:tnLst>
+  </p:timing>
+</p:sld>
+</file>
+
+<file path=ppt/slides/slide33.xml><?xml version="1.0" encoding="utf-8"?>
+<p:sld xmlns:a="http://schemas.openxmlformats.org/drawingml/2006/main" xmlns:r="http://schemas.openxmlformats.org/officeDocument/2006/relationships" xmlns:p="http://schemas.openxmlformats.org/presentationml/2006/main">
+  <p:cSld>
+    <p:spTree>
+      <p:nvGrpSpPr>
+        <p:cNvPr id="1" name=""/>
+        <p:cNvGrpSpPr/>
+        <p:nvPr/>
+      </p:nvGrpSpPr>
+      <p:grpSpPr>
+        <a:xfrm>
+          <a:off x="0" y="0"/>
+          <a:ext cx="0" cy="0"/>
+          <a:chOff x="0" y="0"/>
+          <a:chExt cx="0" cy="0"/>
+        </a:xfrm>
+      </p:grpSpPr>
+      <p:sp>
+        <p:nvSpPr>
+          <p:cNvPr id="2" name="Title 1"/>
+          <p:cNvSpPr>
+            <a:spLocks noGrp="1"/>
+          </p:cNvSpPr>
+          <p:nvPr>
+            <p:ph type="title"/>
+          </p:nvPr>
+        </p:nvSpPr>
+        <p:spPr/>
+        <p:txBody>
+          <a:bodyPr>
+            <a:normAutofit fontScale="90000"/>
+          </a:bodyPr>
+          <a:lstStyle/>
+          <a:p>
+            <a:r>
+              <a:rPr lang="en-US" dirty="0" smtClean="0"/>
+              <a:t>Comparison</a:t>
+            </a:r>
+            <a:br>
+              <a:rPr lang="en-US" dirty="0" smtClean="0"/>
+            </a:br>
+            <a:r>
+              <a:rPr lang="en-US" sz="3100" dirty="0" err="1" smtClean="0">
+                <a:solidFill>
+                  <a:schemeClr val="bg1">
+                    <a:lumMod val="50000"/>
+                  </a:schemeClr>
+                </a:solidFill>
+              </a:rPr>
+              <a:t>Laplacian</a:t>
+            </a:r>
+            <a:r>
+              <a:rPr lang="en-US" sz="3100" dirty="0" smtClean="0">
+                <a:solidFill>
+                  <a:schemeClr val="bg1">
+                    <a:lumMod val="50000"/>
+                  </a:schemeClr>
+                </a:solidFill>
+              </a:rPr>
+              <a:t>-based</a:t>
+            </a:r>
+            <a:endParaRPr lang="en-US" sz="3100" dirty="0">
+              <a:solidFill>
+                <a:schemeClr val="bg1">
+                  <a:lumMod val="50000"/>
+                </a:schemeClr>
+              </a:solidFill>
+            </a:endParaRPr>
+          </a:p>
+        </p:txBody>
+      </p:sp>
+      <p:pic>
+        <p:nvPicPr>
+          <p:cNvPr id="4" name="Picture 3" descr="mandrill_laplacian_edges.jpg"/>
+          <p:cNvPicPr>
+            <a:picLocks noChangeAspect="1"/>
+          </p:cNvPicPr>
+          <p:nvPr/>
+        </p:nvPicPr>
+        <p:blipFill>
+          <a:blip r:embed="rId2" cstate="print"/>
+          <a:stretch>
+            <a:fillRect/>
+          </a:stretch>
+        </p:blipFill>
+        <p:spPr>
+          <a:xfrm>
+            <a:off x="2190750" y="1600200"/>
+            <a:ext cx="4762500" cy="4572000"/>
+          </a:xfrm>
+          <a:prstGeom prst="rect">
+            <a:avLst/>
+          </a:prstGeom>
+        </p:spPr>
+      </p:pic>
+    </p:spTree>
+  </p:cSld>
+  <p:clrMapOvr>
+    <a:masterClrMapping/>
+  </p:clrMapOvr>
+  <p:timing>
+    <p:tnLst>
+      <p:par>
+        <p:cTn id="1" dur="indefinite" restart="never" nodeType="tmRoot"/>
+      </p:par>
+    </p:tnLst>
+  </p:timing>
+</p:sld>
+</file>
+
+<file path=ppt/slides/slide34.xml><?xml version="1.0" encoding="utf-8"?>
+<p:sld xmlns:a="http://schemas.openxmlformats.org/drawingml/2006/main" xmlns:r="http://schemas.openxmlformats.org/officeDocument/2006/relationships" xmlns:p="http://schemas.openxmlformats.org/presentationml/2006/main">
+  <p:cSld>
+    <p:spTree>
+      <p:nvGrpSpPr>
+        <p:cNvPr id="1" name=""/>
+        <p:cNvGrpSpPr/>
+        <p:nvPr/>
+      </p:nvGrpSpPr>
+      <p:grpSpPr>
+        <a:xfrm>
+          <a:off x="0" y="0"/>
+          <a:ext cx="0" cy="0"/>
+          <a:chOff x="0" y="0"/>
+          <a:chExt cx="0" cy="0"/>
+        </a:xfrm>
+      </p:grpSpPr>
+      <p:sp>
+        <p:nvSpPr>
+          <p:cNvPr id="2" name="Title 1"/>
+          <p:cNvSpPr>
+            <a:spLocks noGrp="1"/>
+          </p:cNvSpPr>
+          <p:nvPr>
+            <p:ph type="title"/>
+          </p:nvPr>
+        </p:nvSpPr>
+        <p:spPr/>
+        <p:txBody>
+          <a:bodyPr>
+            <a:normAutofit fontScale="90000"/>
+          </a:bodyPr>
+          <a:lstStyle/>
+          <a:p>
+            <a:r>
+              <a:rPr lang="en-US" dirty="0" smtClean="0"/>
+              <a:t>Comparison</a:t>
+            </a:r>
+            <a:br>
+              <a:rPr lang="en-US" dirty="0" smtClean="0"/>
+            </a:br>
+            <a:r>
+              <a:rPr lang="en-US" sz="3100" dirty="0" smtClean="0">
+                <a:solidFill>
+                  <a:schemeClr val="bg1">
+                    <a:lumMod val="50000"/>
+                  </a:schemeClr>
+                </a:solidFill>
+              </a:rPr>
+              <a:t>Original</a:t>
+            </a:r>
+            <a:endParaRPr lang="en-US" sz="3100" dirty="0">
+              <a:solidFill>
+                <a:schemeClr val="bg1">
+                  <a:lumMod val="50000"/>
+                </a:schemeClr>
+              </a:solidFill>
+            </a:endParaRPr>
+          </a:p>
+        </p:txBody>
+      </p:sp>
+      <p:pic>
+        <p:nvPicPr>
+          <p:cNvPr id="4" name="Picture 3" descr="green_building.jpg"/>
+          <p:cNvPicPr>
+            <a:picLocks noChangeAspect="1"/>
+          </p:cNvPicPr>
+          <p:nvPr/>
+        </p:nvPicPr>
+        <p:blipFill>
+          <a:blip r:embed="rId2" cstate="print"/>
+          <a:stretch>
+            <a:fillRect/>
+          </a:stretch>
+        </p:blipFill>
+        <p:spPr>
+          <a:xfrm>
+            <a:off x="2895600" y="1524000"/>
+            <a:ext cx="3352800" cy="5029200"/>
+          </a:xfrm>
+          <a:prstGeom prst="rect">
+            <a:avLst/>
+          </a:prstGeom>
+        </p:spPr>
+      </p:pic>
+    </p:spTree>
+  </p:cSld>
+  <p:clrMapOvr>
+    <a:masterClrMapping/>
+  </p:clrMapOvr>
+  <p:timing>
+    <p:tnLst>
+      <p:par>
+        <p:cTn id="1" dur="indefinite" restart="never" nodeType="tmRoot"/>
+      </p:par>
+    </p:tnLst>
+  </p:timing>
+</p:sld>
+</file>
+
+<file path=ppt/slides/slide35.xml><?xml version="1.0" encoding="utf-8"?>
+<p:sld xmlns:a="http://schemas.openxmlformats.org/drawingml/2006/main" xmlns:r="http://schemas.openxmlformats.org/officeDocument/2006/relationships" xmlns:p="http://schemas.openxmlformats.org/presentationml/2006/main">
+  <p:cSld>
+    <p:spTree>
+      <p:nvGrpSpPr>
+        <p:cNvPr id="1" name=""/>
+        <p:cNvGrpSpPr/>
+        <p:nvPr/>
+      </p:nvGrpSpPr>
+      <p:grpSpPr>
+        <a:xfrm>
+          <a:off x="0" y="0"/>
+          <a:ext cx="0" cy="0"/>
+          <a:chOff x="0" y="0"/>
+          <a:chExt cx="0" cy="0"/>
+        </a:xfrm>
+      </p:grpSpPr>
+      <p:sp>
+        <p:nvSpPr>
+          <p:cNvPr id="2" name="Title 1"/>
+          <p:cNvSpPr>
+            <a:spLocks noGrp="1"/>
+          </p:cNvSpPr>
+          <p:nvPr>
+            <p:ph type="title"/>
+          </p:nvPr>
+        </p:nvSpPr>
+        <p:spPr/>
+        <p:txBody>
+          <a:bodyPr>
+            <a:normAutofit fontScale="90000"/>
+          </a:bodyPr>
+          <a:lstStyle/>
+          <a:p>
+            <a:r>
+              <a:rPr lang="en-US" dirty="0" smtClean="0"/>
+              <a:t>Comparison</a:t>
+            </a:r>
+            <a:br>
+              <a:rPr lang="en-US" dirty="0" smtClean="0"/>
+            </a:br>
+            <a:r>
+              <a:rPr lang="en-US" sz="3100" dirty="0" smtClean="0">
+                <a:solidFill>
+                  <a:schemeClr val="bg1">
+                    <a:lumMod val="50000"/>
+                  </a:schemeClr>
+                </a:solidFill>
+              </a:rPr>
+              <a:t>Gradient-based</a:t>
+            </a:r>
+            <a:endParaRPr lang="en-US" sz="3100" dirty="0">
+              <a:solidFill>
+                <a:schemeClr val="bg1">
+                  <a:lumMod val="50000"/>
+                </a:schemeClr>
+              </a:solidFill>
+            </a:endParaRPr>
+          </a:p>
+        </p:txBody>
+      </p:sp>
+      <p:pic>
+        <p:nvPicPr>
+          <p:cNvPr id="3" name="Picture 2" descr="green_building_gradient_edges.jpg"/>
+          <p:cNvPicPr>
+            <a:picLocks noChangeAspect="1"/>
+          </p:cNvPicPr>
+          <p:nvPr/>
+        </p:nvPicPr>
+        <p:blipFill>
+          <a:blip r:embed="rId2" cstate="print"/>
+          <a:stretch>
+            <a:fillRect/>
+          </a:stretch>
+        </p:blipFill>
+        <p:spPr>
+          <a:xfrm>
+            <a:off x="2895600" y="1524000"/>
+            <a:ext cx="3352800" cy="5029200"/>
+          </a:xfrm>
+          <a:prstGeom prst="rect">
+            <a:avLst/>
+          </a:prstGeom>
+        </p:spPr>
+      </p:pic>
+    </p:spTree>
+  </p:cSld>
+  <p:clrMapOvr>
+    <a:masterClrMapping/>
+  </p:clrMapOvr>
+  <p:timing>
+    <p:tnLst>
+      <p:par>
+        <p:cTn id="1" dur="indefinite" restart="never" nodeType="tmRoot"/>
+      </p:par>
+    </p:tnLst>
+  </p:timing>
+</p:sld>
+</file>
+
+<file path=ppt/slides/slide36.xml><?xml version="1.0" encoding="utf-8"?>
+<p:sld xmlns:a="http://schemas.openxmlformats.org/drawingml/2006/main" xmlns:r="http://schemas.openxmlformats.org/officeDocument/2006/relationships" xmlns:p="http://schemas.openxmlformats.org/presentationml/2006/main">
+  <p:cSld>
+    <p:spTree>
+      <p:nvGrpSpPr>
+        <p:cNvPr id="1" name=""/>
+        <p:cNvGrpSpPr/>
+        <p:nvPr/>
+      </p:nvGrpSpPr>
+      <p:grpSpPr>
+        <a:xfrm>
+          <a:off x="0" y="0"/>
+          <a:ext cx="0" cy="0"/>
+          <a:chOff x="0" y="0"/>
+          <a:chExt cx="0" cy="0"/>
+        </a:xfrm>
+      </p:grpSpPr>
+      <p:sp>
+        <p:nvSpPr>
+          <p:cNvPr id="2" name="Title 1"/>
+          <p:cNvSpPr>
+            <a:spLocks noGrp="1"/>
+          </p:cNvSpPr>
+          <p:nvPr>
+            <p:ph type="title"/>
+          </p:nvPr>
+        </p:nvSpPr>
+        <p:spPr/>
+        <p:txBody>
+          <a:bodyPr>
+            <a:normAutofit fontScale="90000"/>
+          </a:bodyPr>
+          <a:lstStyle/>
+          <a:p>
+            <a:r>
+              <a:rPr lang="en-US" dirty="0" smtClean="0"/>
+              <a:t>Comparison</a:t>
+            </a:r>
+            <a:br>
+              <a:rPr lang="en-US" dirty="0" smtClean="0"/>
+            </a:br>
+            <a:r>
+              <a:rPr lang="en-US" sz="3100" dirty="0" err="1" smtClean="0">
+                <a:solidFill>
+                  <a:schemeClr val="bg1">
+                    <a:lumMod val="50000"/>
+                  </a:schemeClr>
+                </a:solidFill>
+              </a:rPr>
+              <a:t>Laplacian</a:t>
+            </a:r>
+            <a:r>
+              <a:rPr lang="en-US" sz="3100" dirty="0" smtClean="0">
+                <a:solidFill>
+                  <a:schemeClr val="bg1">
+                    <a:lumMod val="50000"/>
+                  </a:schemeClr>
+                </a:solidFill>
+              </a:rPr>
+              <a:t>-based</a:t>
+            </a:r>
+            <a:endParaRPr lang="en-US" sz="3100" dirty="0">
+              <a:solidFill>
+                <a:schemeClr val="bg1">
+                  <a:lumMod val="50000"/>
+                </a:schemeClr>
+              </a:solidFill>
+            </a:endParaRPr>
+          </a:p>
+        </p:txBody>
+      </p:sp>
+      <p:pic>
+        <p:nvPicPr>
+          <p:cNvPr id="3" name="Picture 2" descr="green_building_laplacian_edges.jpg"/>
+          <p:cNvPicPr>
+            <a:picLocks noChangeAspect="1"/>
+          </p:cNvPicPr>
+          <p:nvPr/>
+        </p:nvPicPr>
+        <p:blipFill>
+          <a:blip r:embed="rId2" cstate="print"/>
+          <a:stretch>
+            <a:fillRect/>
+          </a:stretch>
+        </p:blipFill>
+        <p:spPr>
+          <a:xfrm>
+            <a:off x="2895600" y="1524000"/>
+            <a:ext cx="3352800" cy="5029200"/>
+          </a:xfrm>
+          <a:prstGeom prst="rect">
+            <a:avLst/>
+          </a:prstGeom>
+        </p:spPr>
+      </p:pic>
+    </p:spTree>
+  </p:cSld>
+  <p:clrMapOvr>
+    <a:masterClrMapping/>
+  </p:clrMapOvr>
+  <p:timing>
+    <p:tnLst>
+      <p:par>
+        <p:cTn id="1" dur="indefinite" restart="never" nodeType="tmRoot"/>
+      </p:par>
+    </p:tnLst>
+  </p:timing>
+</p:sld>
+</file>
+
+<file path=ppt/slides/slide37.xml><?xml version="1.0" encoding="utf-8"?>
+<p:sld xmlns:a="http://schemas.openxmlformats.org/drawingml/2006/main" xmlns:r="http://schemas.openxmlformats.org/officeDocument/2006/relationships" xmlns:p="http://schemas.openxmlformats.org/presentationml/2006/main">
+  <p:cSld>
+    <p:spTree>
+      <p:nvGrpSpPr>
+        <p:cNvPr id="1" name=""/>
+        <p:cNvGrpSpPr/>
+        <p:nvPr/>
+      </p:nvGrpSpPr>
+      <p:grpSpPr>
+        <a:xfrm>
+          <a:off x="0" y="0"/>
+          <a:ext cx="0" cy="0"/>
+          <a:chOff x="0" y="0"/>
+          <a:chExt cx="0" cy="0"/>
+        </a:xfrm>
+      </p:grpSpPr>
+      <p:sp>
+        <p:nvSpPr>
+          <p:cNvPr id="2" name="Title 1"/>
+          <p:cNvSpPr>
+            <a:spLocks noGrp="1"/>
+          </p:cNvSpPr>
+          <p:nvPr>
+            <p:ph type="title"/>
+          </p:nvPr>
+        </p:nvSpPr>
+        <p:spPr/>
+        <p:txBody>
+          <a:bodyPr/>
+          <a:lstStyle/>
+          <a:p>
+            <a:r>
+              <a:rPr lang="en-US" dirty="0" smtClean="0"/>
+              <a:t>Source</a:t>
+            </a:r>
+            <a:endParaRPr lang="en-US" dirty="0"/>
+          </a:p>
+        </p:txBody>
+      </p:sp>
+      <p:sp>
+        <p:nvSpPr>
+          <p:cNvPr id="4" name="Rectangle 3"/>
+          <p:cNvSpPr/>
+          <p:nvPr/>
+        </p:nvSpPr>
+        <p:spPr>
+          <a:xfrm>
+            <a:off x="364854" y="3200400"/>
+            <a:ext cx="8550546" cy="646331"/>
+          </a:xfrm>
+          <a:prstGeom prst="rect">
+            <a:avLst/>
+          </a:prstGeom>
+        </p:spPr>
+        <p:txBody>
+          <a:bodyPr wrap="none">
+            <a:spAutoFit/>
+          </a:bodyPr>
+          <a:lstStyle/>
+          <a:p>
+            <a:r>
+              <a:rPr lang="en-US" sz="3600" dirty="0" smtClean="0">
+                <a:hlinkClick r:id="rId2"/>
+              </a:rPr>
+              <a:t>https://github.com/mikemeko/6.344-Project</a:t>
+            </a:r>
+            <a:endParaRPr lang="en-US" sz="3600" dirty="0"/>
           </a:p>
         </p:txBody>
       </p:sp>

</xml_diff>

<commit_message>
final paper and presentation clean up
</commit_message>
<xml_diff>
--- a/docs/presentation/presentation.pptx
+++ b/docs/presentation/presentation.pptx
@@ -4359,7 +4359,7 @@
       </p:pic>
       <p:pic>
         <p:nvPicPr>
-          <p:cNvPr id="6146" name="Picture 2"/>
+          <p:cNvPr id="2050" name="Picture 2"/>
           <p:cNvPicPr>
             <a:picLocks noChangeAspect="1" noChangeArrowheads="1"/>
           </p:cNvPicPr>
@@ -4374,8 +4374,8 @@
         </p:blipFill>
         <p:spPr bwMode="auto">
           <a:xfrm>
-            <a:off x="2343150" y="5867400"/>
-            <a:ext cx="5276850" cy="676275"/>
+            <a:off x="2438400" y="5791200"/>
+            <a:ext cx="5267325" cy="676275"/>
           </a:xfrm>
           <a:prstGeom prst="rect">
             <a:avLst/>
@@ -7492,7 +7492,7 @@
       </p:pic>
       <p:pic>
         <p:nvPicPr>
-          <p:cNvPr id="5123" name="Picture 3"/>
+          <p:cNvPr id="5124" name="Picture 4"/>
           <p:cNvPicPr>
             <a:picLocks noChangeAspect="1" noChangeArrowheads="1"/>
           </p:cNvPicPr>
@@ -7507,8 +7507,8 @@
         </p:blipFill>
         <p:spPr bwMode="auto">
           <a:xfrm>
-            <a:off x="2362200" y="5715000"/>
-            <a:ext cx="4733925" cy="771525"/>
+            <a:off x="2362200" y="3810000"/>
+            <a:ext cx="4286250" cy="419100"/>
           </a:xfrm>
           <a:prstGeom prst="rect">
             <a:avLst/>
@@ -7524,7 +7524,7 @@
       </p:pic>
       <p:pic>
         <p:nvPicPr>
-          <p:cNvPr id="5124" name="Picture 4"/>
+          <p:cNvPr id="1026" name="Picture 2"/>
           <p:cNvPicPr>
             <a:picLocks noChangeAspect="1" noChangeArrowheads="1"/>
           </p:cNvPicPr>
@@ -7539,8 +7539,8 @@
         </p:blipFill>
         <p:spPr bwMode="auto">
           <a:xfrm>
-            <a:off x="2362200" y="3810000"/>
-            <a:ext cx="4286250" cy="419100"/>
+            <a:off x="2466975" y="5676900"/>
+            <a:ext cx="4619625" cy="723900"/>
           </a:xfrm>
           <a:prstGeom prst="rect">
             <a:avLst/>

</xml_diff>

<commit_message>
add more examples to presentation
</commit_message>
<xml_diff>
--- a/docs/presentation/presentation.pptx
+++ b/docs/presentation/presentation.pptx
@@ -20,31 +20,37 @@
     <p:sldId id="274" r:id="rId14"/>
     <p:sldId id="275" r:id="rId15"/>
     <p:sldId id="276" r:id="rId16"/>
-    <p:sldId id="298" r:id="rId17"/>
-    <p:sldId id="261" r:id="rId18"/>
-    <p:sldId id="262" r:id="rId19"/>
-    <p:sldId id="267" r:id="rId20"/>
-    <p:sldId id="271" r:id="rId21"/>
-    <p:sldId id="277" r:id="rId22"/>
-    <p:sldId id="280" r:id="rId23"/>
-    <p:sldId id="278" r:id="rId24"/>
-    <p:sldId id="281" r:id="rId25"/>
-    <p:sldId id="279" r:id="rId26"/>
-    <p:sldId id="282" r:id="rId27"/>
-    <p:sldId id="300" r:id="rId28"/>
-    <p:sldId id="283" r:id="rId29"/>
-    <p:sldId id="284" r:id="rId30"/>
-    <p:sldId id="285" r:id="rId31"/>
-    <p:sldId id="286" r:id="rId32"/>
-    <p:sldId id="287" r:id="rId33"/>
-    <p:sldId id="288" r:id="rId34"/>
-    <p:sldId id="289" r:id="rId35"/>
-    <p:sldId id="290" r:id="rId36"/>
-    <p:sldId id="291" r:id="rId37"/>
-    <p:sldId id="292" r:id="rId38"/>
-    <p:sldId id="293" r:id="rId39"/>
-    <p:sldId id="294" r:id="rId40"/>
-    <p:sldId id="295" r:id="rId41"/>
+    <p:sldId id="301" r:id="rId17"/>
+    <p:sldId id="306" r:id="rId18"/>
+    <p:sldId id="305" r:id="rId19"/>
+    <p:sldId id="308" r:id="rId20"/>
+    <p:sldId id="298" r:id="rId21"/>
+    <p:sldId id="261" r:id="rId22"/>
+    <p:sldId id="262" r:id="rId23"/>
+    <p:sldId id="267" r:id="rId24"/>
+    <p:sldId id="271" r:id="rId25"/>
+    <p:sldId id="277" r:id="rId26"/>
+    <p:sldId id="280" r:id="rId27"/>
+    <p:sldId id="278" r:id="rId28"/>
+    <p:sldId id="281" r:id="rId29"/>
+    <p:sldId id="279" r:id="rId30"/>
+    <p:sldId id="282" r:id="rId31"/>
+    <p:sldId id="302" r:id="rId32"/>
+    <p:sldId id="304" r:id="rId33"/>
+    <p:sldId id="300" r:id="rId34"/>
+    <p:sldId id="283" r:id="rId35"/>
+    <p:sldId id="284" r:id="rId36"/>
+    <p:sldId id="285" r:id="rId37"/>
+    <p:sldId id="286" r:id="rId38"/>
+    <p:sldId id="287" r:id="rId39"/>
+    <p:sldId id="288" r:id="rId40"/>
+    <p:sldId id="289" r:id="rId41"/>
+    <p:sldId id="290" r:id="rId42"/>
+    <p:sldId id="291" r:id="rId43"/>
+    <p:sldId id="292" r:id="rId44"/>
+    <p:sldId id="293" r:id="rId45"/>
+    <p:sldId id="294" r:id="rId46"/>
+    <p:sldId id="295" r:id="rId47"/>
   </p:sldIdLst>
   <p:sldSz cx="9144000" cy="6858000" type="screen4x3"/>
   <p:notesSz cx="6858000" cy="9144000"/>
@@ -328,7 +334,7 @@
             <a:fld id="{584B7511-42DF-4662-A467-A4414ACFB037}" type="datetimeFigureOut">
               <a:rPr lang="en-US" smtClean="0"/>
               <a:pPr/>
-              <a:t>4/30/2013</a:t>
+              <a:t>5/13/2013</a:t>
             </a:fld>
             <a:endParaRPr lang="en-US"/>
           </a:p>
@@ -495,7 +501,7 @@
             <a:fld id="{584B7511-42DF-4662-A467-A4414ACFB037}" type="datetimeFigureOut">
               <a:rPr lang="en-US" smtClean="0"/>
               <a:pPr/>
-              <a:t>4/30/2013</a:t>
+              <a:t>5/13/2013</a:t>
             </a:fld>
             <a:endParaRPr lang="en-US"/>
           </a:p>
@@ -672,7 +678,7 @@
             <a:fld id="{584B7511-42DF-4662-A467-A4414ACFB037}" type="datetimeFigureOut">
               <a:rPr lang="en-US" smtClean="0"/>
               <a:pPr/>
-              <a:t>4/30/2013</a:t>
+              <a:t>5/13/2013</a:t>
             </a:fld>
             <a:endParaRPr lang="en-US"/>
           </a:p>
@@ -839,7 +845,7 @@
             <a:fld id="{584B7511-42DF-4662-A467-A4414ACFB037}" type="datetimeFigureOut">
               <a:rPr lang="en-US" smtClean="0"/>
               <a:pPr/>
-              <a:t>4/30/2013</a:t>
+              <a:t>5/13/2013</a:t>
             </a:fld>
             <a:endParaRPr lang="en-US"/>
           </a:p>
@@ -1082,7 +1088,7 @@
             <a:fld id="{584B7511-42DF-4662-A467-A4414ACFB037}" type="datetimeFigureOut">
               <a:rPr lang="en-US" smtClean="0"/>
               <a:pPr/>
-              <a:t>4/30/2013</a:t>
+              <a:t>5/13/2013</a:t>
             </a:fld>
             <a:endParaRPr lang="en-US"/>
           </a:p>
@@ -1367,7 +1373,7 @@
             <a:fld id="{584B7511-42DF-4662-A467-A4414ACFB037}" type="datetimeFigureOut">
               <a:rPr lang="en-US" smtClean="0"/>
               <a:pPr/>
-              <a:t>4/30/2013</a:t>
+              <a:t>5/13/2013</a:t>
             </a:fld>
             <a:endParaRPr lang="en-US"/>
           </a:p>
@@ -1786,7 +1792,7 @@
             <a:fld id="{584B7511-42DF-4662-A467-A4414ACFB037}" type="datetimeFigureOut">
               <a:rPr lang="en-US" smtClean="0"/>
               <a:pPr/>
-              <a:t>4/30/2013</a:t>
+              <a:t>5/13/2013</a:t>
             </a:fld>
             <a:endParaRPr lang="en-US"/>
           </a:p>
@@ -1901,7 +1907,7 @@
             <a:fld id="{584B7511-42DF-4662-A467-A4414ACFB037}" type="datetimeFigureOut">
               <a:rPr lang="en-US" smtClean="0"/>
               <a:pPr/>
-              <a:t>4/30/2013</a:t>
+              <a:t>5/13/2013</a:t>
             </a:fld>
             <a:endParaRPr lang="en-US"/>
           </a:p>
@@ -1993,7 +1999,7 @@
             <a:fld id="{584B7511-42DF-4662-A467-A4414ACFB037}" type="datetimeFigureOut">
               <a:rPr lang="en-US" smtClean="0"/>
               <a:pPr/>
-              <a:t>4/30/2013</a:t>
+              <a:t>5/13/2013</a:t>
             </a:fld>
             <a:endParaRPr lang="en-US"/>
           </a:p>
@@ -2267,7 +2273,7 @@
             <a:fld id="{584B7511-42DF-4662-A467-A4414ACFB037}" type="datetimeFigureOut">
               <a:rPr lang="en-US" smtClean="0"/>
               <a:pPr/>
-              <a:t>4/30/2013</a:t>
+              <a:t>5/13/2013</a:t>
             </a:fld>
             <a:endParaRPr lang="en-US"/>
           </a:p>
@@ -2517,7 +2523,7 @@
             <a:fld id="{584B7511-42DF-4662-A467-A4414ACFB037}" type="datetimeFigureOut">
               <a:rPr lang="en-US" smtClean="0"/>
               <a:pPr/>
-              <a:t>4/30/2013</a:t>
+              <a:t>5/13/2013</a:t>
             </a:fld>
             <a:endParaRPr lang="en-US"/>
           </a:p>
@@ -2727,7 +2733,7 @@
             <a:fld id="{584B7511-42DF-4662-A467-A4414ACFB037}" type="datetimeFigureOut">
               <a:rPr lang="en-US" smtClean="0"/>
               <a:pPr/>
-              <a:t>4/30/2013</a:t>
+              <a:t>5/13/2013</a:t>
             </a:fld>
             <a:endParaRPr lang="en-US"/>
           </a:p>
@@ -3758,129 +3764,99 @@
       </p:grpSpPr>
       <p:sp>
         <p:nvSpPr>
-          <p:cNvPr id="4" name="Title 1"/>
-          <p:cNvSpPr txBox="1">
-            <a:spLocks/>
-          </p:cNvSpPr>
+          <p:cNvPr id="5" name="Title 1"/>
+          <p:cNvSpPr>
+            <a:spLocks noGrp="1"/>
+          </p:cNvSpPr>
+          <p:nvPr>
+            <p:ph type="title"/>
+          </p:nvPr>
+        </p:nvSpPr>
+        <p:spPr>
+          <a:xfrm>
+            <a:off x="457200" y="274638"/>
+            <a:ext cx="8229600" cy="1143000"/>
+          </a:xfrm>
+        </p:spPr>
+        <p:txBody>
+          <a:bodyPr>
+            <a:normAutofit fontScale="90000"/>
+          </a:bodyPr>
+          <a:lstStyle/>
+          <a:p>
+            <a:r>
+              <a:rPr lang="en-US" dirty="0" smtClean="0"/>
+              <a:t>Effect of </a:t>
+            </a:r>
+            <a:r>
+              <a:rPr lang="el-GR" dirty="0" smtClean="0"/>
+              <a:t>α</a:t>
+            </a:r>
+            <a:r>
+              <a:rPr lang="en-US" dirty="0" smtClean="0"/>
+              <a:t/>
+            </a:r>
+            <a:br>
+              <a:rPr lang="en-US" dirty="0" smtClean="0"/>
+            </a:br>
+            <a:r>
+              <a:rPr lang="el-GR" dirty="0" smtClean="0"/>
+              <a:t> </a:t>
+            </a:r>
+            <a:r>
+              <a:rPr lang="el-GR" dirty="0" smtClean="0">
+                <a:solidFill>
+                  <a:schemeClr val="bg1">
+                    <a:lumMod val="50000"/>
+                  </a:schemeClr>
+                </a:solidFill>
+              </a:rPr>
+              <a:t>α</a:t>
+            </a:r>
+            <a:r>
+              <a:rPr lang="en-US" dirty="0" smtClean="0">
+                <a:solidFill>
+                  <a:schemeClr val="bg1">
+                    <a:lumMod val="50000"/>
+                  </a:schemeClr>
+                </a:solidFill>
+              </a:rPr>
+              <a:t> = 1</a:t>
+            </a:r>
+            <a:endParaRPr lang="en-US" dirty="0">
+              <a:solidFill>
+                <a:schemeClr val="bg1">
+                  <a:lumMod val="50000"/>
+                </a:schemeClr>
+              </a:solidFill>
+            </a:endParaRPr>
+          </a:p>
+        </p:txBody>
+      </p:sp>
+      <p:pic>
+        <p:nvPicPr>
+          <p:cNvPr id="7" name="Picture 6" descr="stata_center_gradient_edges.jpg"/>
+          <p:cNvPicPr>
+            <a:picLocks noChangeAspect="1"/>
+          </p:cNvPicPr>
           <p:nvPr/>
-        </p:nvSpPr>
+        </p:nvPicPr>
+        <p:blipFill>
+          <a:blip r:embed="rId2" cstate="print"/>
+          <a:stretch>
+            <a:fillRect/>
+          </a:stretch>
+        </p:blipFill>
         <p:spPr>
           <a:xfrm>
-            <a:off x="685800" y="2130425"/>
-            <a:ext cx="7772400" cy="1470025"/>
+            <a:off x="2667000" y="1524000"/>
+            <a:ext cx="3771900" cy="5029200"/>
           </a:xfrm>
           <a:prstGeom prst="rect">
             <a:avLst/>
           </a:prstGeom>
         </p:spPr>
-        <p:txBody>
-          <a:bodyPr vert="horz" lIns="91440" tIns="45720" rIns="91440" bIns="45720" rtlCol="0" anchor="ctr">
-            <a:normAutofit fontScale="85000" lnSpcReduction="10000"/>
-          </a:bodyPr>
-          <a:lstStyle/>
-          <a:p>
-            <a:pPr marL="0" marR="0" lvl="0" indent="0" algn="ctr" defTabSz="914400" rtl="0" eaLnBrk="1" fontAlgn="auto" latinLnBrk="0" hangingPunct="1">
-              <a:lnSpc>
-                <a:spcPct val="100000"/>
-              </a:lnSpc>
-              <a:spcBef>
-                <a:spcPct val="0"/>
-              </a:spcBef>
-              <a:spcAft>
-                <a:spcPts val="0"/>
-              </a:spcAft>
-              <a:buClrTx/>
-              <a:buSzTx/>
-              <a:buFontTx/>
-              <a:buNone/>
-              <a:tabLst/>
-              <a:defRPr/>
-            </a:pPr>
-            <a:r>
-              <a:rPr kumimoji="0" lang="en-US" sz="6600" b="1" i="0" u="none" strike="noStrike" kern="1200" cap="none" spc="0" normalizeH="0" baseline="0" noProof="0" dirty="0" err="1" smtClean="0">
-                <a:ln>
-                  <a:noFill/>
-                </a:ln>
-                <a:solidFill>
-                  <a:srgbClr val="FF0000"/>
-                </a:solidFill>
-                <a:effectLst/>
-                <a:uLnTx/>
-                <a:uFillTx/>
-                <a:latin typeface="+mj-lt"/>
-                <a:ea typeface="+mj-ea"/>
-                <a:cs typeface="+mj-cs"/>
-              </a:rPr>
-              <a:t>Laplacian</a:t>
-            </a:r>
-            <a:r>
-              <a:rPr kumimoji="0" lang="en-US" sz="6600" b="1" i="0" u="none" strike="noStrike" kern="1200" cap="none" spc="0" normalizeH="0" baseline="0" noProof="0" dirty="0" smtClean="0">
-                <a:ln>
-                  <a:noFill/>
-                </a:ln>
-                <a:solidFill>
-                  <a:srgbClr val="FF0000"/>
-                </a:solidFill>
-                <a:effectLst/>
-                <a:uLnTx/>
-                <a:uFillTx/>
-                <a:latin typeface="+mj-lt"/>
-                <a:ea typeface="+mj-ea"/>
-                <a:cs typeface="+mj-cs"/>
-              </a:rPr>
-              <a:t>-based</a:t>
-            </a:r>
-            <a:r>
-              <a:rPr kumimoji="0" lang="en-US" sz="6600" b="1" i="0" u="none" strike="noStrike" kern="1200" cap="none" spc="0" normalizeH="0" noProof="0" dirty="0" smtClean="0">
-                <a:ln>
-                  <a:noFill/>
-                </a:ln>
-                <a:solidFill>
-                  <a:srgbClr val="FF0000"/>
-                </a:solidFill>
-                <a:effectLst/>
-                <a:uLnTx/>
-                <a:uFillTx/>
-                <a:latin typeface="+mj-lt"/>
-                <a:ea typeface="+mj-ea"/>
-                <a:cs typeface="+mj-cs"/>
-              </a:rPr>
-              <a:t> </a:t>
-            </a:r>
-            <a:r>
-              <a:rPr kumimoji="0" lang="en-US" sz="6600" b="1" i="0" u="none" strike="noStrike" kern="1200" cap="none" spc="0" normalizeH="0" baseline="0" noProof="0" dirty="0" smtClean="0">
-                <a:ln>
-                  <a:noFill/>
-                </a:ln>
-                <a:solidFill>
-                  <a:srgbClr val="FF0000"/>
-                </a:solidFill>
-                <a:effectLst/>
-                <a:uLnTx/>
-                <a:uFillTx/>
-                <a:latin typeface="+mj-lt"/>
-                <a:ea typeface="+mj-ea"/>
-                <a:cs typeface="+mj-cs"/>
-              </a:rPr>
-              <a:t>method</a:t>
-            </a:r>
-            <a:endParaRPr kumimoji="0" lang="en-US" sz="6600" b="1" i="0" u="none" strike="noStrike" kern="1200" cap="none" spc="0" normalizeH="0" baseline="0" noProof="0" dirty="0">
-              <a:ln>
-                <a:noFill/>
-              </a:ln>
-              <a:solidFill>
-                <a:srgbClr val="FF0000"/>
-              </a:solidFill>
-              <a:effectLst/>
-              <a:uLnTx/>
-              <a:uFillTx/>
-              <a:latin typeface="+mj-lt"/>
-              <a:ea typeface="+mj-ea"/>
-              <a:cs typeface="+mj-cs"/>
-            </a:endParaRPr>
-          </a:p>
-        </p:txBody>
-      </p:sp>
+      </p:pic>
     </p:spTree>
   </p:cSld>
   <p:clrMapOvr>
@@ -3915,7 +3891,7 @@
       </p:grpSpPr>
       <p:sp>
         <p:nvSpPr>
-          <p:cNvPr id="2" name="Title 1"/>
+          <p:cNvPr id="5" name="Title 1"/>
           <p:cNvSpPr>
             <a:spLocks noGrp="1"/>
           </p:cNvSpPr>
@@ -3923,7 +3899,12 @@
             <p:ph type="title"/>
           </p:nvPr>
         </p:nvSpPr>
-        <p:spPr/>
+        <p:spPr>
+          <a:xfrm>
+            <a:off x="457200" y="274638"/>
+            <a:ext cx="8229600" cy="1143000"/>
+          </a:xfrm>
+        </p:spPr>
         <p:txBody>
           <a:bodyPr>
             <a:normAutofit fontScale="90000"/>
@@ -3931,27 +3912,45 @@
           <a:lstStyle/>
           <a:p>
             <a:r>
-              <a:rPr lang="en-US" dirty="0" err="1" smtClean="0"/>
-              <a:t>Laplacian</a:t>
-            </a:r>
-            <a:r>
-              <a:rPr lang="en-US" dirty="0" smtClean="0"/>
-              <a:t>-based method</a:t>
+              <a:rPr lang="en-US" dirty="0" smtClean="0"/>
+              <a:t>Effect of </a:t>
+            </a:r>
+            <a:r>
+              <a:rPr lang="el-GR" dirty="0" smtClean="0"/>
+              <a:t>α</a:t>
+            </a:r>
+            <a:r>
+              <a:rPr lang="en-US" dirty="0" smtClean="0"/>
+              <a:t/>
             </a:r>
             <a:br>
               <a:rPr lang="en-US" dirty="0" smtClean="0"/>
             </a:br>
             <a:r>
-              <a:rPr lang="en-US" sz="3600" dirty="0" smtClean="0">
+              <a:rPr lang="el-GR" dirty="0" smtClean="0"/>
+              <a:t> </a:t>
+            </a:r>
+            <a:r>
+              <a:rPr lang="el-GR" dirty="0" smtClean="0">
                 <a:solidFill>
                   <a:schemeClr val="bg1">
                     <a:lumMod val="50000"/>
                   </a:schemeClr>
                 </a:solidFill>
               </a:rPr>
-              <a:t>Motivation</a:t>
-            </a:r>
-            <a:endParaRPr lang="en-US" sz="3600" dirty="0">
+              <a:t>α</a:t>
+            </a:r>
+            <a:r>
+              <a:rPr lang="en-US" dirty="0" smtClean="0">
+                <a:solidFill>
+                  <a:schemeClr val="bg1">
+                    <a:lumMod val="50000"/>
+                  </a:schemeClr>
+                </a:solidFill>
+              </a:rPr>
+              <a:t> = 1.5</a:t>
+            </a:r>
+            <a:endParaRPr lang="en-US" dirty="0">
               <a:solidFill>
                 <a:schemeClr val="bg1">
                   <a:lumMod val="50000"/>
@@ -3963,7 +3962,7 @@
       </p:sp>
       <p:pic>
         <p:nvPicPr>
-          <p:cNvPr id="4" name="Picture 3" descr="f.png"/>
+          <p:cNvPr id="6" name="Picture 5" descr="stata_center_gradient_edges.jpg"/>
           <p:cNvPicPr>
             <a:picLocks noChangeAspect="1"/>
           </p:cNvPicPr>
@@ -3977,130 +3976,14 @@
         </p:blipFill>
         <p:spPr>
           <a:xfrm>
-            <a:off x="914400" y="1752600"/>
-            <a:ext cx="4572000" cy="1957342"/>
+            <a:off x="2667000" y="1524000"/>
+            <a:ext cx="3771900" cy="5029200"/>
           </a:xfrm>
           <a:prstGeom prst="rect">
             <a:avLst/>
           </a:prstGeom>
-          <a:ln>
-            <a:noFill/>
-          </a:ln>
-          <a:effectLst>
-            <a:outerShdw blurRad="292100" dist="139700" dir="2700000" algn="tl" rotWithShape="0">
-              <a:srgbClr val="333333">
-                <a:alpha val="65000"/>
-              </a:srgbClr>
-            </a:outerShdw>
-          </a:effectLst>
         </p:spPr>
       </p:pic>
-      <p:pic>
-        <p:nvPicPr>
-          <p:cNvPr id="5" name="Picture 4" descr="f_derivative.png"/>
-          <p:cNvPicPr>
-            <a:picLocks noChangeAspect="1"/>
-          </p:cNvPicPr>
-          <p:nvPr/>
-        </p:nvPicPr>
-        <p:blipFill>
-          <a:blip r:embed="rId3" cstate="print"/>
-          <a:stretch>
-            <a:fillRect/>
-          </a:stretch>
-        </p:blipFill>
-        <p:spPr>
-          <a:xfrm>
-            <a:off x="914400" y="4160928"/>
-            <a:ext cx="4572000" cy="1926661"/>
-          </a:xfrm>
-          <a:prstGeom prst="rect">
-            <a:avLst/>
-          </a:prstGeom>
-          <a:ln>
-            <a:noFill/>
-          </a:ln>
-          <a:effectLst>
-            <a:outerShdw blurRad="292100" dist="139700" dir="2700000" algn="tl" rotWithShape="0">
-              <a:srgbClr val="333333">
-                <a:alpha val="65000"/>
-              </a:srgbClr>
-            </a:outerShdw>
-          </a:effectLst>
-        </p:spPr>
-      </p:pic>
-      <p:sp>
-        <p:nvSpPr>
-          <p:cNvPr id="6" name="TextBox 5"/>
-          <p:cNvSpPr txBox="1"/>
-          <p:nvPr/>
-        </p:nvSpPr>
-        <p:spPr>
-          <a:xfrm>
-            <a:off x="5715000" y="2514600"/>
-            <a:ext cx="508473" cy="369332"/>
-          </a:xfrm>
-          <a:prstGeom prst="rect">
-            <a:avLst/>
-          </a:prstGeom>
-          <a:noFill/>
-        </p:spPr>
-        <p:txBody>
-          <a:bodyPr wrap="none" rtlCol="0">
-            <a:spAutoFit/>
-          </a:bodyPr>
-          <a:lstStyle/>
-          <a:p>
-            <a:r>
-              <a:rPr lang="en-US" b="1" dirty="0" smtClean="0"/>
-              <a:t>f(x)</a:t>
-            </a:r>
-            <a:endParaRPr lang="en-US" b="1" dirty="0"/>
-          </a:p>
-        </p:txBody>
-      </p:sp>
-      <p:sp>
-        <p:nvSpPr>
-          <p:cNvPr id="7" name="TextBox 6"/>
-          <p:cNvSpPr txBox="1"/>
-          <p:nvPr/>
-        </p:nvSpPr>
-        <p:spPr>
-          <a:xfrm>
-            <a:off x="5715000" y="4888468"/>
-            <a:ext cx="1156086" cy="369332"/>
-          </a:xfrm>
-          <a:prstGeom prst="rect">
-            <a:avLst/>
-          </a:prstGeom>
-          <a:noFill/>
-        </p:spPr>
-        <p:txBody>
-          <a:bodyPr wrap="none" rtlCol="0">
-            <a:spAutoFit/>
-          </a:bodyPr>
-          <a:lstStyle/>
-          <a:p>
-            <a:r>
-              <a:rPr lang="en-US" b="1" dirty="0" smtClean="0"/>
-              <a:t>d</a:t>
-            </a:r>
-            <a:r>
-              <a:rPr lang="en-US" b="1" baseline="30000" dirty="0" smtClean="0"/>
-              <a:t>2</a:t>
-            </a:r>
-            <a:r>
-              <a:rPr lang="en-US" b="1" dirty="0" smtClean="0"/>
-              <a:t>f(x)/dx</a:t>
-            </a:r>
-            <a:r>
-              <a:rPr lang="en-US" b="1" baseline="30000" dirty="0" smtClean="0"/>
-              <a:t>2</a:t>
-            </a:r>
-            <a:endParaRPr lang="en-US" b="1" baseline="30000" dirty="0"/>
-          </a:p>
-        </p:txBody>
-      </p:sp>
     </p:spTree>
   </p:cSld>
   <p:clrMapOvr>
@@ -4135,7 +4018,7 @@
       </p:grpSpPr>
       <p:sp>
         <p:nvSpPr>
-          <p:cNvPr id="2" name="Title 1"/>
+          <p:cNvPr id="5" name="Title 1"/>
           <p:cNvSpPr>
             <a:spLocks noGrp="1"/>
           </p:cNvSpPr>
@@ -4143,7 +4026,12 @@
             <p:ph type="title"/>
           </p:nvPr>
         </p:nvSpPr>
-        <p:spPr/>
+        <p:spPr>
+          <a:xfrm>
+            <a:off x="457200" y="274638"/>
+            <a:ext cx="8229600" cy="1143000"/>
+          </a:xfrm>
+        </p:spPr>
         <p:txBody>
           <a:bodyPr>
             <a:normAutofit fontScale="90000"/>
@@ -4151,33 +4039,57 @@
           <a:lstStyle/>
           <a:p>
             <a:r>
-              <a:rPr lang="en-US" dirty="0" err="1" smtClean="0"/>
-              <a:t>Laplacian</a:t>
-            </a:r>
-            <a:r>
-              <a:rPr lang="en-US" dirty="0" smtClean="0"/>
-              <a:t>-based method</a:t>
+              <a:rPr lang="en-US" dirty="0" smtClean="0"/>
+              <a:t>Effect of </a:t>
+            </a:r>
+            <a:r>
+              <a:rPr lang="el-GR" dirty="0" smtClean="0"/>
+              <a:t>α</a:t>
+            </a:r>
+            <a:r>
+              <a:rPr lang="en-US" dirty="0" smtClean="0"/>
+              <a:t/>
             </a:r>
             <a:br>
               <a:rPr lang="en-US" dirty="0" smtClean="0"/>
             </a:br>
             <a:r>
-              <a:rPr lang="en-US" sz="3600" dirty="0" smtClean="0">
+              <a:rPr lang="el-GR" dirty="0" smtClean="0"/>
+              <a:t> </a:t>
+            </a:r>
+            <a:r>
+              <a:rPr lang="el-GR" dirty="0" smtClean="0">
                 <a:solidFill>
                   <a:schemeClr val="bg1">
                     <a:lumMod val="50000"/>
                   </a:schemeClr>
                 </a:solidFill>
               </a:rPr>
-              <a:t>Steps</a:t>
-            </a:r>
-            <a:endParaRPr lang="en-US" dirty="0"/>
+              <a:t>α</a:t>
+            </a:r>
+            <a:r>
+              <a:rPr lang="en-US" dirty="0" smtClean="0">
+                <a:solidFill>
+                  <a:schemeClr val="bg1">
+                    <a:lumMod val="50000"/>
+                  </a:schemeClr>
+                </a:solidFill>
+              </a:rPr>
+              <a:t> = 2</a:t>
+            </a:r>
+            <a:endParaRPr lang="en-US" dirty="0">
+              <a:solidFill>
+                <a:schemeClr val="bg1">
+                  <a:lumMod val="50000"/>
+                </a:schemeClr>
+              </a:solidFill>
+            </a:endParaRPr>
           </a:p>
         </p:txBody>
       </p:sp>
       <p:pic>
         <p:nvPicPr>
-          <p:cNvPr id="4" name="Picture 3" descr="LaplacianMethod.png"/>
+          <p:cNvPr id="4" name="Picture 3" descr="stata_center_gradient_edges.jpg"/>
           <p:cNvPicPr>
             <a:picLocks noChangeAspect="1"/>
           </p:cNvPicPr>
@@ -4191,8 +4103,8 @@
         </p:blipFill>
         <p:spPr>
           <a:xfrm>
-            <a:off x="0" y="2273170"/>
-            <a:ext cx="9144000" cy="2311660"/>
+            <a:off x="2667000" y="1524000"/>
+            <a:ext cx="3771900" cy="5029200"/>
           </a:xfrm>
           <a:prstGeom prst="rect">
             <a:avLst/>
@@ -4233,7 +4145,7 @@
       </p:grpSpPr>
       <p:sp>
         <p:nvSpPr>
-          <p:cNvPr id="2" name="Title 1"/>
+          <p:cNvPr id="5" name="Title 1"/>
           <p:cNvSpPr>
             <a:spLocks noGrp="1"/>
           </p:cNvSpPr>
@@ -4241,7 +4153,12 @@
             <p:ph type="title"/>
           </p:nvPr>
         </p:nvSpPr>
-        <p:spPr/>
+        <p:spPr>
+          <a:xfrm>
+            <a:off x="457200" y="274638"/>
+            <a:ext cx="8229600" cy="1143000"/>
+          </a:xfrm>
+        </p:spPr>
         <p:txBody>
           <a:bodyPr>
             <a:normAutofit fontScale="90000"/>
@@ -4249,33 +4166,57 @@
           <a:lstStyle/>
           <a:p>
             <a:r>
-              <a:rPr lang="en-US" dirty="0" err="1" smtClean="0"/>
-              <a:t>Laplacian</a:t>
-            </a:r>
-            <a:r>
-              <a:rPr lang="en-US" dirty="0" smtClean="0"/>
-              <a:t>-based method</a:t>
+              <a:rPr lang="en-US" dirty="0" smtClean="0"/>
+              <a:t>Effect of </a:t>
+            </a:r>
+            <a:r>
+              <a:rPr lang="el-GR" dirty="0" smtClean="0"/>
+              <a:t>α</a:t>
+            </a:r>
+            <a:r>
+              <a:rPr lang="en-US" dirty="0" smtClean="0"/>
+              <a:t/>
             </a:r>
             <a:br>
               <a:rPr lang="en-US" dirty="0" smtClean="0"/>
             </a:br>
             <a:r>
-              <a:rPr lang="en-US" sz="3600" dirty="0" smtClean="0">
+              <a:rPr lang="el-GR" dirty="0" smtClean="0"/>
+              <a:t> </a:t>
+            </a:r>
+            <a:r>
+              <a:rPr lang="el-GR" dirty="0" smtClean="0">
                 <a:solidFill>
                   <a:schemeClr val="bg1">
                     <a:lumMod val="50000"/>
                   </a:schemeClr>
                 </a:solidFill>
               </a:rPr>
-              <a:t>Steps</a:t>
-            </a:r>
-            <a:endParaRPr lang="en-US" dirty="0"/>
+              <a:t>α</a:t>
+            </a:r>
+            <a:r>
+              <a:rPr lang="en-US" dirty="0" smtClean="0">
+                <a:solidFill>
+                  <a:schemeClr val="bg1">
+                    <a:lumMod val="50000"/>
+                  </a:schemeClr>
+                </a:solidFill>
+              </a:rPr>
+              <a:t> = 3</a:t>
+            </a:r>
+            <a:endParaRPr lang="en-US" dirty="0">
+              <a:solidFill>
+                <a:schemeClr val="bg1">
+                  <a:lumMod val="50000"/>
+                </a:schemeClr>
+              </a:solidFill>
+            </a:endParaRPr>
           </a:p>
         </p:txBody>
       </p:sp>
       <p:pic>
         <p:nvPicPr>
-          <p:cNvPr id="4" name="Picture 3" descr="LaplacianMethod.png"/>
+          <p:cNvPr id="4" name="Picture 3" descr="stata_center_gradient_edges.jpg"/>
           <p:cNvPicPr>
             <a:picLocks noChangeAspect="1"/>
           </p:cNvPicPr>
@@ -4289,108 +4230,12 @@
         </p:blipFill>
         <p:spPr>
           <a:xfrm>
-            <a:off x="0" y="1600200"/>
-            <a:ext cx="9144000" cy="2311660"/>
+            <a:off x="2667000" y="1524000"/>
+            <a:ext cx="3771900" cy="5029200"/>
           </a:xfrm>
           <a:prstGeom prst="rect">
             <a:avLst/>
           </a:prstGeom>
-        </p:spPr>
-      </p:pic>
-      <p:sp>
-        <p:nvSpPr>
-          <p:cNvPr id="5" name="Oval 4"/>
-          <p:cNvSpPr/>
-          <p:nvPr/>
-        </p:nvSpPr>
-        <p:spPr>
-          <a:xfrm>
-            <a:off x="1447800" y="2956810"/>
-            <a:ext cx="990600" cy="914400"/>
-          </a:xfrm>
-          <a:prstGeom prst="ellipse">
-            <a:avLst/>
-          </a:prstGeom>
-          <a:noFill/>
-          <a:ln w="57150">
-            <a:solidFill>
-              <a:srgbClr val="FF0000"/>
-            </a:solidFill>
-          </a:ln>
-          <a:effectLst>
-            <a:outerShdw blurRad="44450" dist="27940" dir="5400000" algn="ctr">
-              <a:srgbClr val="000000">
-                <a:alpha val="32000"/>
-              </a:srgbClr>
-            </a:outerShdw>
-          </a:effectLst>
-          <a:scene3d>
-            <a:camera prst="orthographicFront">
-              <a:rot lat="0" lon="0" rev="0"/>
-            </a:camera>
-            <a:lightRig rig="balanced" dir="t">
-              <a:rot lat="0" lon="0" rev="8700000"/>
-            </a:lightRig>
-          </a:scene3d>
-          <a:sp3d>
-            <a:bevelT w="190500" h="38100"/>
-          </a:sp3d>
-        </p:spPr>
-        <p:style>
-          <a:lnRef idx="2">
-            <a:schemeClr val="accent1">
-              <a:shade val="50000"/>
-            </a:schemeClr>
-          </a:lnRef>
-          <a:fillRef idx="1">
-            <a:schemeClr val="accent1"/>
-          </a:fillRef>
-          <a:effectRef idx="0">
-            <a:schemeClr val="accent1"/>
-          </a:effectRef>
-          <a:fontRef idx="minor">
-            <a:schemeClr val="lt1"/>
-          </a:fontRef>
-        </p:style>
-        <p:txBody>
-          <a:bodyPr rtlCol="0" anchor="ctr"/>
-          <a:lstStyle/>
-          <a:p>
-            <a:pPr algn="ctr"/>
-            <a:endParaRPr lang="en-US"/>
-          </a:p>
-        </p:txBody>
-      </p:sp>
-      <p:pic>
-        <p:nvPicPr>
-          <p:cNvPr id="3074" name="Picture 2"/>
-          <p:cNvPicPr>
-            <a:picLocks noChangeAspect="1" noChangeArrowheads="1"/>
-          </p:cNvPicPr>
-          <p:nvPr/>
-        </p:nvPicPr>
-        <p:blipFill>
-          <a:blip r:embed="rId3" cstate="print"/>
-          <a:srcRect/>
-          <a:stretch>
-            <a:fillRect/>
-          </a:stretch>
-        </p:blipFill>
-        <p:spPr bwMode="auto">
-          <a:xfrm>
-            <a:off x="3124200" y="4191000"/>
-            <a:ext cx="2828925" cy="2228850"/>
-          </a:xfrm>
-          <a:prstGeom prst="rect">
-            <a:avLst/>
-          </a:prstGeom>
-          <a:noFill/>
-          <a:ln w="9525">
-            <a:noFill/>
-            <a:miter lim="800000"/>
-            <a:headEnd/>
-            <a:tailEnd/>
-          </a:ln>
         </p:spPr>
       </p:pic>
     </p:spTree>
@@ -4556,230 +4401,129 @@
       </p:grpSpPr>
       <p:sp>
         <p:nvSpPr>
-          <p:cNvPr id="2" name="Title 1"/>
-          <p:cNvSpPr>
-            <a:spLocks noGrp="1"/>
-          </p:cNvSpPr>
-          <p:nvPr>
-            <p:ph type="title"/>
-          </p:nvPr>
-        </p:nvSpPr>
-        <p:spPr/>
-        <p:txBody>
-          <a:bodyPr>
-            <a:normAutofit fontScale="90000"/>
-          </a:bodyPr>
-          <a:lstStyle/>
-          <a:p>
-            <a:r>
-              <a:rPr lang="en-US" dirty="0" err="1" smtClean="0"/>
-              <a:t>Laplacian</a:t>
-            </a:r>
-            <a:r>
-              <a:rPr lang="en-US" dirty="0" smtClean="0"/>
-              <a:t>-based method</a:t>
-            </a:r>
-            <a:br>
-              <a:rPr lang="en-US" dirty="0" smtClean="0"/>
-            </a:br>
-            <a:r>
-              <a:rPr lang="en-US" sz="3600" dirty="0" smtClean="0">
-                <a:solidFill>
-                  <a:schemeClr val="bg1">
-                    <a:lumMod val="50000"/>
-                  </a:schemeClr>
-                </a:solidFill>
-              </a:rPr>
-              <a:t>Steps</a:t>
-            </a:r>
-            <a:endParaRPr lang="en-US" dirty="0"/>
-          </a:p>
-        </p:txBody>
-      </p:sp>
-      <p:pic>
-        <p:nvPicPr>
-          <p:cNvPr id="4" name="Picture 3" descr="LaplacianMethod.png"/>
-          <p:cNvPicPr>
-            <a:picLocks noChangeAspect="1"/>
-          </p:cNvPicPr>
+          <p:cNvPr id="4" name="Title 1"/>
+          <p:cNvSpPr txBox="1">
+            <a:spLocks/>
+          </p:cNvSpPr>
           <p:nvPr/>
-        </p:nvPicPr>
-        <p:blipFill>
-          <a:blip r:embed="rId2" cstate="print"/>
-          <a:stretch>
-            <a:fillRect/>
-          </a:stretch>
-        </p:blipFill>
+        </p:nvSpPr>
         <p:spPr>
           <a:xfrm>
-            <a:off x="0" y="1524000"/>
-            <a:ext cx="9144000" cy="2311660"/>
+            <a:off x="685800" y="2130425"/>
+            <a:ext cx="7772400" cy="1470025"/>
           </a:xfrm>
           <a:prstGeom prst="rect">
             <a:avLst/>
           </a:prstGeom>
         </p:spPr>
-      </p:pic>
-      <p:sp>
-        <p:nvSpPr>
-          <p:cNvPr id="5" name="Oval 4"/>
-          <p:cNvSpPr/>
-          <p:nvPr/>
-        </p:nvSpPr>
-        <p:spPr>
-          <a:xfrm>
-            <a:off x="4800600" y="2895600"/>
-            <a:ext cx="990600" cy="914400"/>
-          </a:xfrm>
-          <a:prstGeom prst="ellipse">
-            <a:avLst/>
-          </a:prstGeom>
-          <a:noFill/>
-          <a:ln w="57150">
-            <a:solidFill>
-              <a:srgbClr val="FF0000"/>
-            </a:solidFill>
-          </a:ln>
-          <a:effectLst>
-            <a:outerShdw blurRad="44450" dist="27940" dir="5400000" algn="ctr">
-              <a:srgbClr val="000000">
-                <a:alpha val="32000"/>
-              </a:srgbClr>
-            </a:outerShdw>
-          </a:effectLst>
-          <a:scene3d>
-            <a:camera prst="orthographicFront">
-              <a:rot lat="0" lon="0" rev="0"/>
-            </a:camera>
-            <a:lightRig rig="balanced" dir="t">
-              <a:rot lat="0" lon="0" rev="8700000"/>
-            </a:lightRig>
-          </a:scene3d>
-          <a:sp3d>
-            <a:bevelT w="190500" h="38100"/>
-          </a:sp3d>
-        </p:spPr>
-        <p:style>
-          <a:lnRef idx="2">
-            <a:schemeClr val="accent1">
-              <a:shade val="50000"/>
-            </a:schemeClr>
-          </a:lnRef>
-          <a:fillRef idx="1">
-            <a:schemeClr val="accent1"/>
-          </a:fillRef>
-          <a:effectRef idx="0">
-            <a:schemeClr val="accent1"/>
-          </a:effectRef>
-          <a:fontRef idx="minor">
-            <a:schemeClr val="lt1"/>
-          </a:fontRef>
-        </p:style>
-        <p:txBody>
-          <a:bodyPr rtlCol="0" anchor="ctr"/>
-          <a:lstStyle/>
-          <a:p>
-            <a:pPr algn="ctr"/>
-            <a:endParaRPr lang="en-US"/>
-          </a:p>
-        </p:txBody>
-      </p:sp>
-      <p:pic>
-        <p:nvPicPr>
-          <p:cNvPr id="8" name="Picture 4"/>
-          <p:cNvPicPr>
-            <a:picLocks noChangeAspect="1" noChangeArrowheads="1"/>
-          </p:cNvPicPr>
-          <p:nvPr/>
-        </p:nvPicPr>
-        <p:blipFill>
-          <a:blip r:embed="rId3" cstate="print"/>
-          <a:srcRect/>
-          <a:stretch>
-            <a:fillRect/>
-          </a:stretch>
-        </p:blipFill>
-        <p:spPr bwMode="auto">
-          <a:xfrm>
-            <a:off x="2362200" y="4000500"/>
-            <a:ext cx="4286250" cy="419100"/>
-          </a:xfrm>
-          <a:prstGeom prst="rect">
-            <a:avLst/>
-          </a:prstGeom>
-          <a:noFill/>
-          <a:ln w="9525">
-            <a:noFill/>
-            <a:miter lim="800000"/>
-            <a:headEnd/>
-            <a:tailEnd/>
-          </a:ln>
-        </p:spPr>
-      </p:pic>
-      <p:pic>
-        <p:nvPicPr>
-          <p:cNvPr id="2050" name="Picture 2"/>
-          <p:cNvPicPr>
-            <a:picLocks noChangeAspect="1" noChangeArrowheads="1"/>
-          </p:cNvPicPr>
-          <p:nvPr/>
-        </p:nvPicPr>
-        <p:blipFill>
-          <a:blip r:embed="rId4" cstate="print"/>
-          <a:srcRect/>
-          <a:stretch>
-            <a:fillRect/>
-          </a:stretch>
-        </p:blipFill>
-        <p:spPr bwMode="auto">
-          <a:xfrm>
-            <a:off x="2438400" y="5791200"/>
-            <a:ext cx="5267325" cy="676275"/>
-          </a:xfrm>
-          <a:prstGeom prst="rect">
-            <a:avLst/>
-          </a:prstGeom>
-          <a:noFill/>
-          <a:ln w="9525">
-            <a:noFill/>
-            <a:miter lim="800000"/>
-            <a:headEnd/>
-            <a:tailEnd/>
-          </a:ln>
-        </p:spPr>
-      </p:pic>
-      <p:pic>
-        <p:nvPicPr>
-          <p:cNvPr id="3" name="Picture 2"/>
-          <p:cNvPicPr>
-            <a:picLocks noChangeAspect="1" noChangeArrowheads="1"/>
-          </p:cNvPicPr>
-          <p:nvPr/>
-        </p:nvPicPr>
-        <p:blipFill>
-          <a:blip r:embed="rId5" cstate="print"/>
-          <a:srcRect/>
-          <a:stretch>
-            <a:fillRect/>
-          </a:stretch>
-        </p:blipFill>
-        <p:spPr bwMode="auto">
-          <a:xfrm>
-            <a:off x="1996402" y="4419600"/>
-            <a:ext cx="5318798" cy="1247775"/>
-          </a:xfrm>
-          <a:prstGeom prst="rect">
-            <a:avLst/>
-          </a:prstGeom>
-          <a:noFill/>
-          <a:ln w="9525">
-            <a:noFill/>
-            <a:miter lim="800000"/>
-            <a:headEnd/>
-            <a:tailEnd/>
-          </a:ln>
-        </p:spPr>
-      </p:pic>
+        <p:txBody>
+          <a:bodyPr vert="horz" lIns="91440" tIns="45720" rIns="91440" bIns="45720" rtlCol="0" anchor="ctr">
+            <a:normAutofit fontScale="85000" lnSpcReduction="10000"/>
+          </a:bodyPr>
+          <a:lstStyle/>
+          <a:p>
+            <a:pPr marL="0" marR="0" lvl="0" indent="0" algn="ctr" defTabSz="914400" rtl="0" eaLnBrk="1" fontAlgn="auto" latinLnBrk="0" hangingPunct="1">
+              <a:lnSpc>
+                <a:spcPct val="100000"/>
+              </a:lnSpc>
+              <a:spcBef>
+                <a:spcPct val="0"/>
+              </a:spcBef>
+              <a:spcAft>
+                <a:spcPts val="0"/>
+              </a:spcAft>
+              <a:buClrTx/>
+              <a:buSzTx/>
+              <a:buFontTx/>
+              <a:buNone/>
+              <a:tabLst/>
+              <a:defRPr/>
+            </a:pPr>
+            <a:r>
+              <a:rPr kumimoji="0" lang="en-US" sz="6600" b="1" i="0" u="none" strike="noStrike" kern="1200" cap="none" spc="0" normalizeH="0" baseline="0" noProof="0" dirty="0" err="1" smtClean="0">
+                <a:ln>
+                  <a:noFill/>
+                </a:ln>
+                <a:solidFill>
+                  <a:srgbClr val="FF0000"/>
+                </a:solidFill>
+                <a:effectLst/>
+                <a:uLnTx/>
+                <a:uFillTx/>
+                <a:latin typeface="+mj-lt"/>
+                <a:ea typeface="+mj-ea"/>
+                <a:cs typeface="+mj-cs"/>
+              </a:rPr>
+              <a:t>Laplacian</a:t>
+            </a:r>
+            <a:r>
+              <a:rPr kumimoji="0" lang="en-US" sz="6600" b="1" i="0" u="none" strike="noStrike" kern="1200" cap="none" spc="0" normalizeH="0" baseline="0" noProof="0" dirty="0" smtClean="0">
+                <a:ln>
+                  <a:noFill/>
+                </a:ln>
+                <a:solidFill>
+                  <a:srgbClr val="FF0000"/>
+                </a:solidFill>
+                <a:effectLst/>
+                <a:uLnTx/>
+                <a:uFillTx/>
+                <a:latin typeface="+mj-lt"/>
+                <a:ea typeface="+mj-ea"/>
+                <a:cs typeface="+mj-cs"/>
+              </a:rPr>
+              <a:t>-based</a:t>
+            </a:r>
+            <a:r>
+              <a:rPr kumimoji="0" lang="en-US" sz="6600" b="1" i="0" u="none" strike="noStrike" kern="1200" cap="none" spc="0" normalizeH="0" noProof="0" dirty="0" smtClean="0">
+                <a:ln>
+                  <a:noFill/>
+                </a:ln>
+                <a:solidFill>
+                  <a:srgbClr val="FF0000"/>
+                </a:solidFill>
+                <a:effectLst/>
+                <a:uLnTx/>
+                <a:uFillTx/>
+                <a:latin typeface="+mj-lt"/>
+                <a:ea typeface="+mj-ea"/>
+                <a:cs typeface="+mj-cs"/>
+              </a:rPr>
+              <a:t> </a:t>
+            </a:r>
+            <a:r>
+              <a:rPr kumimoji="0" lang="en-US" sz="6600" b="1" i="0" u="none" strike="noStrike" kern="1200" cap="none" spc="0" normalizeH="0" baseline="0" noProof="0" dirty="0" smtClean="0">
+                <a:ln>
+                  <a:noFill/>
+                </a:ln>
+                <a:solidFill>
+                  <a:srgbClr val="FF0000"/>
+                </a:solidFill>
+                <a:effectLst/>
+                <a:uLnTx/>
+                <a:uFillTx/>
+                <a:latin typeface="+mj-lt"/>
+                <a:ea typeface="+mj-ea"/>
+                <a:cs typeface="+mj-cs"/>
+              </a:rPr>
+              <a:t>method</a:t>
+            </a:r>
+            <a:endParaRPr kumimoji="0" lang="en-US" sz="6600" b="1" i="0" u="none" strike="noStrike" kern="1200" cap="none" spc="0" normalizeH="0" baseline="0" noProof="0" dirty="0">
+              <a:ln>
+                <a:noFill/>
+              </a:ln>
+              <a:solidFill>
+                <a:srgbClr val="FF0000"/>
+              </a:solidFill>
+              <a:effectLst/>
+              <a:uLnTx/>
+              <a:uFillTx/>
+              <a:latin typeface="+mj-lt"/>
+              <a:ea typeface="+mj-ea"/>
+              <a:cs typeface="+mj-cs"/>
+            </a:endParaRPr>
+          </a:p>
+        </p:txBody>
+      </p:sp>
     </p:spTree>
   </p:cSld>
   <p:clrMapOvr>
@@ -4848,15 +4592,21 @@
                   </a:schemeClr>
                 </a:solidFill>
               </a:rPr>
-              <a:t>Example 1</a:t>
-            </a:r>
-            <a:endParaRPr lang="en-US" dirty="0"/>
+              <a:t>Motivation</a:t>
+            </a:r>
+            <a:endParaRPr lang="en-US" sz="3600" dirty="0">
+              <a:solidFill>
+                <a:schemeClr val="bg1">
+                  <a:lumMod val="50000"/>
+                </a:schemeClr>
+              </a:solidFill>
+            </a:endParaRPr>
           </a:p>
         </p:txBody>
       </p:sp>
       <p:pic>
         <p:nvPicPr>
-          <p:cNvPr id="6" name="Picture 5" descr="lena.png"/>
+          <p:cNvPr id="4" name="Picture 3" descr="f.png"/>
           <p:cNvPicPr>
             <a:picLocks noChangeAspect="1"/>
           </p:cNvPicPr>
@@ -4870,14 +4620,130 @@
         </p:blipFill>
         <p:spPr>
           <a:xfrm>
-            <a:off x="2133600" y="1447800"/>
-            <a:ext cx="4876800" cy="4876800"/>
+            <a:off x="914400" y="1752600"/>
+            <a:ext cx="4572000" cy="1957342"/>
           </a:xfrm>
           <a:prstGeom prst="rect">
             <a:avLst/>
           </a:prstGeom>
+          <a:ln>
+            <a:noFill/>
+          </a:ln>
+          <a:effectLst>
+            <a:outerShdw blurRad="292100" dist="139700" dir="2700000" algn="tl" rotWithShape="0">
+              <a:srgbClr val="333333">
+                <a:alpha val="65000"/>
+              </a:srgbClr>
+            </a:outerShdw>
+          </a:effectLst>
         </p:spPr>
       </p:pic>
+      <p:pic>
+        <p:nvPicPr>
+          <p:cNvPr id="5" name="Picture 4" descr="f_derivative.png"/>
+          <p:cNvPicPr>
+            <a:picLocks noChangeAspect="1"/>
+          </p:cNvPicPr>
+          <p:nvPr/>
+        </p:nvPicPr>
+        <p:blipFill>
+          <a:blip r:embed="rId3" cstate="print"/>
+          <a:stretch>
+            <a:fillRect/>
+          </a:stretch>
+        </p:blipFill>
+        <p:spPr>
+          <a:xfrm>
+            <a:off x="914400" y="4160928"/>
+            <a:ext cx="4572000" cy="1926661"/>
+          </a:xfrm>
+          <a:prstGeom prst="rect">
+            <a:avLst/>
+          </a:prstGeom>
+          <a:ln>
+            <a:noFill/>
+          </a:ln>
+          <a:effectLst>
+            <a:outerShdw blurRad="292100" dist="139700" dir="2700000" algn="tl" rotWithShape="0">
+              <a:srgbClr val="333333">
+                <a:alpha val="65000"/>
+              </a:srgbClr>
+            </a:outerShdw>
+          </a:effectLst>
+        </p:spPr>
+      </p:pic>
+      <p:sp>
+        <p:nvSpPr>
+          <p:cNvPr id="6" name="TextBox 5"/>
+          <p:cNvSpPr txBox="1"/>
+          <p:nvPr/>
+        </p:nvSpPr>
+        <p:spPr>
+          <a:xfrm>
+            <a:off x="5715000" y="2514600"/>
+            <a:ext cx="508473" cy="369332"/>
+          </a:xfrm>
+          <a:prstGeom prst="rect">
+            <a:avLst/>
+          </a:prstGeom>
+          <a:noFill/>
+        </p:spPr>
+        <p:txBody>
+          <a:bodyPr wrap="none" rtlCol="0">
+            <a:spAutoFit/>
+          </a:bodyPr>
+          <a:lstStyle/>
+          <a:p>
+            <a:r>
+              <a:rPr lang="en-US" b="1" dirty="0" smtClean="0"/>
+              <a:t>f(x)</a:t>
+            </a:r>
+            <a:endParaRPr lang="en-US" b="1" dirty="0"/>
+          </a:p>
+        </p:txBody>
+      </p:sp>
+      <p:sp>
+        <p:nvSpPr>
+          <p:cNvPr id="7" name="TextBox 6"/>
+          <p:cNvSpPr txBox="1"/>
+          <p:nvPr/>
+        </p:nvSpPr>
+        <p:spPr>
+          <a:xfrm>
+            <a:off x="5715000" y="4888468"/>
+            <a:ext cx="1156086" cy="369332"/>
+          </a:xfrm>
+          <a:prstGeom prst="rect">
+            <a:avLst/>
+          </a:prstGeom>
+          <a:noFill/>
+        </p:spPr>
+        <p:txBody>
+          <a:bodyPr wrap="none" rtlCol="0">
+            <a:spAutoFit/>
+          </a:bodyPr>
+          <a:lstStyle/>
+          <a:p>
+            <a:r>
+              <a:rPr lang="en-US" b="1" dirty="0" smtClean="0"/>
+              <a:t>d</a:t>
+            </a:r>
+            <a:r>
+              <a:rPr lang="en-US" b="1" baseline="30000" dirty="0" smtClean="0"/>
+              <a:t>2</a:t>
+            </a:r>
+            <a:r>
+              <a:rPr lang="en-US" b="1" dirty="0" smtClean="0"/>
+              <a:t>f(x)/dx</a:t>
+            </a:r>
+            <a:r>
+              <a:rPr lang="en-US" b="1" baseline="30000" dirty="0" smtClean="0"/>
+              <a:t>2</a:t>
+            </a:r>
+            <a:endParaRPr lang="en-US" b="1" baseline="30000" dirty="0"/>
+          </a:p>
+        </p:txBody>
+      </p:sp>
     </p:spTree>
   </p:cSld>
   <p:clrMapOvr>
@@ -4946,7 +4812,7 @@
                   </a:schemeClr>
                 </a:solidFill>
               </a:rPr>
-              <a:t>Example 1</a:t>
+              <a:t>Steps</a:t>
             </a:r>
             <a:endParaRPr lang="en-US" dirty="0"/>
           </a:p>
@@ -4954,7 +4820,7 @@
       </p:sp>
       <p:pic>
         <p:nvPicPr>
-          <p:cNvPr id="4" name="Picture 3" descr="lena_laplacian_edges.png"/>
+          <p:cNvPr id="4" name="Picture 3" descr="LaplacianMethod.png"/>
           <p:cNvPicPr>
             <a:picLocks noChangeAspect="1"/>
           </p:cNvPicPr>
@@ -4968,8 +4834,8 @@
         </p:blipFill>
         <p:spPr>
           <a:xfrm>
-            <a:off x="2133600" y="1447800"/>
-            <a:ext cx="4876800" cy="4876800"/>
+            <a:off x="0" y="2273170"/>
+            <a:ext cx="9144000" cy="2311660"/>
           </a:xfrm>
           <a:prstGeom prst="rect">
             <a:avLst/>
@@ -5044,7 +4910,7 @@
                   </a:schemeClr>
                 </a:solidFill>
               </a:rPr>
-              <a:t>Example 2</a:t>
+              <a:t>Steps</a:t>
             </a:r>
             <a:endParaRPr lang="en-US" dirty="0"/>
           </a:p>
@@ -5052,7 +4918,7 @@
       </p:sp>
       <p:pic>
         <p:nvPicPr>
-          <p:cNvPr id="5" name="Picture 4" descr="stata_center.jpg"/>
+          <p:cNvPr id="4" name="Picture 3" descr="LaplacianMethod.png"/>
           <p:cNvPicPr>
             <a:picLocks noChangeAspect="1"/>
           </p:cNvPicPr>
@@ -5066,12 +4932,108 @@
         </p:blipFill>
         <p:spPr>
           <a:xfrm>
-            <a:off x="2667000" y="1524000"/>
-            <a:ext cx="3771900" cy="5029200"/>
+            <a:off x="0" y="1600200"/>
+            <a:ext cx="9144000" cy="2311660"/>
           </a:xfrm>
           <a:prstGeom prst="rect">
             <a:avLst/>
           </a:prstGeom>
+        </p:spPr>
+      </p:pic>
+      <p:sp>
+        <p:nvSpPr>
+          <p:cNvPr id="5" name="Oval 4"/>
+          <p:cNvSpPr/>
+          <p:nvPr/>
+        </p:nvSpPr>
+        <p:spPr>
+          <a:xfrm>
+            <a:off x="1447800" y="2956810"/>
+            <a:ext cx="990600" cy="914400"/>
+          </a:xfrm>
+          <a:prstGeom prst="ellipse">
+            <a:avLst/>
+          </a:prstGeom>
+          <a:noFill/>
+          <a:ln w="57150">
+            <a:solidFill>
+              <a:srgbClr val="FF0000"/>
+            </a:solidFill>
+          </a:ln>
+          <a:effectLst>
+            <a:outerShdw blurRad="44450" dist="27940" dir="5400000" algn="ctr">
+              <a:srgbClr val="000000">
+                <a:alpha val="32000"/>
+              </a:srgbClr>
+            </a:outerShdw>
+          </a:effectLst>
+          <a:scene3d>
+            <a:camera prst="orthographicFront">
+              <a:rot lat="0" lon="0" rev="0"/>
+            </a:camera>
+            <a:lightRig rig="balanced" dir="t">
+              <a:rot lat="0" lon="0" rev="8700000"/>
+            </a:lightRig>
+          </a:scene3d>
+          <a:sp3d>
+            <a:bevelT w="190500" h="38100"/>
+          </a:sp3d>
+        </p:spPr>
+        <p:style>
+          <a:lnRef idx="2">
+            <a:schemeClr val="accent1">
+              <a:shade val="50000"/>
+            </a:schemeClr>
+          </a:lnRef>
+          <a:fillRef idx="1">
+            <a:schemeClr val="accent1"/>
+          </a:fillRef>
+          <a:effectRef idx="0">
+            <a:schemeClr val="accent1"/>
+          </a:effectRef>
+          <a:fontRef idx="minor">
+            <a:schemeClr val="lt1"/>
+          </a:fontRef>
+        </p:style>
+        <p:txBody>
+          <a:bodyPr rtlCol="0" anchor="ctr"/>
+          <a:lstStyle/>
+          <a:p>
+            <a:pPr algn="ctr"/>
+            <a:endParaRPr lang="en-US"/>
+          </a:p>
+        </p:txBody>
+      </p:sp>
+      <p:pic>
+        <p:nvPicPr>
+          <p:cNvPr id="3074" name="Picture 2"/>
+          <p:cNvPicPr>
+            <a:picLocks noChangeAspect="1" noChangeArrowheads="1"/>
+          </p:cNvPicPr>
+          <p:nvPr/>
+        </p:nvPicPr>
+        <p:blipFill>
+          <a:blip r:embed="rId3" cstate="print"/>
+          <a:srcRect/>
+          <a:stretch>
+            <a:fillRect/>
+          </a:stretch>
+        </p:blipFill>
+        <p:spPr bwMode="auto">
+          <a:xfrm>
+            <a:off x="3124200" y="4191000"/>
+            <a:ext cx="2828925" cy="2228850"/>
+          </a:xfrm>
+          <a:prstGeom prst="rect">
+            <a:avLst/>
+          </a:prstGeom>
+          <a:noFill/>
+          <a:ln w="9525">
+            <a:noFill/>
+            <a:miter lim="800000"/>
+            <a:headEnd/>
+            <a:tailEnd/>
+          </a:ln>
         </p:spPr>
       </p:pic>
     </p:spTree>
@@ -5142,7 +5104,7 @@
                   </a:schemeClr>
                 </a:solidFill>
               </a:rPr>
-              <a:t>Example 2</a:t>
+              <a:t>Steps</a:t>
             </a:r>
             <a:endParaRPr lang="en-US" dirty="0"/>
           </a:p>
@@ -5150,7 +5112,7 @@
       </p:sp>
       <p:pic>
         <p:nvPicPr>
-          <p:cNvPr id="4" name="Picture 3" descr="stata_center_laplacian_edges.jpg"/>
+          <p:cNvPr id="4" name="Picture 3" descr="LaplacianMethod.png"/>
           <p:cNvPicPr>
             <a:picLocks noChangeAspect="1"/>
           </p:cNvPicPr>
@@ -5164,12 +5126,172 @@
         </p:blipFill>
         <p:spPr>
           <a:xfrm>
-            <a:off x="2667000" y="1524000"/>
-            <a:ext cx="3771900" cy="5029200"/>
+            <a:off x="0" y="1524000"/>
+            <a:ext cx="9144000" cy="2311660"/>
           </a:xfrm>
           <a:prstGeom prst="rect">
             <a:avLst/>
           </a:prstGeom>
+        </p:spPr>
+      </p:pic>
+      <p:sp>
+        <p:nvSpPr>
+          <p:cNvPr id="5" name="Oval 4"/>
+          <p:cNvSpPr/>
+          <p:nvPr/>
+        </p:nvSpPr>
+        <p:spPr>
+          <a:xfrm>
+            <a:off x="4800600" y="2895600"/>
+            <a:ext cx="990600" cy="914400"/>
+          </a:xfrm>
+          <a:prstGeom prst="ellipse">
+            <a:avLst/>
+          </a:prstGeom>
+          <a:noFill/>
+          <a:ln w="57150">
+            <a:solidFill>
+              <a:srgbClr val="FF0000"/>
+            </a:solidFill>
+          </a:ln>
+          <a:effectLst>
+            <a:outerShdw blurRad="44450" dist="27940" dir="5400000" algn="ctr">
+              <a:srgbClr val="000000">
+                <a:alpha val="32000"/>
+              </a:srgbClr>
+            </a:outerShdw>
+          </a:effectLst>
+          <a:scene3d>
+            <a:camera prst="orthographicFront">
+              <a:rot lat="0" lon="0" rev="0"/>
+            </a:camera>
+            <a:lightRig rig="balanced" dir="t">
+              <a:rot lat="0" lon="0" rev="8700000"/>
+            </a:lightRig>
+          </a:scene3d>
+          <a:sp3d>
+            <a:bevelT w="190500" h="38100"/>
+          </a:sp3d>
+        </p:spPr>
+        <p:style>
+          <a:lnRef idx="2">
+            <a:schemeClr val="accent1">
+              <a:shade val="50000"/>
+            </a:schemeClr>
+          </a:lnRef>
+          <a:fillRef idx="1">
+            <a:schemeClr val="accent1"/>
+          </a:fillRef>
+          <a:effectRef idx="0">
+            <a:schemeClr val="accent1"/>
+          </a:effectRef>
+          <a:fontRef idx="minor">
+            <a:schemeClr val="lt1"/>
+          </a:fontRef>
+        </p:style>
+        <p:txBody>
+          <a:bodyPr rtlCol="0" anchor="ctr"/>
+          <a:lstStyle/>
+          <a:p>
+            <a:pPr algn="ctr"/>
+            <a:endParaRPr lang="en-US"/>
+          </a:p>
+        </p:txBody>
+      </p:sp>
+      <p:pic>
+        <p:nvPicPr>
+          <p:cNvPr id="8" name="Picture 4"/>
+          <p:cNvPicPr>
+            <a:picLocks noChangeAspect="1" noChangeArrowheads="1"/>
+          </p:cNvPicPr>
+          <p:nvPr/>
+        </p:nvPicPr>
+        <p:blipFill>
+          <a:blip r:embed="rId3" cstate="print"/>
+          <a:srcRect/>
+          <a:stretch>
+            <a:fillRect/>
+          </a:stretch>
+        </p:blipFill>
+        <p:spPr bwMode="auto">
+          <a:xfrm>
+            <a:off x="2362200" y="4000500"/>
+            <a:ext cx="4286250" cy="419100"/>
+          </a:xfrm>
+          <a:prstGeom prst="rect">
+            <a:avLst/>
+          </a:prstGeom>
+          <a:noFill/>
+          <a:ln w="9525">
+            <a:noFill/>
+            <a:miter lim="800000"/>
+            <a:headEnd/>
+            <a:tailEnd/>
+          </a:ln>
+        </p:spPr>
+      </p:pic>
+      <p:pic>
+        <p:nvPicPr>
+          <p:cNvPr id="2050" name="Picture 2"/>
+          <p:cNvPicPr>
+            <a:picLocks noChangeAspect="1" noChangeArrowheads="1"/>
+          </p:cNvPicPr>
+          <p:nvPr/>
+        </p:nvPicPr>
+        <p:blipFill>
+          <a:blip r:embed="rId4" cstate="print"/>
+          <a:srcRect/>
+          <a:stretch>
+            <a:fillRect/>
+          </a:stretch>
+        </p:blipFill>
+        <p:spPr bwMode="auto">
+          <a:xfrm>
+            <a:off x="2438400" y="5791200"/>
+            <a:ext cx="5267325" cy="676275"/>
+          </a:xfrm>
+          <a:prstGeom prst="rect">
+            <a:avLst/>
+          </a:prstGeom>
+          <a:noFill/>
+          <a:ln w="9525">
+            <a:noFill/>
+            <a:miter lim="800000"/>
+            <a:headEnd/>
+            <a:tailEnd/>
+          </a:ln>
+        </p:spPr>
+      </p:pic>
+      <p:pic>
+        <p:nvPicPr>
+          <p:cNvPr id="3" name="Picture 2"/>
+          <p:cNvPicPr>
+            <a:picLocks noChangeAspect="1" noChangeArrowheads="1"/>
+          </p:cNvPicPr>
+          <p:nvPr/>
+        </p:nvPicPr>
+        <p:blipFill>
+          <a:blip r:embed="rId5" cstate="print"/>
+          <a:srcRect/>
+          <a:stretch>
+            <a:fillRect/>
+          </a:stretch>
+        </p:blipFill>
+        <p:spPr bwMode="auto">
+          <a:xfrm>
+            <a:off x="1996402" y="4419600"/>
+            <a:ext cx="5318798" cy="1247775"/>
+          </a:xfrm>
+          <a:prstGeom prst="rect">
+            <a:avLst/>
+          </a:prstGeom>
+          <a:noFill/>
+          <a:ln w="9525">
+            <a:noFill/>
+            <a:miter lim="800000"/>
+            <a:headEnd/>
+            <a:tailEnd/>
+          </a:ln>
         </p:spPr>
       </p:pic>
     </p:spTree>
@@ -5240,7 +5362,7 @@
                   </a:schemeClr>
                 </a:solidFill>
               </a:rPr>
-              <a:t>Example 3</a:t>
+              <a:t>Example 1</a:t>
             </a:r>
             <a:endParaRPr lang="en-US" dirty="0"/>
           </a:p>
@@ -5248,7 +5370,7 @@
       </p:sp>
       <p:pic>
         <p:nvPicPr>
-          <p:cNvPr id="4" name="Picture 3" descr="mandrill.jpg"/>
+          <p:cNvPr id="6" name="Picture 5" descr="lena.png"/>
           <p:cNvPicPr>
             <a:picLocks noChangeAspect="1"/>
           </p:cNvPicPr>
@@ -5262,8 +5384,8 @@
         </p:blipFill>
         <p:spPr>
           <a:xfrm>
-            <a:off x="2133600" y="1600200"/>
-            <a:ext cx="4762500" cy="4572000"/>
+            <a:off x="2133600" y="1447800"/>
+            <a:ext cx="4876800" cy="4876800"/>
           </a:xfrm>
           <a:prstGeom prst="rect">
             <a:avLst/>
@@ -5338,7 +5460,7 @@
                   </a:schemeClr>
                 </a:solidFill>
               </a:rPr>
-              <a:t>Example 3</a:t>
+              <a:t>Example 1</a:t>
             </a:r>
             <a:endParaRPr lang="en-US" dirty="0"/>
           </a:p>
@@ -5346,7 +5468,7 @@
       </p:sp>
       <p:pic>
         <p:nvPicPr>
-          <p:cNvPr id="5" name="Picture 4" descr="mandrill_laplacian_edges.jpg"/>
+          <p:cNvPr id="4" name="Picture 3" descr="lena_laplacian_edges.png"/>
           <p:cNvPicPr>
             <a:picLocks noChangeAspect="1"/>
           </p:cNvPicPr>
@@ -5360,8 +5482,8 @@
         </p:blipFill>
         <p:spPr>
           <a:xfrm>
-            <a:off x="2190750" y="1600200"/>
-            <a:ext cx="4762500" cy="4572000"/>
+            <a:off x="2133600" y="1447800"/>
+            <a:ext cx="4876800" cy="4876800"/>
           </a:xfrm>
           <a:prstGeom prst="rect">
             <a:avLst/>
@@ -5402,64 +5524,70 @@
       </p:grpSpPr>
       <p:sp>
         <p:nvSpPr>
-          <p:cNvPr id="4" name="Title 1"/>
-          <p:cNvSpPr txBox="1">
-            <a:spLocks/>
-          </p:cNvSpPr>
+          <p:cNvPr id="2" name="Title 1"/>
+          <p:cNvSpPr>
+            <a:spLocks noGrp="1"/>
+          </p:cNvSpPr>
+          <p:nvPr>
+            <p:ph type="title"/>
+          </p:nvPr>
+        </p:nvSpPr>
+        <p:spPr/>
+        <p:txBody>
+          <a:bodyPr>
+            <a:normAutofit fontScale="90000"/>
+          </a:bodyPr>
+          <a:lstStyle/>
+          <a:p>
+            <a:r>
+              <a:rPr lang="en-US" dirty="0" err="1" smtClean="0"/>
+              <a:t>Laplacian</a:t>
+            </a:r>
+            <a:r>
+              <a:rPr lang="en-US" dirty="0" smtClean="0"/>
+              <a:t>-based method</a:t>
+            </a:r>
+            <a:br>
+              <a:rPr lang="en-US" dirty="0" smtClean="0"/>
+            </a:br>
+            <a:r>
+              <a:rPr lang="en-US" sz="3600" dirty="0" smtClean="0">
+                <a:solidFill>
+                  <a:schemeClr val="bg1">
+                    <a:lumMod val="50000"/>
+                  </a:schemeClr>
+                </a:solidFill>
+              </a:rPr>
+              <a:t>Example 2</a:t>
+            </a:r>
+            <a:endParaRPr lang="en-US" dirty="0"/>
+          </a:p>
+        </p:txBody>
+      </p:sp>
+      <p:pic>
+        <p:nvPicPr>
+          <p:cNvPr id="5" name="Picture 4" descr="stata_center.jpg"/>
+          <p:cNvPicPr>
+            <a:picLocks noChangeAspect="1"/>
+          </p:cNvPicPr>
           <p:nvPr/>
-        </p:nvSpPr>
+        </p:nvPicPr>
+        <p:blipFill>
+          <a:blip r:embed="rId2" cstate="print"/>
+          <a:stretch>
+            <a:fillRect/>
+          </a:stretch>
+        </p:blipFill>
         <p:spPr>
           <a:xfrm>
-            <a:off x="685800" y="2130425"/>
-            <a:ext cx="7772400" cy="1470025"/>
+            <a:off x="2667000" y="1524000"/>
+            <a:ext cx="3771900" cy="5029200"/>
           </a:xfrm>
           <a:prstGeom prst="rect">
             <a:avLst/>
           </a:prstGeom>
         </p:spPr>
-        <p:txBody>
-          <a:bodyPr vert="horz" lIns="91440" tIns="45720" rIns="91440" bIns="45720" rtlCol="0" anchor="ctr">
-            <a:normAutofit/>
-          </a:bodyPr>
-          <a:lstStyle/>
-          <a:p>
-            <a:pPr marL="0" marR="0" lvl="0" indent="0" algn="ctr" defTabSz="914400" rtl="0" eaLnBrk="1" fontAlgn="auto" latinLnBrk="0" hangingPunct="1">
-              <a:lnSpc>
-                <a:spcPct val="100000"/>
-              </a:lnSpc>
-              <a:spcBef>
-                <a:spcPct val="0"/>
-              </a:spcBef>
-              <a:spcAft>
-                <a:spcPts val="0"/>
-              </a:spcAft>
-              <a:buClrTx/>
-              <a:buSzTx/>
-              <a:buFontTx/>
-              <a:buNone/>
-              <a:tabLst/>
-              <a:defRPr/>
-            </a:pPr>
-            <a:r>
-              <a:rPr kumimoji="0" lang="en-US" sz="6600" b="1" i="0" u="none" strike="noStrike" kern="1200" cap="none" spc="0" normalizeH="0" baseline="0" noProof="0" dirty="0" smtClean="0">
-                <a:ln>
-                  <a:noFill/>
-                </a:ln>
-                <a:solidFill>
-                  <a:srgbClr val="FF0000"/>
-                </a:solidFill>
-                <a:effectLst/>
-                <a:uLnTx/>
-                <a:uFillTx/>
-                <a:latin typeface="+mj-lt"/>
-                <a:ea typeface="+mj-ea"/>
-                <a:cs typeface="+mj-cs"/>
-              </a:rPr>
-              <a:t>Comparison</a:t>
-            </a:r>
-          </a:p>
-        </p:txBody>
-      </p:sp>
+      </p:pic>
     </p:spTree>
   </p:cSld>
   <p:clrMapOvr>
@@ -5510,35 +5638,33 @@
           <a:lstStyle/>
           <a:p>
             <a:r>
-              <a:rPr lang="en-US" dirty="0" smtClean="0"/>
-              <a:t>Comparison</a:t>
+              <a:rPr lang="en-US" dirty="0" err="1" smtClean="0"/>
+              <a:t>Laplacian</a:t>
+            </a:r>
+            <a:r>
+              <a:rPr lang="en-US" dirty="0" smtClean="0"/>
+              <a:t>-based method</a:t>
             </a:r>
             <a:br>
               <a:rPr lang="en-US" dirty="0" smtClean="0"/>
             </a:br>
             <a:r>
-              <a:rPr lang="en-US" sz="3100" dirty="0" smtClean="0">
+              <a:rPr lang="en-US" sz="3600" dirty="0" smtClean="0">
                 <a:solidFill>
                   <a:schemeClr val="bg1">
                     <a:lumMod val="50000"/>
                   </a:schemeClr>
                 </a:solidFill>
               </a:rPr>
-              <a:t>Original</a:t>
-            </a:r>
-            <a:endParaRPr lang="en-US" sz="3100" dirty="0">
-              <a:solidFill>
-                <a:schemeClr val="bg1">
-                  <a:lumMod val="50000"/>
-                </a:schemeClr>
-              </a:solidFill>
-            </a:endParaRPr>
+              <a:t>Example 2</a:t>
+            </a:r>
+            <a:endParaRPr lang="en-US" dirty="0"/>
           </a:p>
         </p:txBody>
       </p:sp>
       <p:pic>
         <p:nvPicPr>
-          <p:cNvPr id="5" name="Picture 4" descr="lena.png"/>
+          <p:cNvPr id="4" name="Picture 3" descr="stata_center_laplacian_edges.jpg"/>
           <p:cNvPicPr>
             <a:picLocks noChangeAspect="1"/>
           </p:cNvPicPr>
@@ -5552,8 +5678,8 @@
         </p:blipFill>
         <p:spPr>
           <a:xfrm>
-            <a:off x="2133600" y="1447800"/>
-            <a:ext cx="4876800" cy="4876800"/>
+            <a:off x="2667000" y="1524000"/>
+            <a:ext cx="3771900" cy="5029200"/>
           </a:xfrm>
           <a:prstGeom prst="rect">
             <a:avLst/>
@@ -5610,35 +5736,33 @@
           <a:lstStyle/>
           <a:p>
             <a:r>
-              <a:rPr lang="en-US" dirty="0" smtClean="0"/>
-              <a:t>Comparison</a:t>
+              <a:rPr lang="en-US" dirty="0" err="1" smtClean="0"/>
+              <a:t>Laplacian</a:t>
+            </a:r>
+            <a:r>
+              <a:rPr lang="en-US" dirty="0" smtClean="0"/>
+              <a:t>-based method</a:t>
             </a:r>
             <a:br>
               <a:rPr lang="en-US" dirty="0" smtClean="0"/>
             </a:br>
             <a:r>
-              <a:rPr lang="en-US" sz="3100" dirty="0" smtClean="0">
+              <a:rPr lang="en-US" sz="3600" dirty="0" smtClean="0">
                 <a:solidFill>
                   <a:schemeClr val="bg1">
                     <a:lumMod val="50000"/>
                   </a:schemeClr>
                 </a:solidFill>
               </a:rPr>
-              <a:t>Gradient-based</a:t>
-            </a:r>
-            <a:endParaRPr lang="en-US" sz="3100" dirty="0">
-              <a:solidFill>
-                <a:schemeClr val="bg1">
-                  <a:lumMod val="50000"/>
-                </a:schemeClr>
-              </a:solidFill>
-            </a:endParaRPr>
+              <a:t>Example 3</a:t>
+            </a:r>
+            <a:endParaRPr lang="en-US" dirty="0"/>
           </a:p>
         </p:txBody>
       </p:sp>
       <p:pic>
         <p:nvPicPr>
-          <p:cNvPr id="5" name="Picture 4" descr="lena_gradient_edges.png"/>
+          <p:cNvPr id="4" name="Picture 3" descr="mandrill.jpg"/>
           <p:cNvPicPr>
             <a:picLocks noChangeAspect="1"/>
           </p:cNvPicPr>
@@ -5652,8 +5776,8 @@
         </p:blipFill>
         <p:spPr>
           <a:xfrm>
-            <a:off x="2133600" y="1447800"/>
-            <a:ext cx="4876800" cy="4876800"/>
+            <a:off x="2133600" y="1600200"/>
+            <a:ext cx="4762500" cy="4572000"/>
           </a:xfrm>
           <a:prstGeom prst="rect">
             <a:avLst/>
@@ -5816,45 +5940,33 @@
           <a:lstStyle/>
           <a:p>
             <a:r>
-              <a:rPr lang="en-US" dirty="0" smtClean="0"/>
-              <a:t>Comparison</a:t>
+              <a:rPr lang="en-US" dirty="0" err="1" smtClean="0"/>
+              <a:t>Laplacian</a:t>
+            </a:r>
+            <a:r>
+              <a:rPr lang="en-US" dirty="0" smtClean="0"/>
+              <a:t>-based method</a:t>
             </a:r>
             <a:br>
               <a:rPr lang="en-US" dirty="0" smtClean="0"/>
             </a:br>
             <a:r>
-              <a:rPr lang="en-US" sz="3100" dirty="0" err="1" smtClean="0">
+              <a:rPr lang="en-US" sz="3600" dirty="0" smtClean="0">
                 <a:solidFill>
                   <a:schemeClr val="bg1">
                     <a:lumMod val="50000"/>
                   </a:schemeClr>
                 </a:solidFill>
               </a:rPr>
-              <a:t>Laplacian</a:t>
-            </a:r>
-            <a:r>
-              <a:rPr lang="en-US" sz="3100" dirty="0" smtClean="0">
-                <a:solidFill>
-                  <a:schemeClr val="bg1">
-                    <a:lumMod val="50000"/>
-                  </a:schemeClr>
-                </a:solidFill>
-              </a:rPr>
-              <a:t>-based</a:t>
-            </a:r>
-            <a:endParaRPr lang="en-US" sz="3100" dirty="0">
-              <a:solidFill>
-                <a:schemeClr val="bg1">
-                  <a:lumMod val="50000"/>
-                </a:schemeClr>
-              </a:solidFill>
-            </a:endParaRPr>
+              <a:t>Example 3</a:t>
+            </a:r>
+            <a:endParaRPr lang="en-US" dirty="0"/>
           </a:p>
         </p:txBody>
       </p:sp>
       <p:pic>
         <p:nvPicPr>
-          <p:cNvPr id="4" name="Picture 3" descr="lena_laplacian_edges.png"/>
+          <p:cNvPr id="5" name="Picture 4" descr="mandrill_laplacian_edges.jpg"/>
           <p:cNvPicPr>
             <a:picLocks noChangeAspect="1"/>
           </p:cNvPicPr>
@@ -5868,8 +5980,8 @@
         </p:blipFill>
         <p:spPr>
           <a:xfrm>
-            <a:off x="2133600" y="1447800"/>
-            <a:ext cx="4876800" cy="4876800"/>
+            <a:off x="2190750" y="1600200"/>
+            <a:ext cx="4762500" cy="4572000"/>
           </a:xfrm>
           <a:prstGeom prst="rect">
             <a:avLst/>
@@ -5910,7 +6022,7 @@
       </p:grpSpPr>
       <p:sp>
         <p:nvSpPr>
-          <p:cNvPr id="2" name="Title 1"/>
+          <p:cNvPr id="4" name="Title 1"/>
           <p:cNvSpPr>
             <a:spLocks noGrp="1"/>
           </p:cNvSpPr>
@@ -5918,7 +6030,12 @@
             <p:ph type="title"/>
           </p:nvPr>
         </p:nvSpPr>
-        <p:spPr/>
+        <p:spPr>
+          <a:xfrm>
+            <a:off x="457200" y="274638"/>
+            <a:ext cx="8229600" cy="1143000"/>
+          </a:xfrm>
+        </p:spPr>
         <p:txBody>
           <a:bodyPr>
             <a:normAutofit fontScale="90000"/>
@@ -5927,34 +6044,38 @@
           <a:p>
             <a:r>
               <a:rPr lang="en-US" dirty="0" smtClean="0"/>
-              <a:t>Comparison</a:t>
+              <a:t>Need for variance fix</a:t>
             </a:r>
             <a:br>
               <a:rPr lang="en-US" dirty="0" smtClean="0"/>
             </a:br>
             <a:r>
-              <a:rPr lang="en-US" sz="3100" dirty="0" smtClean="0">
+              <a:rPr lang="en-US" sz="3600" b="1" dirty="0" smtClean="0">
                 <a:solidFill>
                   <a:schemeClr val="bg1">
                     <a:lumMod val="50000"/>
                   </a:schemeClr>
                 </a:solidFill>
               </a:rPr>
-              <a:t>Original</a:t>
-            </a:r>
-            <a:endParaRPr lang="en-US" sz="3100" dirty="0">
-              <a:solidFill>
-                <a:schemeClr val="bg1">
-                  <a:lumMod val="50000"/>
-                </a:schemeClr>
-              </a:solidFill>
-            </a:endParaRPr>
+              <a:t>With</a:t>
+            </a:r>
+            <a:r>
+              <a:rPr lang="en-US" sz="3600" dirty="0" smtClean="0">
+                <a:solidFill>
+                  <a:schemeClr val="bg1">
+                    <a:lumMod val="50000"/>
+                  </a:schemeClr>
+                </a:solidFill>
+              </a:rPr>
+              <a:t> variance fix</a:t>
+            </a:r>
+            <a:endParaRPr lang="en-US" dirty="0"/>
           </a:p>
         </p:txBody>
       </p:sp>
       <p:pic>
         <p:nvPicPr>
-          <p:cNvPr id="5" name="Picture 4" descr="stata_center.jpg"/>
+          <p:cNvPr id="5" name="Picture 4" descr="stata_center_laplacian_edges.jpg"/>
           <p:cNvPicPr>
             <a:picLocks noChangeAspect="1"/>
           </p:cNvPicPr>
@@ -6010,7 +6131,7 @@
       </p:grpSpPr>
       <p:sp>
         <p:nvSpPr>
-          <p:cNvPr id="2" name="Title 1"/>
+          <p:cNvPr id="4" name="Title 1"/>
           <p:cNvSpPr>
             <a:spLocks noGrp="1"/>
           </p:cNvSpPr>
@@ -6018,7 +6139,12 @@
             <p:ph type="title"/>
           </p:nvPr>
         </p:nvSpPr>
-        <p:spPr/>
+        <p:spPr>
+          <a:xfrm>
+            <a:off x="457200" y="274638"/>
+            <a:ext cx="8229600" cy="1143000"/>
+          </a:xfrm>
+        </p:spPr>
         <p:txBody>
           <a:bodyPr>
             <a:normAutofit fontScale="90000"/>
@@ -6027,34 +6153,38 @@
           <a:p>
             <a:r>
               <a:rPr lang="en-US" dirty="0" smtClean="0"/>
-              <a:t>Comparison</a:t>
+              <a:t>Need for variance fix</a:t>
             </a:r>
             <a:br>
               <a:rPr lang="en-US" dirty="0" smtClean="0"/>
             </a:br>
             <a:r>
-              <a:rPr lang="en-US" sz="3100" dirty="0" smtClean="0">
+              <a:rPr lang="en-US" sz="3600" b="1" dirty="0" smtClean="0">
                 <a:solidFill>
                   <a:schemeClr val="bg1">
                     <a:lumMod val="50000"/>
                   </a:schemeClr>
                 </a:solidFill>
               </a:rPr>
-              <a:t>Gradient-based</a:t>
-            </a:r>
-            <a:endParaRPr lang="en-US" sz="3100" dirty="0">
-              <a:solidFill>
-                <a:schemeClr val="bg1">
-                  <a:lumMod val="50000"/>
-                </a:schemeClr>
-              </a:solidFill>
-            </a:endParaRPr>
+              <a:t>Without</a:t>
+            </a:r>
+            <a:r>
+              <a:rPr lang="en-US" sz="3600" dirty="0" smtClean="0">
+                <a:solidFill>
+                  <a:schemeClr val="bg1">
+                    <a:lumMod val="50000"/>
+                  </a:schemeClr>
+                </a:solidFill>
+              </a:rPr>
+              <a:t> variance fix</a:t>
+            </a:r>
+            <a:endParaRPr lang="en-US" dirty="0"/>
           </a:p>
         </p:txBody>
       </p:sp>
       <p:pic>
         <p:nvPicPr>
-          <p:cNvPr id="5" name="Picture 4" descr="stata_center_gradient_edges.jpg"/>
+          <p:cNvPr id="3" name="Picture 2" descr="stata_center_laplacian_edges.jpg"/>
           <p:cNvPicPr>
             <a:picLocks noChangeAspect="1"/>
           </p:cNvPicPr>
@@ -6110,82 +6240,64 @@
       </p:grpSpPr>
       <p:sp>
         <p:nvSpPr>
-          <p:cNvPr id="2" name="Title 1"/>
-          <p:cNvSpPr>
-            <a:spLocks noGrp="1"/>
-          </p:cNvSpPr>
-          <p:nvPr>
-            <p:ph type="title"/>
-          </p:nvPr>
-        </p:nvSpPr>
-        <p:spPr/>
-        <p:txBody>
-          <a:bodyPr>
-            <a:normAutofit fontScale="90000"/>
-          </a:bodyPr>
-          <a:lstStyle/>
-          <a:p>
-            <a:r>
-              <a:rPr lang="en-US" dirty="0" smtClean="0"/>
-              <a:t>Comparison</a:t>
-            </a:r>
-            <a:br>
-              <a:rPr lang="en-US" dirty="0" smtClean="0"/>
-            </a:br>
-            <a:r>
-              <a:rPr lang="en-US" sz="3100" dirty="0" err="1" smtClean="0">
-                <a:solidFill>
-                  <a:schemeClr val="bg1">
-                    <a:lumMod val="50000"/>
-                  </a:schemeClr>
-                </a:solidFill>
-              </a:rPr>
-              <a:t>Laplacian</a:t>
-            </a:r>
-            <a:r>
-              <a:rPr lang="en-US" sz="3100" dirty="0" smtClean="0">
-                <a:solidFill>
-                  <a:schemeClr val="bg1">
-                    <a:lumMod val="50000"/>
-                  </a:schemeClr>
-                </a:solidFill>
-              </a:rPr>
-              <a:t>-based</a:t>
-            </a:r>
-            <a:endParaRPr lang="en-US" sz="3100" dirty="0">
-              <a:solidFill>
-                <a:schemeClr val="bg1">
-                  <a:lumMod val="50000"/>
-                </a:schemeClr>
-              </a:solidFill>
-            </a:endParaRPr>
-          </a:p>
-        </p:txBody>
-      </p:sp>
-      <p:pic>
-        <p:nvPicPr>
-          <p:cNvPr id="4" name="Picture 3" descr="stata_center_laplacian_edges.jpg"/>
-          <p:cNvPicPr>
-            <a:picLocks noChangeAspect="1"/>
-          </p:cNvPicPr>
+          <p:cNvPr id="4" name="Title 1"/>
+          <p:cNvSpPr txBox="1">
+            <a:spLocks/>
+          </p:cNvSpPr>
           <p:nvPr/>
-        </p:nvPicPr>
-        <p:blipFill>
-          <a:blip r:embed="rId2" cstate="print"/>
-          <a:stretch>
-            <a:fillRect/>
-          </a:stretch>
-        </p:blipFill>
+        </p:nvSpPr>
         <p:spPr>
           <a:xfrm>
-            <a:off x="2667000" y="1524000"/>
-            <a:ext cx="3771900" cy="5029200"/>
+            <a:off x="685800" y="2130425"/>
+            <a:ext cx="7772400" cy="1470025"/>
           </a:xfrm>
           <a:prstGeom prst="rect">
             <a:avLst/>
           </a:prstGeom>
         </p:spPr>
-      </p:pic>
+        <p:txBody>
+          <a:bodyPr vert="horz" lIns="91440" tIns="45720" rIns="91440" bIns="45720" rtlCol="0" anchor="ctr">
+            <a:normAutofit/>
+          </a:bodyPr>
+          <a:lstStyle/>
+          <a:p>
+            <a:pPr marL="0" marR="0" lvl="0" indent="0" algn="ctr" defTabSz="914400" rtl="0" eaLnBrk="1" fontAlgn="auto" latinLnBrk="0" hangingPunct="1">
+              <a:lnSpc>
+                <a:spcPct val="100000"/>
+              </a:lnSpc>
+              <a:spcBef>
+                <a:spcPct val="0"/>
+              </a:spcBef>
+              <a:spcAft>
+                <a:spcPts val="0"/>
+              </a:spcAft>
+              <a:buClrTx/>
+              <a:buSzTx/>
+              <a:buFontTx/>
+              <a:buNone/>
+              <a:tabLst/>
+              <a:defRPr/>
+            </a:pPr>
+            <a:r>
+              <a:rPr kumimoji="0" lang="en-US" sz="6600" b="1" i="0" u="none" strike="noStrike" kern="1200" cap="none" spc="0" normalizeH="0" baseline="0" noProof="0" dirty="0" smtClean="0">
+                <a:ln>
+                  <a:noFill/>
+                </a:ln>
+                <a:solidFill>
+                  <a:srgbClr val="FF0000"/>
+                </a:solidFill>
+                <a:effectLst/>
+                <a:uLnTx/>
+                <a:uFillTx/>
+                <a:latin typeface="+mj-lt"/>
+                <a:ea typeface="+mj-ea"/>
+                <a:cs typeface="+mj-cs"/>
+              </a:rPr>
+              <a:t>Comparison</a:t>
+            </a:r>
+          </a:p>
+        </p:txBody>
+      </p:sp>
     </p:spTree>
   </p:cSld>
   <p:clrMapOvr>
@@ -6264,7 +6376,7 @@
       </p:sp>
       <p:pic>
         <p:nvPicPr>
-          <p:cNvPr id="5" name="Picture 4" descr="mandrill.jpg"/>
+          <p:cNvPr id="5" name="Picture 4" descr="lena.png"/>
           <p:cNvPicPr>
             <a:picLocks noChangeAspect="1"/>
           </p:cNvPicPr>
@@ -6278,8 +6390,8 @@
         </p:blipFill>
         <p:spPr>
           <a:xfrm>
-            <a:off x="2171700" y="1600200"/>
-            <a:ext cx="4762500" cy="4572000"/>
+            <a:off x="2133600" y="1447800"/>
+            <a:ext cx="4876800" cy="4876800"/>
           </a:xfrm>
           <a:prstGeom prst="rect">
             <a:avLst/>
@@ -6364,7 +6476,7 @@
       </p:sp>
       <p:pic>
         <p:nvPicPr>
-          <p:cNvPr id="5" name="Picture 4" descr="mandrill_gradient_edges.jpg"/>
+          <p:cNvPr id="5" name="Picture 4" descr="lena_gradient_edges.png"/>
           <p:cNvPicPr>
             <a:picLocks noChangeAspect="1"/>
           </p:cNvPicPr>
@@ -6378,8 +6490,8 @@
         </p:blipFill>
         <p:spPr>
           <a:xfrm>
-            <a:off x="2171700" y="1600200"/>
-            <a:ext cx="4762500" cy="4572000"/>
+            <a:off x="2133600" y="1447800"/>
+            <a:ext cx="4876800" cy="4876800"/>
           </a:xfrm>
           <a:prstGeom prst="rect">
             <a:avLst/>
@@ -6474,7 +6586,7 @@
       </p:sp>
       <p:pic>
         <p:nvPicPr>
-          <p:cNvPr id="4" name="Picture 3" descr="mandrill_laplacian_edges.jpg"/>
+          <p:cNvPr id="4" name="Picture 3" descr="lena_laplacian_edges.png"/>
           <p:cNvPicPr>
             <a:picLocks noChangeAspect="1"/>
           </p:cNvPicPr>
@@ -6488,8 +6600,8 @@
         </p:blipFill>
         <p:spPr>
           <a:xfrm>
-            <a:off x="2190750" y="1600200"/>
-            <a:ext cx="4762500" cy="4572000"/>
+            <a:off x="2133600" y="1447800"/>
+            <a:ext cx="4876800" cy="4876800"/>
           </a:xfrm>
           <a:prstGeom prst="rect">
             <a:avLst/>
@@ -6574,7 +6686,7 @@
       </p:sp>
       <p:pic>
         <p:nvPicPr>
-          <p:cNvPr id="4" name="Picture 3" descr="green_building.jpg"/>
+          <p:cNvPr id="5" name="Picture 4" descr="stata_center.jpg"/>
           <p:cNvPicPr>
             <a:picLocks noChangeAspect="1"/>
           </p:cNvPicPr>
@@ -6588,8 +6700,8 @@
         </p:blipFill>
         <p:spPr>
           <a:xfrm>
-            <a:off x="2895600" y="1524000"/>
-            <a:ext cx="3352800" cy="5029200"/>
+            <a:off x="2667000" y="1524000"/>
+            <a:ext cx="3771900" cy="5029200"/>
           </a:xfrm>
           <a:prstGeom prst="rect">
             <a:avLst/>
@@ -6674,7 +6786,7 @@
       </p:sp>
       <p:pic>
         <p:nvPicPr>
-          <p:cNvPr id="4" name="Picture 3" descr="green_building_gradient_edges.jpg"/>
+          <p:cNvPr id="5" name="Picture 4" descr="stata_center_gradient_edges.jpg"/>
           <p:cNvPicPr>
             <a:picLocks noChangeAspect="1"/>
           </p:cNvPicPr>
@@ -6688,8 +6800,8 @@
         </p:blipFill>
         <p:spPr>
           <a:xfrm>
-            <a:off x="2895600" y="1524000"/>
-            <a:ext cx="3352800" cy="5029200"/>
+            <a:off x="2667000" y="1524000"/>
+            <a:ext cx="3771900" cy="5029200"/>
           </a:xfrm>
           <a:prstGeom prst="rect">
             <a:avLst/>
@@ -6784,7 +6896,7 @@
       </p:sp>
       <p:pic>
         <p:nvPicPr>
-          <p:cNvPr id="3" name="Picture 2" descr="green_building_laplacian_edges.jpg"/>
+          <p:cNvPr id="4" name="Picture 3" descr="stata_center_laplacian_edges.jpg"/>
           <p:cNvPicPr>
             <a:picLocks noChangeAspect="1"/>
           </p:cNvPicPr>
@@ -6798,8 +6910,8 @@
         </p:blipFill>
         <p:spPr>
           <a:xfrm>
-            <a:off x="2895600" y="1524000"/>
-            <a:ext cx="3352800" cy="5029200"/>
+            <a:off x="2667000" y="1524000"/>
+            <a:ext cx="3771900" cy="5029200"/>
           </a:xfrm>
           <a:prstGeom prst="rect">
             <a:avLst/>
@@ -7034,6 +7146,626 @@
 </file>
 
 <file path=ppt/slides/slide40.xml><?xml version="1.0" encoding="utf-8"?>
+<p:sld xmlns:a="http://schemas.openxmlformats.org/drawingml/2006/main" xmlns:r="http://schemas.openxmlformats.org/officeDocument/2006/relationships" xmlns:p="http://schemas.openxmlformats.org/presentationml/2006/main">
+  <p:cSld>
+    <p:spTree>
+      <p:nvGrpSpPr>
+        <p:cNvPr id="1" name=""/>
+        <p:cNvGrpSpPr/>
+        <p:nvPr/>
+      </p:nvGrpSpPr>
+      <p:grpSpPr>
+        <a:xfrm>
+          <a:off x="0" y="0"/>
+          <a:ext cx="0" cy="0"/>
+          <a:chOff x="0" y="0"/>
+          <a:chExt cx="0" cy="0"/>
+        </a:xfrm>
+      </p:grpSpPr>
+      <p:sp>
+        <p:nvSpPr>
+          <p:cNvPr id="2" name="Title 1"/>
+          <p:cNvSpPr>
+            <a:spLocks noGrp="1"/>
+          </p:cNvSpPr>
+          <p:nvPr>
+            <p:ph type="title"/>
+          </p:nvPr>
+        </p:nvSpPr>
+        <p:spPr/>
+        <p:txBody>
+          <a:bodyPr>
+            <a:normAutofit fontScale="90000"/>
+          </a:bodyPr>
+          <a:lstStyle/>
+          <a:p>
+            <a:r>
+              <a:rPr lang="en-US" dirty="0" smtClean="0"/>
+              <a:t>Comparison</a:t>
+            </a:r>
+            <a:br>
+              <a:rPr lang="en-US" dirty="0" smtClean="0"/>
+            </a:br>
+            <a:r>
+              <a:rPr lang="en-US" sz="3100" dirty="0" smtClean="0">
+                <a:solidFill>
+                  <a:schemeClr val="bg1">
+                    <a:lumMod val="50000"/>
+                  </a:schemeClr>
+                </a:solidFill>
+              </a:rPr>
+              <a:t>Original</a:t>
+            </a:r>
+            <a:endParaRPr lang="en-US" sz="3100" dirty="0">
+              <a:solidFill>
+                <a:schemeClr val="bg1">
+                  <a:lumMod val="50000"/>
+                </a:schemeClr>
+              </a:solidFill>
+            </a:endParaRPr>
+          </a:p>
+        </p:txBody>
+      </p:sp>
+      <p:pic>
+        <p:nvPicPr>
+          <p:cNvPr id="5" name="Picture 4" descr="mandrill.jpg"/>
+          <p:cNvPicPr>
+            <a:picLocks noChangeAspect="1"/>
+          </p:cNvPicPr>
+          <p:nvPr/>
+        </p:nvPicPr>
+        <p:blipFill>
+          <a:blip r:embed="rId2" cstate="print"/>
+          <a:stretch>
+            <a:fillRect/>
+          </a:stretch>
+        </p:blipFill>
+        <p:spPr>
+          <a:xfrm>
+            <a:off x="2171700" y="1600200"/>
+            <a:ext cx="4762500" cy="4572000"/>
+          </a:xfrm>
+          <a:prstGeom prst="rect">
+            <a:avLst/>
+          </a:prstGeom>
+        </p:spPr>
+      </p:pic>
+    </p:spTree>
+  </p:cSld>
+  <p:clrMapOvr>
+    <a:masterClrMapping/>
+  </p:clrMapOvr>
+  <p:timing>
+    <p:tnLst>
+      <p:par>
+        <p:cTn id="1" dur="indefinite" restart="never" nodeType="tmRoot"/>
+      </p:par>
+    </p:tnLst>
+  </p:timing>
+</p:sld>
+</file>
+
+<file path=ppt/slides/slide41.xml><?xml version="1.0" encoding="utf-8"?>
+<p:sld xmlns:a="http://schemas.openxmlformats.org/drawingml/2006/main" xmlns:r="http://schemas.openxmlformats.org/officeDocument/2006/relationships" xmlns:p="http://schemas.openxmlformats.org/presentationml/2006/main">
+  <p:cSld>
+    <p:spTree>
+      <p:nvGrpSpPr>
+        <p:cNvPr id="1" name=""/>
+        <p:cNvGrpSpPr/>
+        <p:nvPr/>
+      </p:nvGrpSpPr>
+      <p:grpSpPr>
+        <a:xfrm>
+          <a:off x="0" y="0"/>
+          <a:ext cx="0" cy="0"/>
+          <a:chOff x="0" y="0"/>
+          <a:chExt cx="0" cy="0"/>
+        </a:xfrm>
+      </p:grpSpPr>
+      <p:sp>
+        <p:nvSpPr>
+          <p:cNvPr id="2" name="Title 1"/>
+          <p:cNvSpPr>
+            <a:spLocks noGrp="1"/>
+          </p:cNvSpPr>
+          <p:nvPr>
+            <p:ph type="title"/>
+          </p:nvPr>
+        </p:nvSpPr>
+        <p:spPr/>
+        <p:txBody>
+          <a:bodyPr>
+            <a:normAutofit fontScale="90000"/>
+          </a:bodyPr>
+          <a:lstStyle/>
+          <a:p>
+            <a:r>
+              <a:rPr lang="en-US" dirty="0" smtClean="0"/>
+              <a:t>Comparison</a:t>
+            </a:r>
+            <a:br>
+              <a:rPr lang="en-US" dirty="0" smtClean="0"/>
+            </a:br>
+            <a:r>
+              <a:rPr lang="en-US" sz="3100" dirty="0" smtClean="0">
+                <a:solidFill>
+                  <a:schemeClr val="bg1">
+                    <a:lumMod val="50000"/>
+                  </a:schemeClr>
+                </a:solidFill>
+              </a:rPr>
+              <a:t>Gradient-based</a:t>
+            </a:r>
+            <a:endParaRPr lang="en-US" sz="3100" dirty="0">
+              <a:solidFill>
+                <a:schemeClr val="bg1">
+                  <a:lumMod val="50000"/>
+                </a:schemeClr>
+              </a:solidFill>
+            </a:endParaRPr>
+          </a:p>
+        </p:txBody>
+      </p:sp>
+      <p:pic>
+        <p:nvPicPr>
+          <p:cNvPr id="5" name="Picture 4" descr="mandrill_gradient_edges.jpg"/>
+          <p:cNvPicPr>
+            <a:picLocks noChangeAspect="1"/>
+          </p:cNvPicPr>
+          <p:nvPr/>
+        </p:nvPicPr>
+        <p:blipFill>
+          <a:blip r:embed="rId2" cstate="print"/>
+          <a:stretch>
+            <a:fillRect/>
+          </a:stretch>
+        </p:blipFill>
+        <p:spPr>
+          <a:xfrm>
+            <a:off x="2171700" y="1600200"/>
+            <a:ext cx="4762500" cy="4572000"/>
+          </a:xfrm>
+          <a:prstGeom prst="rect">
+            <a:avLst/>
+          </a:prstGeom>
+        </p:spPr>
+      </p:pic>
+    </p:spTree>
+  </p:cSld>
+  <p:clrMapOvr>
+    <a:masterClrMapping/>
+  </p:clrMapOvr>
+  <p:timing>
+    <p:tnLst>
+      <p:par>
+        <p:cTn id="1" dur="indefinite" restart="never" nodeType="tmRoot"/>
+      </p:par>
+    </p:tnLst>
+  </p:timing>
+</p:sld>
+</file>
+
+<file path=ppt/slides/slide42.xml><?xml version="1.0" encoding="utf-8"?>
+<p:sld xmlns:a="http://schemas.openxmlformats.org/drawingml/2006/main" xmlns:r="http://schemas.openxmlformats.org/officeDocument/2006/relationships" xmlns:p="http://schemas.openxmlformats.org/presentationml/2006/main">
+  <p:cSld>
+    <p:spTree>
+      <p:nvGrpSpPr>
+        <p:cNvPr id="1" name=""/>
+        <p:cNvGrpSpPr/>
+        <p:nvPr/>
+      </p:nvGrpSpPr>
+      <p:grpSpPr>
+        <a:xfrm>
+          <a:off x="0" y="0"/>
+          <a:ext cx="0" cy="0"/>
+          <a:chOff x="0" y="0"/>
+          <a:chExt cx="0" cy="0"/>
+        </a:xfrm>
+      </p:grpSpPr>
+      <p:sp>
+        <p:nvSpPr>
+          <p:cNvPr id="2" name="Title 1"/>
+          <p:cNvSpPr>
+            <a:spLocks noGrp="1"/>
+          </p:cNvSpPr>
+          <p:nvPr>
+            <p:ph type="title"/>
+          </p:nvPr>
+        </p:nvSpPr>
+        <p:spPr/>
+        <p:txBody>
+          <a:bodyPr>
+            <a:normAutofit fontScale="90000"/>
+          </a:bodyPr>
+          <a:lstStyle/>
+          <a:p>
+            <a:r>
+              <a:rPr lang="en-US" dirty="0" smtClean="0"/>
+              <a:t>Comparison</a:t>
+            </a:r>
+            <a:br>
+              <a:rPr lang="en-US" dirty="0" smtClean="0"/>
+            </a:br>
+            <a:r>
+              <a:rPr lang="en-US" sz="3100" dirty="0" err="1" smtClean="0">
+                <a:solidFill>
+                  <a:schemeClr val="bg1">
+                    <a:lumMod val="50000"/>
+                  </a:schemeClr>
+                </a:solidFill>
+              </a:rPr>
+              <a:t>Laplacian</a:t>
+            </a:r>
+            <a:r>
+              <a:rPr lang="en-US" sz="3100" dirty="0" smtClean="0">
+                <a:solidFill>
+                  <a:schemeClr val="bg1">
+                    <a:lumMod val="50000"/>
+                  </a:schemeClr>
+                </a:solidFill>
+              </a:rPr>
+              <a:t>-based</a:t>
+            </a:r>
+            <a:endParaRPr lang="en-US" sz="3100" dirty="0">
+              <a:solidFill>
+                <a:schemeClr val="bg1">
+                  <a:lumMod val="50000"/>
+                </a:schemeClr>
+              </a:solidFill>
+            </a:endParaRPr>
+          </a:p>
+        </p:txBody>
+      </p:sp>
+      <p:pic>
+        <p:nvPicPr>
+          <p:cNvPr id="4" name="Picture 3" descr="mandrill_laplacian_edges.jpg"/>
+          <p:cNvPicPr>
+            <a:picLocks noChangeAspect="1"/>
+          </p:cNvPicPr>
+          <p:nvPr/>
+        </p:nvPicPr>
+        <p:blipFill>
+          <a:blip r:embed="rId2" cstate="print"/>
+          <a:stretch>
+            <a:fillRect/>
+          </a:stretch>
+        </p:blipFill>
+        <p:spPr>
+          <a:xfrm>
+            <a:off x="2190750" y="1600200"/>
+            <a:ext cx="4762500" cy="4572000"/>
+          </a:xfrm>
+          <a:prstGeom prst="rect">
+            <a:avLst/>
+          </a:prstGeom>
+        </p:spPr>
+      </p:pic>
+    </p:spTree>
+  </p:cSld>
+  <p:clrMapOvr>
+    <a:masterClrMapping/>
+  </p:clrMapOvr>
+  <p:timing>
+    <p:tnLst>
+      <p:par>
+        <p:cTn id="1" dur="indefinite" restart="never" nodeType="tmRoot"/>
+      </p:par>
+    </p:tnLst>
+  </p:timing>
+</p:sld>
+</file>
+
+<file path=ppt/slides/slide43.xml><?xml version="1.0" encoding="utf-8"?>
+<p:sld xmlns:a="http://schemas.openxmlformats.org/drawingml/2006/main" xmlns:r="http://schemas.openxmlformats.org/officeDocument/2006/relationships" xmlns:p="http://schemas.openxmlformats.org/presentationml/2006/main">
+  <p:cSld>
+    <p:spTree>
+      <p:nvGrpSpPr>
+        <p:cNvPr id="1" name=""/>
+        <p:cNvGrpSpPr/>
+        <p:nvPr/>
+      </p:nvGrpSpPr>
+      <p:grpSpPr>
+        <a:xfrm>
+          <a:off x="0" y="0"/>
+          <a:ext cx="0" cy="0"/>
+          <a:chOff x="0" y="0"/>
+          <a:chExt cx="0" cy="0"/>
+        </a:xfrm>
+      </p:grpSpPr>
+      <p:sp>
+        <p:nvSpPr>
+          <p:cNvPr id="2" name="Title 1"/>
+          <p:cNvSpPr>
+            <a:spLocks noGrp="1"/>
+          </p:cNvSpPr>
+          <p:nvPr>
+            <p:ph type="title"/>
+          </p:nvPr>
+        </p:nvSpPr>
+        <p:spPr/>
+        <p:txBody>
+          <a:bodyPr>
+            <a:normAutofit fontScale="90000"/>
+          </a:bodyPr>
+          <a:lstStyle/>
+          <a:p>
+            <a:r>
+              <a:rPr lang="en-US" dirty="0" smtClean="0"/>
+              <a:t>Comparison</a:t>
+            </a:r>
+            <a:br>
+              <a:rPr lang="en-US" dirty="0" smtClean="0"/>
+            </a:br>
+            <a:r>
+              <a:rPr lang="en-US" sz="3100" dirty="0" smtClean="0">
+                <a:solidFill>
+                  <a:schemeClr val="bg1">
+                    <a:lumMod val="50000"/>
+                  </a:schemeClr>
+                </a:solidFill>
+              </a:rPr>
+              <a:t>Original</a:t>
+            </a:r>
+            <a:endParaRPr lang="en-US" sz="3100" dirty="0">
+              <a:solidFill>
+                <a:schemeClr val="bg1">
+                  <a:lumMod val="50000"/>
+                </a:schemeClr>
+              </a:solidFill>
+            </a:endParaRPr>
+          </a:p>
+        </p:txBody>
+      </p:sp>
+      <p:pic>
+        <p:nvPicPr>
+          <p:cNvPr id="4" name="Picture 3" descr="green_building.jpg"/>
+          <p:cNvPicPr>
+            <a:picLocks noChangeAspect="1"/>
+          </p:cNvPicPr>
+          <p:nvPr/>
+        </p:nvPicPr>
+        <p:blipFill>
+          <a:blip r:embed="rId2" cstate="print"/>
+          <a:stretch>
+            <a:fillRect/>
+          </a:stretch>
+        </p:blipFill>
+        <p:spPr>
+          <a:xfrm>
+            <a:off x="2895600" y="1524000"/>
+            <a:ext cx="3352800" cy="5029200"/>
+          </a:xfrm>
+          <a:prstGeom prst="rect">
+            <a:avLst/>
+          </a:prstGeom>
+        </p:spPr>
+      </p:pic>
+    </p:spTree>
+  </p:cSld>
+  <p:clrMapOvr>
+    <a:masterClrMapping/>
+  </p:clrMapOvr>
+  <p:timing>
+    <p:tnLst>
+      <p:par>
+        <p:cTn id="1" dur="indefinite" restart="never" nodeType="tmRoot"/>
+      </p:par>
+    </p:tnLst>
+  </p:timing>
+</p:sld>
+</file>
+
+<file path=ppt/slides/slide44.xml><?xml version="1.0" encoding="utf-8"?>
+<p:sld xmlns:a="http://schemas.openxmlformats.org/drawingml/2006/main" xmlns:r="http://schemas.openxmlformats.org/officeDocument/2006/relationships" xmlns:p="http://schemas.openxmlformats.org/presentationml/2006/main">
+  <p:cSld>
+    <p:spTree>
+      <p:nvGrpSpPr>
+        <p:cNvPr id="1" name=""/>
+        <p:cNvGrpSpPr/>
+        <p:nvPr/>
+      </p:nvGrpSpPr>
+      <p:grpSpPr>
+        <a:xfrm>
+          <a:off x="0" y="0"/>
+          <a:ext cx="0" cy="0"/>
+          <a:chOff x="0" y="0"/>
+          <a:chExt cx="0" cy="0"/>
+        </a:xfrm>
+      </p:grpSpPr>
+      <p:sp>
+        <p:nvSpPr>
+          <p:cNvPr id="2" name="Title 1"/>
+          <p:cNvSpPr>
+            <a:spLocks noGrp="1"/>
+          </p:cNvSpPr>
+          <p:nvPr>
+            <p:ph type="title"/>
+          </p:nvPr>
+        </p:nvSpPr>
+        <p:spPr/>
+        <p:txBody>
+          <a:bodyPr>
+            <a:normAutofit fontScale="90000"/>
+          </a:bodyPr>
+          <a:lstStyle/>
+          <a:p>
+            <a:r>
+              <a:rPr lang="en-US" dirty="0" smtClean="0"/>
+              <a:t>Comparison</a:t>
+            </a:r>
+            <a:br>
+              <a:rPr lang="en-US" dirty="0" smtClean="0"/>
+            </a:br>
+            <a:r>
+              <a:rPr lang="en-US" sz="3100" dirty="0" smtClean="0">
+                <a:solidFill>
+                  <a:schemeClr val="bg1">
+                    <a:lumMod val="50000"/>
+                  </a:schemeClr>
+                </a:solidFill>
+              </a:rPr>
+              <a:t>Gradient-based</a:t>
+            </a:r>
+            <a:endParaRPr lang="en-US" sz="3100" dirty="0">
+              <a:solidFill>
+                <a:schemeClr val="bg1">
+                  <a:lumMod val="50000"/>
+                </a:schemeClr>
+              </a:solidFill>
+            </a:endParaRPr>
+          </a:p>
+        </p:txBody>
+      </p:sp>
+      <p:pic>
+        <p:nvPicPr>
+          <p:cNvPr id="4" name="Picture 3" descr="green_building_gradient_edges.jpg"/>
+          <p:cNvPicPr>
+            <a:picLocks noChangeAspect="1"/>
+          </p:cNvPicPr>
+          <p:nvPr/>
+        </p:nvPicPr>
+        <p:blipFill>
+          <a:blip r:embed="rId2" cstate="print"/>
+          <a:stretch>
+            <a:fillRect/>
+          </a:stretch>
+        </p:blipFill>
+        <p:spPr>
+          <a:xfrm>
+            <a:off x="2895600" y="1524000"/>
+            <a:ext cx="3352800" cy="5029200"/>
+          </a:xfrm>
+          <a:prstGeom prst="rect">
+            <a:avLst/>
+          </a:prstGeom>
+        </p:spPr>
+      </p:pic>
+    </p:spTree>
+  </p:cSld>
+  <p:clrMapOvr>
+    <a:masterClrMapping/>
+  </p:clrMapOvr>
+  <p:timing>
+    <p:tnLst>
+      <p:par>
+        <p:cTn id="1" dur="indefinite" restart="never" nodeType="tmRoot"/>
+      </p:par>
+    </p:tnLst>
+  </p:timing>
+</p:sld>
+</file>
+
+<file path=ppt/slides/slide45.xml><?xml version="1.0" encoding="utf-8"?>
+<p:sld xmlns:a="http://schemas.openxmlformats.org/drawingml/2006/main" xmlns:r="http://schemas.openxmlformats.org/officeDocument/2006/relationships" xmlns:p="http://schemas.openxmlformats.org/presentationml/2006/main">
+  <p:cSld>
+    <p:spTree>
+      <p:nvGrpSpPr>
+        <p:cNvPr id="1" name=""/>
+        <p:cNvGrpSpPr/>
+        <p:nvPr/>
+      </p:nvGrpSpPr>
+      <p:grpSpPr>
+        <a:xfrm>
+          <a:off x="0" y="0"/>
+          <a:ext cx="0" cy="0"/>
+          <a:chOff x="0" y="0"/>
+          <a:chExt cx="0" cy="0"/>
+        </a:xfrm>
+      </p:grpSpPr>
+      <p:sp>
+        <p:nvSpPr>
+          <p:cNvPr id="2" name="Title 1"/>
+          <p:cNvSpPr>
+            <a:spLocks noGrp="1"/>
+          </p:cNvSpPr>
+          <p:nvPr>
+            <p:ph type="title"/>
+          </p:nvPr>
+        </p:nvSpPr>
+        <p:spPr/>
+        <p:txBody>
+          <a:bodyPr>
+            <a:normAutofit fontScale="90000"/>
+          </a:bodyPr>
+          <a:lstStyle/>
+          <a:p>
+            <a:r>
+              <a:rPr lang="en-US" dirty="0" smtClean="0"/>
+              <a:t>Comparison</a:t>
+            </a:r>
+            <a:br>
+              <a:rPr lang="en-US" dirty="0" smtClean="0"/>
+            </a:br>
+            <a:r>
+              <a:rPr lang="en-US" sz="3100" dirty="0" err="1" smtClean="0">
+                <a:solidFill>
+                  <a:schemeClr val="bg1">
+                    <a:lumMod val="50000"/>
+                  </a:schemeClr>
+                </a:solidFill>
+              </a:rPr>
+              <a:t>Laplacian</a:t>
+            </a:r>
+            <a:r>
+              <a:rPr lang="en-US" sz="3100" dirty="0" smtClean="0">
+                <a:solidFill>
+                  <a:schemeClr val="bg1">
+                    <a:lumMod val="50000"/>
+                  </a:schemeClr>
+                </a:solidFill>
+              </a:rPr>
+              <a:t>-based</a:t>
+            </a:r>
+            <a:endParaRPr lang="en-US" sz="3100" dirty="0">
+              <a:solidFill>
+                <a:schemeClr val="bg1">
+                  <a:lumMod val="50000"/>
+                </a:schemeClr>
+              </a:solidFill>
+            </a:endParaRPr>
+          </a:p>
+        </p:txBody>
+      </p:sp>
+      <p:pic>
+        <p:nvPicPr>
+          <p:cNvPr id="3" name="Picture 2" descr="green_building_laplacian_edges.jpg"/>
+          <p:cNvPicPr>
+            <a:picLocks noChangeAspect="1"/>
+          </p:cNvPicPr>
+          <p:nvPr/>
+        </p:nvPicPr>
+        <p:blipFill>
+          <a:blip r:embed="rId2" cstate="print"/>
+          <a:stretch>
+            <a:fillRect/>
+          </a:stretch>
+        </p:blipFill>
+        <p:spPr>
+          <a:xfrm>
+            <a:off x="2895600" y="1524000"/>
+            <a:ext cx="3352800" cy="5029200"/>
+          </a:xfrm>
+          <a:prstGeom prst="rect">
+            <a:avLst/>
+          </a:prstGeom>
+        </p:spPr>
+      </p:pic>
+    </p:spTree>
+  </p:cSld>
+  <p:clrMapOvr>
+    <a:masterClrMapping/>
+  </p:clrMapOvr>
+  <p:timing>
+    <p:tnLst>
+      <p:par>
+        <p:cTn id="1" dur="indefinite" restart="never" nodeType="tmRoot"/>
+      </p:par>
+    </p:tnLst>
+  </p:timing>
+</p:sld>
+</file>
+
+<file path=ppt/slides/slide46.xml><?xml version="1.0" encoding="utf-8"?>
 <p:sld xmlns:a="http://schemas.openxmlformats.org/drawingml/2006/main" xmlns:r="http://schemas.openxmlformats.org/officeDocument/2006/relationships" xmlns:p="http://schemas.openxmlformats.org/presentationml/2006/main">
   <p:cSld>
     <p:spTree>

</xml_diff>

<commit_message>
image enhancement using edge detection
</commit_message>
<xml_diff>
--- a/docs/presentation/presentation.pptx
+++ b/docs/presentation/presentation.pptx
@@ -50,7 +50,15 @@
     <p:sldId id="292" r:id="rId44"/>
     <p:sldId id="293" r:id="rId45"/>
     <p:sldId id="294" r:id="rId46"/>
-    <p:sldId id="295" r:id="rId47"/>
+    <p:sldId id="309" r:id="rId47"/>
+    <p:sldId id="310" r:id="rId48"/>
+    <p:sldId id="311" r:id="rId49"/>
+    <p:sldId id="312" r:id="rId50"/>
+    <p:sldId id="313" r:id="rId51"/>
+    <p:sldId id="314" r:id="rId52"/>
+    <p:sldId id="315" r:id="rId53"/>
+    <p:sldId id="316" r:id="rId54"/>
+    <p:sldId id="295" r:id="rId55"/>
   </p:sldIdLst>
   <p:sldSz cx="9144000" cy="6858000" type="screen4x3"/>
   <p:notesSz cx="6858000" cy="9144000"/>
@@ -7784,7 +7792,7 @@
       </p:grpSpPr>
       <p:sp>
         <p:nvSpPr>
-          <p:cNvPr id="2" name="Title 1"/>
+          <p:cNvPr id="4" name="Title 1"/>
           <p:cNvSpPr>
             <a:spLocks noGrp="1"/>
           </p:cNvSpPr>
@@ -7792,50 +7800,400 @@
             <p:ph type="title"/>
           </p:nvPr>
         </p:nvSpPr>
-        <p:spPr/>
-        <p:txBody>
-          <a:bodyPr/>
-          <a:lstStyle/>
-          <a:p>
-            <a:r>
-              <a:rPr lang="en-US" dirty="0" smtClean="0"/>
-              <a:t>Source</a:t>
-            </a:r>
-            <a:endParaRPr lang="en-US" dirty="0"/>
-          </a:p>
-        </p:txBody>
-      </p:sp>
-      <p:sp>
-        <p:nvSpPr>
-          <p:cNvPr id="4" name="Rectangle 3"/>
-          <p:cNvSpPr/>
+        <p:spPr>
+          <a:xfrm>
+            <a:off x="457200" y="274638"/>
+            <a:ext cx="8229600" cy="1143000"/>
+          </a:xfrm>
+        </p:spPr>
+        <p:txBody>
+          <a:bodyPr>
+            <a:normAutofit fontScale="90000"/>
+          </a:bodyPr>
+          <a:lstStyle/>
+          <a:p>
+            <a:r>
+              <a:rPr lang="en-US" dirty="0" smtClean="0"/>
+              <a:t>Application</a:t>
+            </a:r>
+            <a:r>
+              <a:rPr lang="en-US" dirty="0" smtClean="0"/>
+              <a:t/>
+            </a:r>
+            <a:br>
+              <a:rPr lang="en-US" dirty="0" smtClean="0"/>
+            </a:br>
+            <a:r>
+              <a:rPr lang="en-US" sz="3100" dirty="0" smtClean="0">
+                <a:solidFill>
+                  <a:schemeClr val="bg1">
+                    <a:lumMod val="50000"/>
+                  </a:schemeClr>
+                </a:solidFill>
+              </a:rPr>
+              <a:t>Original</a:t>
+            </a:r>
+            <a:endParaRPr lang="en-US" sz="3100" dirty="0">
+              <a:solidFill>
+                <a:schemeClr val="bg1">
+                  <a:lumMod val="50000"/>
+                </a:schemeClr>
+              </a:solidFill>
+            </a:endParaRPr>
+          </a:p>
+        </p:txBody>
+      </p:sp>
+      <p:pic>
+        <p:nvPicPr>
+          <p:cNvPr id="5" name="Picture 4" descr="lena.png"/>
+          <p:cNvPicPr>
+            <a:picLocks noChangeAspect="1"/>
+          </p:cNvPicPr>
           <p:nvPr/>
-        </p:nvSpPr>
-        <p:spPr>
-          <a:xfrm>
-            <a:off x="364854" y="3200400"/>
-            <a:ext cx="8550546" cy="646331"/>
+        </p:nvPicPr>
+        <p:blipFill>
+          <a:blip r:embed="rId2" cstate="print"/>
+          <a:stretch>
+            <a:fillRect/>
+          </a:stretch>
+        </p:blipFill>
+        <p:spPr>
+          <a:xfrm>
+            <a:off x="2209800" y="1524000"/>
+            <a:ext cx="4876800" cy="4876800"/>
           </a:xfrm>
           <a:prstGeom prst="rect">
             <a:avLst/>
           </a:prstGeom>
         </p:spPr>
-        <p:txBody>
-          <a:bodyPr wrap="none">
-            <a:spAutoFit/>
+      </p:pic>
+    </p:spTree>
+  </p:cSld>
+  <p:clrMapOvr>
+    <a:masterClrMapping/>
+  </p:clrMapOvr>
+  <p:timing>
+    <p:tnLst>
+      <p:par>
+        <p:cTn id="1" dur="indefinite" restart="never" nodeType="tmRoot"/>
+      </p:par>
+    </p:tnLst>
+  </p:timing>
+</p:sld>
+</file>
+
+<file path=ppt/slides/slide47.xml><?xml version="1.0" encoding="utf-8"?>
+<p:sld xmlns:a="http://schemas.openxmlformats.org/drawingml/2006/main" xmlns:r="http://schemas.openxmlformats.org/officeDocument/2006/relationships" xmlns:p="http://schemas.openxmlformats.org/presentationml/2006/main">
+  <p:cSld>
+    <p:spTree>
+      <p:nvGrpSpPr>
+        <p:cNvPr id="1" name=""/>
+        <p:cNvGrpSpPr/>
+        <p:nvPr/>
+      </p:nvGrpSpPr>
+      <p:grpSpPr>
+        <a:xfrm>
+          <a:off x="0" y="0"/>
+          <a:ext cx="0" cy="0"/>
+          <a:chOff x="0" y="0"/>
+          <a:chExt cx="0" cy="0"/>
+        </a:xfrm>
+      </p:grpSpPr>
+      <p:sp>
+        <p:nvSpPr>
+          <p:cNvPr id="4" name="Title 1"/>
+          <p:cNvSpPr>
+            <a:spLocks noGrp="1"/>
+          </p:cNvSpPr>
+          <p:nvPr>
+            <p:ph type="title"/>
+          </p:nvPr>
+        </p:nvSpPr>
+        <p:spPr>
+          <a:xfrm>
+            <a:off x="457200" y="274638"/>
+            <a:ext cx="8229600" cy="1143000"/>
+          </a:xfrm>
+        </p:spPr>
+        <p:txBody>
+          <a:bodyPr>
+            <a:normAutofit fontScale="90000"/>
           </a:bodyPr>
           <a:lstStyle/>
           <a:p>
             <a:r>
-              <a:rPr lang="en-US" sz="3600" dirty="0" smtClean="0">
-                <a:hlinkClick r:id="rId2"/>
+              <a:rPr lang="en-US" dirty="0" smtClean="0"/>
+              <a:t>Application</a:t>
+            </a:r>
+            <a:r>
+              <a:rPr lang="en-US" dirty="0" smtClean="0"/>
+              <a:t/>
+            </a:r>
+            <a:br>
+              <a:rPr lang="en-US" dirty="0" smtClean="0"/>
+            </a:br>
+            <a:r>
+              <a:rPr lang="en-US" sz="3100" dirty="0" smtClean="0">
+                <a:solidFill>
+                  <a:schemeClr val="bg1">
+                    <a:lumMod val="50000"/>
+                  </a:schemeClr>
+                </a:solidFill>
               </a:rPr>
-              <a:t>https://github.com/mikemeko/6.344-Project</a:t>
-            </a:r>
-            <a:endParaRPr lang="en-US" sz="3600" dirty="0"/>
-          </a:p>
-        </p:txBody>
-      </p:sp>
+              <a:t>Enhanced</a:t>
+            </a:r>
+            <a:endParaRPr lang="en-US" sz="3100" dirty="0">
+              <a:solidFill>
+                <a:schemeClr val="bg1">
+                  <a:lumMod val="50000"/>
+                </a:schemeClr>
+              </a:solidFill>
+            </a:endParaRPr>
+          </a:p>
+        </p:txBody>
+      </p:sp>
+      <p:pic>
+        <p:nvPicPr>
+          <p:cNvPr id="3" name="Picture 2" descr="lena_enhanced.png"/>
+          <p:cNvPicPr>
+            <a:picLocks noChangeAspect="1"/>
+          </p:cNvPicPr>
+          <p:nvPr/>
+        </p:nvPicPr>
+        <p:blipFill>
+          <a:blip r:embed="rId2" cstate="print"/>
+          <a:stretch>
+            <a:fillRect/>
+          </a:stretch>
+        </p:blipFill>
+        <p:spPr>
+          <a:xfrm>
+            <a:off x="2209800" y="1524000"/>
+            <a:ext cx="4876800" cy="4876800"/>
+          </a:xfrm>
+          <a:prstGeom prst="rect">
+            <a:avLst/>
+          </a:prstGeom>
+        </p:spPr>
+      </p:pic>
+    </p:spTree>
+  </p:cSld>
+  <p:clrMapOvr>
+    <a:masterClrMapping/>
+  </p:clrMapOvr>
+  <p:timing>
+    <p:tnLst>
+      <p:par>
+        <p:cTn id="1" dur="indefinite" restart="never" nodeType="tmRoot"/>
+      </p:par>
+    </p:tnLst>
+  </p:timing>
+</p:sld>
+</file>
+
+<file path=ppt/slides/slide48.xml><?xml version="1.0" encoding="utf-8"?>
+<p:sld xmlns:a="http://schemas.openxmlformats.org/drawingml/2006/main" xmlns:r="http://schemas.openxmlformats.org/officeDocument/2006/relationships" xmlns:p="http://schemas.openxmlformats.org/presentationml/2006/main">
+  <p:cSld>
+    <p:spTree>
+      <p:nvGrpSpPr>
+        <p:cNvPr id="1" name=""/>
+        <p:cNvGrpSpPr/>
+        <p:nvPr/>
+      </p:nvGrpSpPr>
+      <p:grpSpPr>
+        <a:xfrm>
+          <a:off x="0" y="0"/>
+          <a:ext cx="0" cy="0"/>
+          <a:chOff x="0" y="0"/>
+          <a:chExt cx="0" cy="0"/>
+        </a:xfrm>
+      </p:grpSpPr>
+      <p:sp>
+        <p:nvSpPr>
+          <p:cNvPr id="4" name="Title 1"/>
+          <p:cNvSpPr>
+            <a:spLocks noGrp="1"/>
+          </p:cNvSpPr>
+          <p:nvPr>
+            <p:ph type="title"/>
+          </p:nvPr>
+        </p:nvSpPr>
+        <p:spPr>
+          <a:xfrm>
+            <a:off x="457200" y="274638"/>
+            <a:ext cx="8229600" cy="1143000"/>
+          </a:xfrm>
+        </p:spPr>
+        <p:txBody>
+          <a:bodyPr>
+            <a:normAutofit fontScale="90000"/>
+          </a:bodyPr>
+          <a:lstStyle/>
+          <a:p>
+            <a:r>
+              <a:rPr lang="en-US" dirty="0" smtClean="0"/>
+              <a:t>Application</a:t>
+            </a:r>
+            <a:r>
+              <a:rPr lang="en-US" dirty="0" smtClean="0"/>
+              <a:t/>
+            </a:r>
+            <a:br>
+              <a:rPr lang="en-US" dirty="0" smtClean="0"/>
+            </a:br>
+            <a:r>
+              <a:rPr lang="en-US" sz="3100" dirty="0" smtClean="0">
+                <a:solidFill>
+                  <a:schemeClr val="bg1">
+                    <a:lumMod val="50000"/>
+                  </a:schemeClr>
+                </a:solidFill>
+              </a:rPr>
+              <a:t>Original</a:t>
+            </a:r>
+            <a:endParaRPr lang="en-US" sz="3100" dirty="0">
+              <a:solidFill>
+                <a:schemeClr val="bg1">
+                  <a:lumMod val="50000"/>
+                </a:schemeClr>
+              </a:solidFill>
+            </a:endParaRPr>
+          </a:p>
+        </p:txBody>
+      </p:sp>
+      <p:pic>
+        <p:nvPicPr>
+          <p:cNvPr id="3" name="Picture 2" descr="stata_center.jpg"/>
+          <p:cNvPicPr>
+            <a:picLocks noChangeAspect="1"/>
+          </p:cNvPicPr>
+          <p:nvPr/>
+        </p:nvPicPr>
+        <p:blipFill>
+          <a:blip r:embed="rId2" cstate="print"/>
+          <a:stretch>
+            <a:fillRect/>
+          </a:stretch>
+        </p:blipFill>
+        <p:spPr>
+          <a:xfrm>
+            <a:off x="2667000" y="1524000"/>
+            <a:ext cx="3771900" cy="5029200"/>
+          </a:xfrm>
+          <a:prstGeom prst="rect">
+            <a:avLst/>
+          </a:prstGeom>
+        </p:spPr>
+      </p:pic>
+    </p:spTree>
+  </p:cSld>
+  <p:clrMapOvr>
+    <a:masterClrMapping/>
+  </p:clrMapOvr>
+  <p:timing>
+    <p:tnLst>
+      <p:par>
+        <p:cTn id="1" dur="indefinite" restart="never" nodeType="tmRoot"/>
+      </p:par>
+    </p:tnLst>
+  </p:timing>
+</p:sld>
+</file>
+
+<file path=ppt/slides/slide49.xml><?xml version="1.0" encoding="utf-8"?>
+<p:sld xmlns:a="http://schemas.openxmlformats.org/drawingml/2006/main" xmlns:r="http://schemas.openxmlformats.org/officeDocument/2006/relationships" xmlns:p="http://schemas.openxmlformats.org/presentationml/2006/main">
+  <p:cSld>
+    <p:spTree>
+      <p:nvGrpSpPr>
+        <p:cNvPr id="1" name=""/>
+        <p:cNvGrpSpPr/>
+        <p:nvPr/>
+      </p:nvGrpSpPr>
+      <p:grpSpPr>
+        <a:xfrm>
+          <a:off x="0" y="0"/>
+          <a:ext cx="0" cy="0"/>
+          <a:chOff x="0" y="0"/>
+          <a:chExt cx="0" cy="0"/>
+        </a:xfrm>
+      </p:grpSpPr>
+      <p:sp>
+        <p:nvSpPr>
+          <p:cNvPr id="4" name="Title 1"/>
+          <p:cNvSpPr>
+            <a:spLocks noGrp="1"/>
+          </p:cNvSpPr>
+          <p:nvPr>
+            <p:ph type="title"/>
+          </p:nvPr>
+        </p:nvSpPr>
+        <p:spPr>
+          <a:xfrm>
+            <a:off x="457200" y="274638"/>
+            <a:ext cx="8229600" cy="1143000"/>
+          </a:xfrm>
+        </p:spPr>
+        <p:txBody>
+          <a:bodyPr>
+            <a:normAutofit fontScale="90000"/>
+          </a:bodyPr>
+          <a:lstStyle/>
+          <a:p>
+            <a:r>
+              <a:rPr lang="en-US" dirty="0" smtClean="0"/>
+              <a:t>Application</a:t>
+            </a:r>
+            <a:r>
+              <a:rPr lang="en-US" dirty="0" smtClean="0"/>
+              <a:t/>
+            </a:r>
+            <a:br>
+              <a:rPr lang="en-US" dirty="0" smtClean="0"/>
+            </a:br>
+            <a:r>
+              <a:rPr lang="en-US" sz="3100" dirty="0" smtClean="0">
+                <a:solidFill>
+                  <a:schemeClr val="bg1">
+                    <a:lumMod val="50000"/>
+                  </a:schemeClr>
+                </a:solidFill>
+              </a:rPr>
+              <a:t>Enhanced</a:t>
+            </a:r>
+            <a:endParaRPr lang="en-US" sz="3100" dirty="0">
+              <a:solidFill>
+                <a:schemeClr val="bg1">
+                  <a:lumMod val="50000"/>
+                </a:schemeClr>
+              </a:solidFill>
+            </a:endParaRPr>
+          </a:p>
+        </p:txBody>
+      </p:sp>
+      <p:pic>
+        <p:nvPicPr>
+          <p:cNvPr id="5" name="Picture 4" descr="stata_center_enhanced.jpg"/>
+          <p:cNvPicPr>
+            <a:picLocks noChangeAspect="1"/>
+          </p:cNvPicPr>
+          <p:nvPr/>
+        </p:nvPicPr>
+        <p:blipFill>
+          <a:blip r:embed="rId2" cstate="print"/>
+          <a:stretch>
+            <a:fillRect/>
+          </a:stretch>
+        </p:blipFill>
+        <p:spPr>
+          <a:xfrm>
+            <a:off x="2667000" y="1524000"/>
+            <a:ext cx="3771900" cy="5029200"/>
+          </a:xfrm>
+          <a:prstGeom prst="rect">
+            <a:avLst/>
+          </a:prstGeom>
+        </p:spPr>
+      </p:pic>
     </p:spTree>
   </p:cSld>
   <p:clrMapOvr>
@@ -7930,6 +8288,528 @@
           </a:prstGeom>
         </p:spPr>
       </p:pic>
+    </p:spTree>
+  </p:cSld>
+  <p:clrMapOvr>
+    <a:masterClrMapping/>
+  </p:clrMapOvr>
+  <p:timing>
+    <p:tnLst>
+      <p:par>
+        <p:cTn id="1" dur="indefinite" restart="never" nodeType="tmRoot"/>
+      </p:par>
+    </p:tnLst>
+  </p:timing>
+</p:sld>
+</file>
+
+<file path=ppt/slides/slide50.xml><?xml version="1.0" encoding="utf-8"?>
+<p:sld xmlns:a="http://schemas.openxmlformats.org/drawingml/2006/main" xmlns:r="http://schemas.openxmlformats.org/officeDocument/2006/relationships" xmlns:p="http://schemas.openxmlformats.org/presentationml/2006/main">
+  <p:cSld>
+    <p:spTree>
+      <p:nvGrpSpPr>
+        <p:cNvPr id="1" name=""/>
+        <p:cNvGrpSpPr/>
+        <p:nvPr/>
+      </p:nvGrpSpPr>
+      <p:grpSpPr>
+        <a:xfrm>
+          <a:off x="0" y="0"/>
+          <a:ext cx="0" cy="0"/>
+          <a:chOff x="0" y="0"/>
+          <a:chExt cx="0" cy="0"/>
+        </a:xfrm>
+      </p:grpSpPr>
+      <p:sp>
+        <p:nvSpPr>
+          <p:cNvPr id="4" name="Title 1"/>
+          <p:cNvSpPr>
+            <a:spLocks noGrp="1"/>
+          </p:cNvSpPr>
+          <p:nvPr>
+            <p:ph type="title"/>
+          </p:nvPr>
+        </p:nvSpPr>
+        <p:spPr>
+          <a:xfrm>
+            <a:off x="457200" y="274638"/>
+            <a:ext cx="8229600" cy="1143000"/>
+          </a:xfrm>
+        </p:spPr>
+        <p:txBody>
+          <a:bodyPr>
+            <a:normAutofit fontScale="90000"/>
+          </a:bodyPr>
+          <a:lstStyle/>
+          <a:p>
+            <a:r>
+              <a:rPr lang="en-US" dirty="0" smtClean="0"/>
+              <a:t>Application</a:t>
+            </a:r>
+            <a:r>
+              <a:rPr lang="en-US" dirty="0" smtClean="0"/>
+              <a:t/>
+            </a:r>
+            <a:br>
+              <a:rPr lang="en-US" dirty="0" smtClean="0"/>
+            </a:br>
+            <a:r>
+              <a:rPr lang="en-US" sz="3100" dirty="0" smtClean="0">
+                <a:solidFill>
+                  <a:schemeClr val="bg1">
+                    <a:lumMod val="50000"/>
+                  </a:schemeClr>
+                </a:solidFill>
+              </a:rPr>
+              <a:t>Original</a:t>
+            </a:r>
+            <a:endParaRPr lang="en-US" sz="3100" dirty="0">
+              <a:solidFill>
+                <a:schemeClr val="bg1">
+                  <a:lumMod val="50000"/>
+                </a:schemeClr>
+              </a:solidFill>
+            </a:endParaRPr>
+          </a:p>
+        </p:txBody>
+      </p:sp>
+      <p:pic>
+        <p:nvPicPr>
+          <p:cNvPr id="3" name="Picture 2" descr="mandrill.jpg"/>
+          <p:cNvPicPr>
+            <a:picLocks noChangeAspect="1"/>
+          </p:cNvPicPr>
+          <p:nvPr/>
+        </p:nvPicPr>
+        <p:blipFill>
+          <a:blip r:embed="rId2" cstate="print"/>
+          <a:stretch>
+            <a:fillRect/>
+          </a:stretch>
+        </p:blipFill>
+        <p:spPr>
+          <a:xfrm>
+            <a:off x="2209800" y="1676400"/>
+            <a:ext cx="4762500" cy="4572000"/>
+          </a:xfrm>
+          <a:prstGeom prst="rect">
+            <a:avLst/>
+          </a:prstGeom>
+        </p:spPr>
+      </p:pic>
+    </p:spTree>
+  </p:cSld>
+  <p:clrMapOvr>
+    <a:masterClrMapping/>
+  </p:clrMapOvr>
+  <p:timing>
+    <p:tnLst>
+      <p:par>
+        <p:cTn id="1" dur="indefinite" restart="never" nodeType="tmRoot"/>
+      </p:par>
+    </p:tnLst>
+  </p:timing>
+</p:sld>
+</file>
+
+<file path=ppt/slides/slide51.xml><?xml version="1.0" encoding="utf-8"?>
+<p:sld xmlns:a="http://schemas.openxmlformats.org/drawingml/2006/main" xmlns:r="http://schemas.openxmlformats.org/officeDocument/2006/relationships" xmlns:p="http://schemas.openxmlformats.org/presentationml/2006/main">
+  <p:cSld>
+    <p:spTree>
+      <p:nvGrpSpPr>
+        <p:cNvPr id="1" name=""/>
+        <p:cNvGrpSpPr/>
+        <p:nvPr/>
+      </p:nvGrpSpPr>
+      <p:grpSpPr>
+        <a:xfrm>
+          <a:off x="0" y="0"/>
+          <a:ext cx="0" cy="0"/>
+          <a:chOff x="0" y="0"/>
+          <a:chExt cx="0" cy="0"/>
+        </a:xfrm>
+      </p:grpSpPr>
+      <p:sp>
+        <p:nvSpPr>
+          <p:cNvPr id="4" name="Title 1"/>
+          <p:cNvSpPr>
+            <a:spLocks noGrp="1"/>
+          </p:cNvSpPr>
+          <p:nvPr>
+            <p:ph type="title"/>
+          </p:nvPr>
+        </p:nvSpPr>
+        <p:spPr>
+          <a:xfrm>
+            <a:off x="457200" y="274638"/>
+            <a:ext cx="8229600" cy="1143000"/>
+          </a:xfrm>
+        </p:spPr>
+        <p:txBody>
+          <a:bodyPr>
+            <a:normAutofit fontScale="90000"/>
+          </a:bodyPr>
+          <a:lstStyle/>
+          <a:p>
+            <a:r>
+              <a:rPr lang="en-US" dirty="0" smtClean="0"/>
+              <a:t>Application</a:t>
+            </a:r>
+            <a:r>
+              <a:rPr lang="en-US" dirty="0" smtClean="0"/>
+              <a:t/>
+            </a:r>
+            <a:br>
+              <a:rPr lang="en-US" dirty="0" smtClean="0"/>
+            </a:br>
+            <a:r>
+              <a:rPr lang="en-US" sz="3100" dirty="0" smtClean="0">
+                <a:solidFill>
+                  <a:schemeClr val="bg1">
+                    <a:lumMod val="50000"/>
+                  </a:schemeClr>
+                </a:solidFill>
+              </a:rPr>
+              <a:t>Enhanced</a:t>
+            </a:r>
+            <a:endParaRPr lang="en-US" sz="3100" dirty="0">
+              <a:solidFill>
+                <a:schemeClr val="bg1">
+                  <a:lumMod val="50000"/>
+                </a:schemeClr>
+              </a:solidFill>
+            </a:endParaRPr>
+          </a:p>
+        </p:txBody>
+      </p:sp>
+      <p:pic>
+        <p:nvPicPr>
+          <p:cNvPr id="3" name="Picture 2" descr="mandrill_enhanced.jpg"/>
+          <p:cNvPicPr>
+            <a:picLocks noChangeAspect="1"/>
+          </p:cNvPicPr>
+          <p:nvPr/>
+        </p:nvPicPr>
+        <p:blipFill>
+          <a:blip r:embed="rId2" cstate="print"/>
+          <a:stretch>
+            <a:fillRect/>
+          </a:stretch>
+        </p:blipFill>
+        <p:spPr>
+          <a:xfrm>
+            <a:off x="2209800" y="1676400"/>
+            <a:ext cx="4762500" cy="4572000"/>
+          </a:xfrm>
+          <a:prstGeom prst="rect">
+            <a:avLst/>
+          </a:prstGeom>
+        </p:spPr>
+      </p:pic>
+    </p:spTree>
+  </p:cSld>
+  <p:clrMapOvr>
+    <a:masterClrMapping/>
+  </p:clrMapOvr>
+  <p:timing>
+    <p:tnLst>
+      <p:par>
+        <p:cTn id="1" dur="indefinite" restart="never" nodeType="tmRoot"/>
+      </p:par>
+    </p:tnLst>
+  </p:timing>
+</p:sld>
+</file>
+
+<file path=ppt/slides/slide52.xml><?xml version="1.0" encoding="utf-8"?>
+<p:sld xmlns:a="http://schemas.openxmlformats.org/drawingml/2006/main" xmlns:r="http://schemas.openxmlformats.org/officeDocument/2006/relationships" xmlns:p="http://schemas.openxmlformats.org/presentationml/2006/main">
+  <p:cSld>
+    <p:spTree>
+      <p:nvGrpSpPr>
+        <p:cNvPr id="1" name=""/>
+        <p:cNvGrpSpPr/>
+        <p:nvPr/>
+      </p:nvGrpSpPr>
+      <p:grpSpPr>
+        <a:xfrm>
+          <a:off x="0" y="0"/>
+          <a:ext cx="0" cy="0"/>
+          <a:chOff x="0" y="0"/>
+          <a:chExt cx="0" cy="0"/>
+        </a:xfrm>
+      </p:grpSpPr>
+      <p:sp>
+        <p:nvSpPr>
+          <p:cNvPr id="4" name="Title 1"/>
+          <p:cNvSpPr>
+            <a:spLocks noGrp="1"/>
+          </p:cNvSpPr>
+          <p:nvPr>
+            <p:ph type="title"/>
+          </p:nvPr>
+        </p:nvSpPr>
+        <p:spPr>
+          <a:xfrm>
+            <a:off x="457200" y="274638"/>
+            <a:ext cx="8229600" cy="1143000"/>
+          </a:xfrm>
+        </p:spPr>
+        <p:txBody>
+          <a:bodyPr>
+            <a:normAutofit fontScale="90000"/>
+          </a:bodyPr>
+          <a:lstStyle/>
+          <a:p>
+            <a:r>
+              <a:rPr lang="en-US" dirty="0" smtClean="0"/>
+              <a:t>Application</a:t>
+            </a:r>
+            <a:r>
+              <a:rPr lang="en-US" dirty="0" smtClean="0"/>
+              <a:t/>
+            </a:r>
+            <a:br>
+              <a:rPr lang="en-US" dirty="0" smtClean="0"/>
+            </a:br>
+            <a:r>
+              <a:rPr lang="en-US" sz="3100" dirty="0" smtClean="0">
+                <a:solidFill>
+                  <a:schemeClr val="bg1">
+                    <a:lumMod val="50000"/>
+                  </a:schemeClr>
+                </a:solidFill>
+              </a:rPr>
+              <a:t>Original</a:t>
+            </a:r>
+            <a:endParaRPr lang="en-US" sz="3100" dirty="0">
+              <a:solidFill>
+                <a:schemeClr val="bg1">
+                  <a:lumMod val="50000"/>
+                </a:schemeClr>
+              </a:solidFill>
+            </a:endParaRPr>
+          </a:p>
+        </p:txBody>
+      </p:sp>
+      <p:pic>
+        <p:nvPicPr>
+          <p:cNvPr id="3" name="Picture 2" descr="green_building.jpg"/>
+          <p:cNvPicPr>
+            <a:picLocks noChangeAspect="1"/>
+          </p:cNvPicPr>
+          <p:nvPr/>
+        </p:nvPicPr>
+        <p:blipFill>
+          <a:blip r:embed="rId2" cstate="print"/>
+          <a:stretch>
+            <a:fillRect/>
+          </a:stretch>
+        </p:blipFill>
+        <p:spPr>
+          <a:xfrm>
+            <a:off x="2895600" y="1524000"/>
+            <a:ext cx="3352800" cy="5029200"/>
+          </a:xfrm>
+          <a:prstGeom prst="rect">
+            <a:avLst/>
+          </a:prstGeom>
+        </p:spPr>
+      </p:pic>
+    </p:spTree>
+  </p:cSld>
+  <p:clrMapOvr>
+    <a:masterClrMapping/>
+  </p:clrMapOvr>
+  <p:timing>
+    <p:tnLst>
+      <p:par>
+        <p:cTn id="1" dur="indefinite" restart="never" nodeType="tmRoot"/>
+      </p:par>
+    </p:tnLst>
+  </p:timing>
+</p:sld>
+</file>
+
+<file path=ppt/slides/slide53.xml><?xml version="1.0" encoding="utf-8"?>
+<p:sld xmlns:a="http://schemas.openxmlformats.org/drawingml/2006/main" xmlns:r="http://schemas.openxmlformats.org/officeDocument/2006/relationships" xmlns:p="http://schemas.openxmlformats.org/presentationml/2006/main">
+  <p:cSld>
+    <p:spTree>
+      <p:nvGrpSpPr>
+        <p:cNvPr id="1" name=""/>
+        <p:cNvGrpSpPr/>
+        <p:nvPr/>
+      </p:nvGrpSpPr>
+      <p:grpSpPr>
+        <a:xfrm>
+          <a:off x="0" y="0"/>
+          <a:ext cx="0" cy="0"/>
+          <a:chOff x="0" y="0"/>
+          <a:chExt cx="0" cy="0"/>
+        </a:xfrm>
+      </p:grpSpPr>
+      <p:sp>
+        <p:nvSpPr>
+          <p:cNvPr id="4" name="Title 1"/>
+          <p:cNvSpPr>
+            <a:spLocks noGrp="1"/>
+          </p:cNvSpPr>
+          <p:nvPr>
+            <p:ph type="title"/>
+          </p:nvPr>
+        </p:nvSpPr>
+        <p:spPr>
+          <a:xfrm>
+            <a:off x="457200" y="274638"/>
+            <a:ext cx="8229600" cy="1143000"/>
+          </a:xfrm>
+        </p:spPr>
+        <p:txBody>
+          <a:bodyPr>
+            <a:normAutofit fontScale="90000"/>
+          </a:bodyPr>
+          <a:lstStyle/>
+          <a:p>
+            <a:r>
+              <a:rPr lang="en-US" dirty="0" smtClean="0"/>
+              <a:t>Application</a:t>
+            </a:r>
+            <a:r>
+              <a:rPr lang="en-US" dirty="0" smtClean="0"/>
+              <a:t/>
+            </a:r>
+            <a:br>
+              <a:rPr lang="en-US" dirty="0" smtClean="0"/>
+            </a:br>
+            <a:r>
+              <a:rPr lang="en-US" sz="3100" dirty="0" smtClean="0">
+                <a:solidFill>
+                  <a:schemeClr val="bg1">
+                    <a:lumMod val="50000"/>
+                  </a:schemeClr>
+                </a:solidFill>
+              </a:rPr>
+              <a:t>Enhanced</a:t>
+            </a:r>
+            <a:endParaRPr lang="en-US" sz="3100" dirty="0">
+              <a:solidFill>
+                <a:schemeClr val="bg1">
+                  <a:lumMod val="50000"/>
+                </a:schemeClr>
+              </a:solidFill>
+            </a:endParaRPr>
+          </a:p>
+        </p:txBody>
+      </p:sp>
+      <p:pic>
+        <p:nvPicPr>
+          <p:cNvPr id="3" name="Picture 2" descr="green_building_enhanced.jpg"/>
+          <p:cNvPicPr>
+            <a:picLocks noChangeAspect="1"/>
+          </p:cNvPicPr>
+          <p:nvPr/>
+        </p:nvPicPr>
+        <p:blipFill>
+          <a:blip r:embed="rId2" cstate="print"/>
+          <a:stretch>
+            <a:fillRect/>
+          </a:stretch>
+        </p:blipFill>
+        <p:spPr>
+          <a:xfrm>
+            <a:off x="2895600" y="1524000"/>
+            <a:ext cx="3352800" cy="5029200"/>
+          </a:xfrm>
+          <a:prstGeom prst="rect">
+            <a:avLst/>
+          </a:prstGeom>
+        </p:spPr>
+      </p:pic>
+    </p:spTree>
+  </p:cSld>
+  <p:clrMapOvr>
+    <a:masterClrMapping/>
+  </p:clrMapOvr>
+  <p:timing>
+    <p:tnLst>
+      <p:par>
+        <p:cTn id="1" dur="indefinite" restart="never" nodeType="tmRoot"/>
+      </p:par>
+    </p:tnLst>
+  </p:timing>
+</p:sld>
+</file>
+
+<file path=ppt/slides/slide54.xml><?xml version="1.0" encoding="utf-8"?>
+<p:sld xmlns:a="http://schemas.openxmlformats.org/drawingml/2006/main" xmlns:r="http://schemas.openxmlformats.org/officeDocument/2006/relationships" xmlns:p="http://schemas.openxmlformats.org/presentationml/2006/main">
+  <p:cSld>
+    <p:spTree>
+      <p:nvGrpSpPr>
+        <p:cNvPr id="1" name=""/>
+        <p:cNvGrpSpPr/>
+        <p:nvPr/>
+      </p:nvGrpSpPr>
+      <p:grpSpPr>
+        <a:xfrm>
+          <a:off x="0" y="0"/>
+          <a:ext cx="0" cy="0"/>
+          <a:chOff x="0" y="0"/>
+          <a:chExt cx="0" cy="0"/>
+        </a:xfrm>
+      </p:grpSpPr>
+      <p:sp>
+        <p:nvSpPr>
+          <p:cNvPr id="2" name="Title 1"/>
+          <p:cNvSpPr>
+            <a:spLocks noGrp="1"/>
+          </p:cNvSpPr>
+          <p:nvPr>
+            <p:ph type="title"/>
+          </p:nvPr>
+        </p:nvSpPr>
+        <p:spPr/>
+        <p:txBody>
+          <a:bodyPr/>
+          <a:lstStyle/>
+          <a:p>
+            <a:r>
+              <a:rPr lang="en-US" dirty="0" smtClean="0"/>
+              <a:t>Source</a:t>
+            </a:r>
+            <a:endParaRPr lang="en-US" dirty="0"/>
+          </a:p>
+        </p:txBody>
+      </p:sp>
+      <p:sp>
+        <p:nvSpPr>
+          <p:cNvPr id="4" name="Rectangle 3"/>
+          <p:cNvSpPr/>
+          <p:nvPr/>
+        </p:nvSpPr>
+        <p:spPr>
+          <a:xfrm>
+            <a:off x="364854" y="3200400"/>
+            <a:ext cx="8550546" cy="646331"/>
+          </a:xfrm>
+          <a:prstGeom prst="rect">
+            <a:avLst/>
+          </a:prstGeom>
+        </p:spPr>
+        <p:txBody>
+          <a:bodyPr wrap="none">
+            <a:spAutoFit/>
+          </a:bodyPr>
+          <a:lstStyle/>
+          <a:p>
+            <a:r>
+              <a:rPr lang="en-US" sz="3600" dirty="0" smtClean="0">
+                <a:hlinkClick r:id="rId2"/>
+              </a:rPr>
+              <a:t>https://github.com/mikemeko/6.344-Project</a:t>
+            </a:r>
+            <a:endParaRPr lang="en-US" sz="3600" dirty="0"/>
+          </a:p>
+        </p:txBody>
+      </p:sp>
     </p:spTree>
   </p:cSld>
   <p:clrMapOvr>

</xml_diff>

<commit_message>
slightly improve image enhancement
</commit_message>
<xml_diff>
--- a/docs/presentation/presentation.pptx
+++ b/docs/presentation/presentation.pptx
@@ -4373,6 +4373,13 @@
               <a:t>Comparison</a:t>
             </a:r>
           </a:p>
+          <a:p>
+            <a:r>
+              <a:rPr lang="en-US" dirty="0" smtClean="0"/>
+              <a:t>Application of Edge Detection</a:t>
+            </a:r>
+            <a:endParaRPr lang="en-US" dirty="0" smtClean="0"/>
+          </a:p>
         </p:txBody>
       </p:sp>
     </p:spTree>
@@ -7954,7 +7961,7 @@
       </p:sp>
       <p:pic>
         <p:nvPicPr>
-          <p:cNvPr id="3" name="Picture 2" descr="lena_enhanced.png"/>
+          <p:cNvPr id="5" name="Picture 4" descr="lena_enhanced.png"/>
           <p:cNvPicPr>
             <a:picLocks noChangeAspect="1"/>
           </p:cNvPicPr>
@@ -8172,7 +8179,7 @@
       </p:sp>
       <p:pic>
         <p:nvPicPr>
-          <p:cNvPr id="5" name="Picture 4" descr="stata_center_enhanced.jpg"/>
+          <p:cNvPr id="6" name="Picture 5" descr="stata_center_enhanced.jpg"/>
           <p:cNvPicPr>
             <a:picLocks noChangeAspect="1"/>
           </p:cNvPicPr>
@@ -8484,7 +8491,7 @@
       </p:sp>
       <p:pic>
         <p:nvPicPr>
-          <p:cNvPr id="3" name="Picture 2" descr="mandrill_enhanced.jpg"/>
+          <p:cNvPr id="5" name="Picture 4" descr="mandrill_enhanced.jpg"/>
           <p:cNvPicPr>
             <a:picLocks noChangeAspect="1"/>
           </p:cNvPicPr>
@@ -8702,7 +8709,7 @@
       </p:sp>
       <p:pic>
         <p:nvPicPr>
-          <p:cNvPr id="3" name="Picture 2" descr="green_building_enhanced.jpg"/>
+          <p:cNvPr id="5" name="Picture 4" descr="green_building_enhanced.jpg"/>
           <p:cNvPicPr>
             <a:picLocks noChangeAspect="1"/>
           </p:cNvPicPr>

</xml_diff>